<commit_message>
Finished readme and slideshow
</commit_message>
<xml_diff>
--- a/Microservices from the ground up.pptx
+++ b/Microservices from the ground up.pptx
@@ -6,11 +6,13 @@
   </p:sldMasterIdLst>
   <p:sldIdLst>
     <p:sldId id="258" r:id="rId2"/>
-    <p:sldId id="260" r:id="rId3"/>
-    <p:sldId id="261" r:id="rId4"/>
-    <p:sldId id="264" r:id="rId5"/>
-    <p:sldId id="263" r:id="rId6"/>
-    <p:sldId id="257" r:id="rId7"/>
+    <p:sldId id="265" r:id="rId3"/>
+    <p:sldId id="266" r:id="rId4"/>
+    <p:sldId id="257" r:id="rId5"/>
+    <p:sldId id="260" r:id="rId6"/>
+    <p:sldId id="261" r:id="rId7"/>
+    <p:sldId id="264" r:id="rId8"/>
+    <p:sldId id="263" r:id="rId9"/>
   </p:sldIdLst>
   <p:sldSz cx="12192000" cy="6858000"/>
   <p:notesSz cx="7315200" cy="9601200"/>
@@ -12857,7 +12859,7 @@
           </p:cNvGraphicFramePr>
           <p:nvPr>
             <p:custDataLst>
-              <p:tags r:id="rId1"/>
+              <p:tags r:id="rId2"/>
             </p:custDataLst>
           </p:nvPr>
         </p:nvGraphicFramePr>
@@ -12869,12 +12871,12 @@
           <a:graphicData uri="http://schemas.openxmlformats.org/presentationml/2006/ole">
             <mc:AlternateContent xmlns:mc="http://schemas.openxmlformats.org/markup-compatibility/2006">
               <mc:Choice xmlns:v="urn:schemas-microsoft-com:vml" Requires="v">
-                <p:oleObj name="think-cell Slide" r:id="rId4" imgW="360" imgH="360" progId="TCLayout.ActiveDocument.1">
+                <p:oleObj spid="_x0000_s2053" name="think-cell Slide" r:id="rId5" imgW="360" imgH="360" progId="TCLayout.ActiveDocument.1">
                   <p:embed/>
                 </p:oleObj>
               </mc:Choice>
               <mc:Fallback>
-                <p:oleObj name="think-cell Slide" r:id="rId4" imgW="360" imgH="360" progId="TCLayout.ActiveDocument.1">
+                <p:oleObj name="think-cell Slide" r:id="rId5" imgW="360" imgH="360" progId="TCLayout.ActiveDocument.1">
                   <p:embed/>
                   <p:pic>
                     <p:nvPicPr>
@@ -12883,7 +12885,7 @@
                       <p:nvPr/>
                     </p:nvPicPr>
                     <p:blipFill>
-                      <a:blip r:embed="rId5"/>
+                      <a:blip r:embed="rId6"/>
                       <a:stretch>
                         <a:fillRect/>
                       </a:stretch>
@@ -12910,7 +12912,7 @@
           <p:cNvSpPr/>
           <p:nvPr>
             <p:custDataLst>
-              <p:tags r:id="rId2"/>
+              <p:tags r:id="rId3"/>
             </p:custDataLst>
           </p:nvPr>
         </p:nvSpPr>
@@ -14502,7 +14504,7 @@
           </p:cNvGraphicFramePr>
           <p:nvPr>
             <p:custDataLst>
-              <p:tags r:id="rId1"/>
+              <p:tags r:id="rId2"/>
             </p:custDataLst>
           </p:nvPr>
         </p:nvGraphicFramePr>
@@ -14514,12 +14516,12 @@
           <a:graphicData uri="http://schemas.openxmlformats.org/presentationml/2006/ole">
             <mc:AlternateContent xmlns:mc="http://schemas.openxmlformats.org/markup-compatibility/2006">
               <mc:Choice xmlns:v="urn:schemas-microsoft-com:vml" Requires="v">
-                <p:oleObj name="think-cell Slide" r:id="rId4" imgW="473" imgH="473" progId="TCLayout.ActiveDocument.1">
+                <p:oleObj spid="_x0000_s3077" name="think-cell Slide" r:id="rId5" imgW="473" imgH="473" progId="TCLayout.ActiveDocument.1">
                   <p:embed/>
                 </p:oleObj>
               </mc:Choice>
               <mc:Fallback>
-                <p:oleObj name="think-cell Slide" r:id="rId4" imgW="473" imgH="473" progId="TCLayout.ActiveDocument.1">
+                <p:oleObj name="think-cell Slide" r:id="rId5" imgW="473" imgH="473" progId="TCLayout.ActiveDocument.1">
                   <p:embed/>
                   <p:pic>
                     <p:nvPicPr>
@@ -14534,7 +14536,7 @@
                       <p:nvPr/>
                     </p:nvPicPr>
                     <p:blipFill>
-                      <a:blip r:embed="rId5"/>
+                      <a:blip r:embed="rId6"/>
                       <a:stretch>
                         <a:fillRect/>
                       </a:stretch>
@@ -14567,7 +14569,7 @@
           <p:cNvSpPr/>
           <p:nvPr>
             <p:custDataLst>
-              <p:tags r:id="rId2"/>
+              <p:tags r:id="rId3"/>
             </p:custDataLst>
           </p:nvPr>
         </p:nvSpPr>
@@ -16614,7 +16616,7 @@
           </p:cNvGraphicFramePr>
           <p:nvPr>
             <p:custDataLst>
-              <p:tags r:id="rId1"/>
+              <p:tags r:id="rId2"/>
             </p:custDataLst>
           </p:nvPr>
         </p:nvGraphicFramePr>
@@ -16626,12 +16628,12 @@
           <a:graphicData uri="http://schemas.openxmlformats.org/presentationml/2006/ole">
             <mc:AlternateContent xmlns:mc="http://schemas.openxmlformats.org/markup-compatibility/2006">
               <mc:Choice xmlns:v="urn:schemas-microsoft-com:vml" Requires="v">
-                <p:oleObj name="think-cell Slide" r:id="rId4" imgW="360" imgH="360" progId="TCLayout.ActiveDocument.1">
+                <p:oleObj spid="_x0000_s4101" name="think-cell Slide" r:id="rId5" imgW="360" imgH="360" progId="TCLayout.ActiveDocument.1">
                   <p:embed/>
                 </p:oleObj>
               </mc:Choice>
               <mc:Fallback>
-                <p:oleObj name="think-cell Slide" r:id="rId4" imgW="360" imgH="360" progId="TCLayout.ActiveDocument.1">
+                <p:oleObj name="think-cell Slide" r:id="rId5" imgW="360" imgH="360" progId="TCLayout.ActiveDocument.1">
                   <p:embed/>
                   <p:pic>
                     <p:nvPicPr>
@@ -16640,7 +16642,7 @@
                       <p:nvPr/>
                     </p:nvPicPr>
                     <p:blipFill>
-                      <a:blip r:embed="rId5"/>
+                      <a:blip r:embed="rId6"/>
                       <a:stretch>
                         <a:fillRect/>
                       </a:stretch>
@@ -16667,7 +16669,7 @@
           <p:cNvSpPr/>
           <p:nvPr>
             <p:custDataLst>
-              <p:tags r:id="rId2"/>
+              <p:tags r:id="rId3"/>
             </p:custDataLst>
           </p:nvPr>
         </p:nvSpPr>
@@ -20119,7 +20121,7 @@
           </p:cNvGraphicFramePr>
           <p:nvPr>
             <p:custDataLst>
-              <p:tags r:id="rId45"/>
+              <p:tags r:id="rId46"/>
             </p:custDataLst>
             <p:extLst>
               <p:ext uri="{D42A27DB-BD31-4B8C-83A1-F6EECF244321}">
@@ -20136,12 +20138,12 @@
           <a:graphicData uri="http://schemas.openxmlformats.org/presentationml/2006/ole">
             <mc:AlternateContent xmlns:mc="http://schemas.openxmlformats.org/markup-compatibility/2006">
               <mc:Choice xmlns:v="urn:schemas-microsoft-com:vml" Requires="v">
-                <p:oleObj name="think-cell Slide" r:id="rId46" imgW="270" imgH="270" progId="TCLayout.ActiveDocument.1">
+                <p:oleObj spid="_x0000_s1029" name="think-cell Slide" r:id="rId47" imgW="270" imgH="270" progId="TCLayout.ActiveDocument.1">
                   <p:embed/>
                 </p:oleObj>
               </mc:Choice>
               <mc:Fallback>
-                <p:oleObj name="think-cell Slide" r:id="rId46" imgW="270" imgH="270" progId="TCLayout.ActiveDocument.1">
+                <p:oleObj name="think-cell Slide" r:id="rId47" imgW="270" imgH="270" progId="TCLayout.ActiveDocument.1">
                   <p:embed/>
                   <p:pic>
                     <p:nvPicPr>
@@ -20150,7 +20152,7 @@
                       <p:nvPr/>
                     </p:nvPicPr>
                     <p:blipFill>
-                      <a:blip r:embed="rId47"/>
+                      <a:blip r:embed="rId48"/>
                       <a:stretch>
                         <a:fillRect/>
                       </a:stretch>
@@ -21100,7 +21102,7 @@
           <p:cNvPr id="6" name="Title 5">
             <a:extLst>
               <a:ext uri="{FF2B5EF4-FFF2-40B4-BE49-F238E27FC236}">
-                <a16:creationId xmlns:a16="http://schemas.microsoft.com/office/drawing/2014/main" id="{991C4C60-D549-4836-B4EA-770904367F52}"/>
+                <a16:creationId xmlns:a16="http://schemas.microsoft.com/office/drawing/2014/main" id="{35C556C4-3F4B-4FC6-ACF9-7339460ED114}"/>
               </a:ext>
             </a:extLst>
           </p:cNvPr>
@@ -21118,58 +21120,346 @@
           <a:p>
             <a:r>
               <a:rPr lang="is-IS" dirty="0"/>
-              <a:t>Terraform – Instead of using the GUI</a:t>
+              <a:t>Agenda</a:t>
             </a:r>
             <a:endParaRPr lang="da-DK" dirty="0"/>
           </a:p>
         </p:txBody>
       </p:sp>
-      <p:pic>
-        <p:nvPicPr>
-          <p:cNvPr id="11" name="Picture 10">
+      <p:sp>
+        <p:nvSpPr>
+          <p:cNvPr id="7" name="Text Placeholder 6">
             <a:extLst>
               <a:ext uri="{FF2B5EF4-FFF2-40B4-BE49-F238E27FC236}">
-                <a16:creationId xmlns:a16="http://schemas.microsoft.com/office/drawing/2014/main" id="{CCECAC6C-27D9-4725-BCF7-9FA166726083}"/>
+                <a16:creationId xmlns:a16="http://schemas.microsoft.com/office/drawing/2014/main" id="{3F035295-6CF9-4DA5-B613-28BB55C2D329}"/>
               </a:ext>
             </a:extLst>
           </p:cNvPr>
-          <p:cNvPicPr>
-            <a:picLocks noChangeAspect="1"/>
-          </p:cNvPicPr>
+          <p:cNvSpPr>
+            <a:spLocks noGrp="1"/>
+          </p:cNvSpPr>
+          <p:nvPr>
+            <p:ph type="body" idx="1"/>
+          </p:nvPr>
+        </p:nvSpPr>
+        <p:spPr>
+          <a:xfrm>
+            <a:off x="2723535" y="3840983"/>
+            <a:ext cx="6545140" cy="1566532"/>
+          </a:xfrm>
+        </p:spPr>
+        <p:txBody>
+          <a:bodyPr/>
+          <a:lstStyle/>
+          <a:p>
+            <a:r>
+              <a:rPr lang="is-IS" dirty="0">
+                <a:latin typeface="+mj-lt"/>
+              </a:rPr>
+              <a:t>Microservices</a:t>
+            </a:r>
+          </a:p>
+          <a:p>
+            <a:r>
+              <a:rPr lang="is-IS" dirty="0">
+                <a:latin typeface="+mj-lt"/>
+              </a:rPr>
+              <a:t>Container Orchestration</a:t>
+            </a:r>
+          </a:p>
+          <a:p>
+            <a:r>
+              <a:rPr lang="is-IS" dirty="0">
+                <a:latin typeface="+mj-lt"/>
+              </a:rPr>
+              <a:t>Cloud providers</a:t>
+            </a:r>
+            <a:endParaRPr lang="da-DK" dirty="0">
+              <a:latin typeface="+mj-lt"/>
+            </a:endParaRPr>
+          </a:p>
+        </p:txBody>
+      </p:sp>
+      <p:sp>
+        <p:nvSpPr>
+          <p:cNvPr id="8" name="Text Placeholder 6">
+            <a:extLst>
+              <a:ext uri="{FF2B5EF4-FFF2-40B4-BE49-F238E27FC236}">
+                <a16:creationId xmlns:a16="http://schemas.microsoft.com/office/drawing/2014/main" id="{240ABAD7-B643-4B5B-85AB-37F897021F27}"/>
+              </a:ext>
+            </a:extLst>
+          </p:cNvPr>
+          <p:cNvSpPr txBox="1">
+            <a:spLocks/>
+          </p:cNvSpPr>
           <p:nvPr/>
-        </p:nvPicPr>
-        <p:blipFill>
-          <a:blip r:embed="rId2"/>
-          <a:stretch>
-            <a:fillRect/>
-          </a:stretch>
-        </p:blipFill>
-        <p:spPr>
-          <a:xfrm>
-            <a:off x="3586162" y="1328311"/>
-            <a:ext cx="5019675" cy="4829175"/>
+        </p:nvSpPr>
+        <p:spPr bwMode="gray">
+          <a:xfrm>
+            <a:off x="469900" y="3840983"/>
+            <a:ext cx="2125816" cy="1566532"/>
           </a:xfrm>
           <a:prstGeom prst="rect">
             <a:avLst/>
           </a:prstGeom>
         </p:spPr>
-      </p:pic>
+        <p:txBody>
+          <a:bodyPr vert="horz" lIns="0" tIns="0" rIns="0" bIns="0" rtlCol="0">
+            <a:noAutofit/>
+          </a:bodyPr>
+          <a:lstStyle>
+            <a:lvl1pPr marL="0" indent="0" algn="l" defTabSz="914400" rtl="0" eaLnBrk="1" latinLnBrk="0" hangingPunct="1">
+              <a:lnSpc>
+                <a:spcPct val="95000"/>
+              </a:lnSpc>
+              <a:spcBef>
+                <a:spcPts val="0"/>
+              </a:spcBef>
+              <a:spcAft>
+                <a:spcPts val="0"/>
+              </a:spcAft>
+              <a:buSzPct val="100000"/>
+              <a:buFont typeface="Arial" panose="020B0604020202020204" pitchFamily="34" charset="0"/>
+              <a:buNone/>
+              <a:defRPr sz="3600" b="0" kern="1200">
+                <a:solidFill>
+                  <a:schemeClr val="bg1"/>
+                </a:solidFill>
+                <a:latin typeface="+mn-lt"/>
+                <a:ea typeface="+mn-ea"/>
+                <a:cs typeface="Calibri Light" panose="020F0302020204030204" pitchFamily="34" charset="0"/>
+              </a:defRPr>
+            </a:lvl1pPr>
+            <a:lvl2pPr marL="609585" indent="0" algn="l" defTabSz="914400" rtl="0" eaLnBrk="1" latinLnBrk="0" hangingPunct="1">
+              <a:spcBef>
+                <a:spcPts val="0"/>
+              </a:spcBef>
+              <a:spcAft>
+                <a:spcPts val="1000"/>
+              </a:spcAft>
+              <a:buClrTx/>
+              <a:buSzPct val="100000"/>
+              <a:buFont typeface="Arial"/>
+              <a:buNone/>
+              <a:defRPr lang="en-US" sz="2667" b="1" kern="1200">
+                <a:solidFill>
+                  <a:schemeClr val="tx1">
+                    <a:tint val="75000"/>
+                  </a:schemeClr>
+                </a:solidFill>
+                <a:latin typeface="+mj-lt"/>
+                <a:ea typeface="+mn-ea"/>
+                <a:cs typeface="Calibri Light" panose="020F0302020204030204" pitchFamily="34" charset="0"/>
+              </a:defRPr>
+            </a:lvl2pPr>
+            <a:lvl3pPr marL="1219170" indent="0" algn="l" defTabSz="914400" rtl="0" eaLnBrk="1" latinLnBrk="0" hangingPunct="1">
+              <a:spcBef>
+                <a:spcPts val="0"/>
+              </a:spcBef>
+              <a:spcAft>
+                <a:spcPts val="1000"/>
+              </a:spcAft>
+              <a:buClrTx/>
+              <a:buSzPct val="100000"/>
+              <a:buFont typeface="Arial" panose="020B0604020202020204" pitchFamily="34" charset="0"/>
+              <a:buNone/>
+              <a:defRPr lang="en-US" sz="2400" kern="1200">
+                <a:solidFill>
+                  <a:schemeClr val="tx1">
+                    <a:tint val="75000"/>
+                  </a:schemeClr>
+                </a:solidFill>
+                <a:latin typeface="+mn-lt"/>
+                <a:ea typeface="+mn-ea"/>
+                <a:cs typeface="Calibri Light" panose="020F0302020204030204" pitchFamily="34" charset="0"/>
+              </a:defRPr>
+            </a:lvl3pPr>
+            <a:lvl4pPr marL="1828754" indent="0" algn="l" defTabSz="914400" rtl="0" eaLnBrk="1" latinLnBrk="0" hangingPunct="1">
+              <a:spcBef>
+                <a:spcPts val="0"/>
+              </a:spcBef>
+              <a:spcAft>
+                <a:spcPts val="1000"/>
+              </a:spcAft>
+              <a:buClrTx/>
+              <a:buSzPct val="100000"/>
+              <a:buFont typeface="Verdana" panose="020B0604030504040204" pitchFamily="34" charset="0"/>
+              <a:buNone/>
+              <a:defRPr lang="en-US" sz="2133" kern="1200" baseline="0">
+                <a:solidFill>
+                  <a:schemeClr val="tx1">
+                    <a:tint val="75000"/>
+                  </a:schemeClr>
+                </a:solidFill>
+                <a:latin typeface="+mn-lt"/>
+                <a:ea typeface="+mn-ea"/>
+                <a:cs typeface="Calibri Light" panose="020F0302020204030204" pitchFamily="34" charset="0"/>
+              </a:defRPr>
+            </a:lvl4pPr>
+            <a:lvl5pPr marL="2438339" indent="0" algn="l" defTabSz="798513" rtl="0" eaLnBrk="1" latinLnBrk="0" hangingPunct="1">
+              <a:spcBef>
+                <a:spcPts val="0"/>
+              </a:spcBef>
+              <a:spcAft>
+                <a:spcPts val="1000"/>
+              </a:spcAft>
+              <a:buClrTx/>
+              <a:buSzPct val="100000"/>
+              <a:buFont typeface="Verdana" panose="020B0604030504040204" pitchFamily="34" charset="0"/>
+              <a:buNone/>
+              <a:tabLst/>
+              <a:defRPr lang="en-US" sz="2133" kern="1200" baseline="0">
+                <a:solidFill>
+                  <a:schemeClr val="tx1">
+                    <a:tint val="75000"/>
+                  </a:schemeClr>
+                </a:solidFill>
+                <a:latin typeface="+mn-lt"/>
+                <a:ea typeface="+mn-ea"/>
+                <a:cs typeface="Calibri Light" panose="020F0302020204030204" pitchFamily="34" charset="0"/>
+              </a:defRPr>
+            </a:lvl5pPr>
+            <a:lvl6pPr marL="3047924" indent="0" algn="l" defTabSz="914400" rtl="0" eaLnBrk="1" latinLnBrk="0" hangingPunct="1">
+              <a:spcBef>
+                <a:spcPts val="0"/>
+              </a:spcBef>
+              <a:spcAft>
+                <a:spcPts val="1000"/>
+              </a:spcAft>
+              <a:buFont typeface="Verdana" panose="020B0604030504040204" pitchFamily="34" charset="0"/>
+              <a:buNone/>
+              <a:defRPr sz="2133" kern="1200" baseline="0">
+                <a:solidFill>
+                  <a:schemeClr val="tx1">
+                    <a:tint val="75000"/>
+                  </a:schemeClr>
+                </a:solidFill>
+                <a:latin typeface="+mn-lt"/>
+                <a:ea typeface="+mn-ea"/>
+                <a:cs typeface="+mn-cs"/>
+              </a:defRPr>
+            </a:lvl6pPr>
+            <a:lvl7pPr marL="3657509" indent="0" algn="l" defTabSz="914400" rtl="0" eaLnBrk="1" latinLnBrk="0" hangingPunct="1">
+              <a:spcBef>
+                <a:spcPts val="0"/>
+              </a:spcBef>
+              <a:spcAft>
+                <a:spcPts val="1000"/>
+              </a:spcAft>
+              <a:buFont typeface="Verdana" panose="020B0604030504040204" pitchFamily="34" charset="0"/>
+              <a:buNone/>
+              <a:defRPr sz="2133" kern="1200">
+                <a:solidFill>
+                  <a:schemeClr val="tx1">
+                    <a:tint val="75000"/>
+                  </a:schemeClr>
+                </a:solidFill>
+                <a:latin typeface="+mn-lt"/>
+                <a:ea typeface="+mn-ea"/>
+                <a:cs typeface="+mn-cs"/>
+              </a:defRPr>
+            </a:lvl7pPr>
+            <a:lvl8pPr marL="4267093" indent="0" algn="l" defTabSz="914400" rtl="0" eaLnBrk="1" latinLnBrk="0" hangingPunct="1">
+              <a:spcBef>
+                <a:spcPts val="0"/>
+              </a:spcBef>
+              <a:spcAft>
+                <a:spcPts val="1000"/>
+              </a:spcAft>
+              <a:buFont typeface="Verdana" panose="020B0604030504040204" pitchFamily="34" charset="0"/>
+              <a:buNone/>
+              <a:defRPr sz="2133" kern="1200" baseline="0">
+                <a:solidFill>
+                  <a:schemeClr val="tx1">
+                    <a:tint val="75000"/>
+                  </a:schemeClr>
+                </a:solidFill>
+                <a:latin typeface="+mn-lt"/>
+                <a:ea typeface="+mn-ea"/>
+                <a:cs typeface="+mn-cs"/>
+              </a:defRPr>
+            </a:lvl8pPr>
+            <a:lvl9pPr marL="4876678" indent="0" algn="l" defTabSz="914400" rtl="0" eaLnBrk="1" latinLnBrk="0" hangingPunct="1">
+              <a:spcBef>
+                <a:spcPts val="0"/>
+              </a:spcBef>
+              <a:spcAft>
+                <a:spcPts val="1000"/>
+              </a:spcAft>
+              <a:buFont typeface="Verdana" panose="020B0604030504040204" pitchFamily="34" charset="0"/>
+              <a:buNone/>
+              <a:defRPr sz="2133" kern="1200" baseline="0">
+                <a:solidFill>
+                  <a:schemeClr val="tx1">
+                    <a:tint val="75000"/>
+                  </a:schemeClr>
+                </a:solidFill>
+                <a:latin typeface="+mn-lt"/>
+                <a:ea typeface="+mn-ea"/>
+                <a:cs typeface="+mn-cs"/>
+              </a:defRPr>
+            </a:lvl9pPr>
+          </a:lstStyle>
+          <a:p>
+            <a:pPr algn="r"/>
+            <a:r>
+              <a:rPr lang="is-IS" dirty="0">
+                <a:solidFill>
+                  <a:srgbClr val="2C5234"/>
+                </a:solidFill>
+              </a:rPr>
+              <a:t>Docker</a:t>
+            </a:r>
+          </a:p>
+          <a:p>
+            <a:pPr algn="r"/>
+            <a:r>
+              <a:rPr lang="is-IS" dirty="0">
+                <a:solidFill>
+                  <a:srgbClr val="2C5234"/>
+                </a:solidFill>
+              </a:rPr>
+              <a:t>Kubernetes</a:t>
+            </a:r>
+          </a:p>
+          <a:p>
+            <a:pPr algn="r"/>
+            <a:r>
+              <a:rPr lang="is-IS" dirty="0">
+                <a:solidFill>
+                  <a:srgbClr val="2C5234"/>
+                </a:solidFill>
+              </a:rPr>
+              <a:t>Terraform</a:t>
+            </a:r>
+            <a:endParaRPr lang="da-DK" dirty="0">
+              <a:solidFill>
+                <a:srgbClr val="2C5234"/>
+              </a:solidFill>
+            </a:endParaRPr>
+          </a:p>
+        </p:txBody>
+      </p:sp>
     </p:spTree>
     <p:extLst>
       <p:ext uri="{BB962C8B-B14F-4D97-AF65-F5344CB8AC3E}">
-        <p14:creationId xmlns:p14="http://schemas.microsoft.com/office/powerpoint/2010/main" val="2948531841"/>
+        <p14:creationId xmlns:p14="http://schemas.microsoft.com/office/powerpoint/2010/main" val="4269435591"/>
       </p:ext>
     </p:extLst>
   </p:cSld>
   <p:clrMapOvr>
     <a:masterClrMapping/>
   </p:clrMapOvr>
-  <mc:AlternateContent xmlns:mc="http://schemas.openxmlformats.org/markup-compatibility/2006" xmlns:p14="http://schemas.microsoft.com/office/powerpoint/2010/main">
-    <mc:Choice Requires="p14">
-      <p:transition p14:dur="0"/>
+  <mc:AlternateContent xmlns:mc="http://schemas.openxmlformats.org/markup-compatibility/2006" xmlns:p159="http://schemas.microsoft.com/office/powerpoint/2015/09/main">
+    <mc:Choice Requires="p159">
+      <p:transition spd="slow">
+        <p159:morph option="byObject"/>
+      </p:transition>
     </mc:Choice>
     <mc:Fallback xmlns="">
-      <p:transition/>
+      <p:transition spd="slow">
+        <p:fade/>
+      </p:transition>
     </mc:Fallback>
   </mc:AlternateContent>
 </p:sld>
@@ -21194,10 +21484,10 @@
       </p:grpSpPr>
       <p:sp>
         <p:nvSpPr>
-          <p:cNvPr id="6" name="Title 5">
+          <p:cNvPr id="14" name="Text Placeholder 13">
             <a:extLst>
               <a:ext uri="{FF2B5EF4-FFF2-40B4-BE49-F238E27FC236}">
-                <a16:creationId xmlns:a16="http://schemas.microsoft.com/office/drawing/2014/main" id="{991C4C60-D549-4836-B4EA-770904367F52}"/>
+                <a16:creationId xmlns:a16="http://schemas.microsoft.com/office/drawing/2014/main" id="{CEBEB6DB-5DC1-42DA-A441-0E6F2D6B4E99}"/>
               </a:ext>
             </a:extLst>
           </p:cNvPr>
@@ -21205,58 +21495,91 @@
             <a:spLocks noGrp="1"/>
           </p:cNvSpPr>
           <p:nvPr>
-            <p:ph type="title"/>
+            <p:ph type="body" sz="quarter" idx="10"/>
           </p:nvPr>
         </p:nvSpPr>
-        <p:spPr/>
+        <p:spPr>
+          <a:xfrm>
+            <a:off x="480484" y="1590675"/>
+            <a:ext cx="5846574" cy="4708525"/>
+          </a:xfrm>
+        </p:spPr>
         <p:txBody>
           <a:bodyPr/>
           <a:lstStyle/>
           <a:p>
+            <a:pPr marL="571500" indent="-571500">
+              <a:buFont typeface="Arial" panose="020B0604020202020204" pitchFamily="34" charset="0"/>
+              <a:buChar char="•"/>
+            </a:pPr>
             <a:r>
               <a:rPr lang="is-IS" dirty="0"/>
-              <a:t>Terraform – Instead of using the GUI</a:t>
+              <a:t>Focused purpose</a:t>
+            </a:r>
+          </a:p>
+          <a:p>
+            <a:pPr marL="571500" indent="-571500">
+              <a:buFont typeface="Arial" panose="020B0604020202020204" pitchFamily="34" charset="0"/>
+              <a:buChar char="•"/>
+            </a:pPr>
+            <a:r>
+              <a:rPr lang="is-IS" dirty="0"/>
+              <a:t>Stateless</a:t>
+            </a:r>
+          </a:p>
+          <a:p>
+            <a:pPr marL="571500" indent="-571500">
+              <a:buFont typeface="Arial" panose="020B0604020202020204" pitchFamily="34" charset="0"/>
+              <a:buChar char="•"/>
+            </a:pPr>
+            <a:r>
+              <a:rPr lang="is-IS" dirty="0"/>
+              <a:t>Elastic</a:t>
             </a:r>
             <a:endParaRPr lang="da-DK" dirty="0"/>
           </a:p>
         </p:txBody>
       </p:sp>
-      <p:pic>
-        <p:nvPicPr>
-          <p:cNvPr id="11" name="Picture 10">
+      <p:sp>
+        <p:nvSpPr>
+          <p:cNvPr id="12" name="Title 11">
             <a:extLst>
               <a:ext uri="{FF2B5EF4-FFF2-40B4-BE49-F238E27FC236}">
-                <a16:creationId xmlns:a16="http://schemas.microsoft.com/office/drawing/2014/main" id="{CCECAC6C-27D9-4725-BCF7-9FA166726083}"/>
+                <a16:creationId xmlns:a16="http://schemas.microsoft.com/office/drawing/2014/main" id="{E5E24B97-4DF4-4829-A6FD-A723EAB61A54}"/>
               </a:ext>
             </a:extLst>
           </p:cNvPr>
-          <p:cNvPicPr>
-            <a:picLocks noChangeAspect="1"/>
-          </p:cNvPicPr>
-          <p:nvPr/>
-        </p:nvPicPr>
-        <p:blipFill>
-          <a:blip r:embed="rId2"/>
-          <a:stretch>
-            <a:fillRect/>
-          </a:stretch>
-        </p:blipFill>
-        <p:spPr>
-          <a:xfrm>
-            <a:off x="524933" y="1328311"/>
-            <a:ext cx="5019675" cy="4829175"/>
-          </a:xfrm>
-          <a:prstGeom prst="rect">
-            <a:avLst/>
-          </a:prstGeom>
-        </p:spPr>
-      </p:pic>
-      <p:sp>
-        <p:nvSpPr>
-          <p:cNvPr id="16" name="Arrow: Chevron 15">
+          <p:cNvSpPr>
+            <a:spLocks noGrp="1"/>
+          </p:cNvSpPr>
+          <p:nvPr>
+            <p:ph type="title" idx="4294967295"/>
+          </p:nvPr>
+        </p:nvSpPr>
+        <p:spPr>
+          <a:xfrm>
+            <a:off x="480484" y="317500"/>
+            <a:ext cx="10708216" cy="698500"/>
+          </a:xfrm>
+        </p:spPr>
+        <p:txBody>
+          <a:bodyPr/>
+          <a:lstStyle/>
+          <a:p>
+            <a:r>
+              <a:rPr lang="is-IS" sz="3200" dirty="0"/>
+              <a:t>Microservices</a:t>
+            </a:r>
+            <a:endParaRPr lang="da-DK" sz="3200" dirty="0"/>
+          </a:p>
+        </p:txBody>
+      </p:sp>
+      <p:sp>
+        <p:nvSpPr>
+          <p:cNvPr id="16" name="Rectangle 15">
             <a:extLst>
               <a:ext uri="{FF2B5EF4-FFF2-40B4-BE49-F238E27FC236}">
-                <a16:creationId xmlns:a16="http://schemas.microsoft.com/office/drawing/2014/main" id="{DC38A1FE-9193-48F3-980D-C7570E0226BE}"/>
+                <a16:creationId xmlns:a16="http://schemas.microsoft.com/office/drawing/2014/main" id="{76D49961-9D66-4027-BAF6-95C05D597384}"/>
               </a:ext>
             </a:extLst>
           </p:cNvPr>
@@ -21265,13 +21588,436 @@
         </p:nvSpPr>
         <p:spPr bwMode="gray">
           <a:xfrm>
-            <a:off x="5888325" y="3105030"/>
-            <a:ext cx="705332" cy="1146412"/>
-          </a:xfrm>
-          <a:prstGeom prst="chevron">
-            <a:avLst>
-              <a:gd name="adj" fmla="val 62286"/>
-            </a:avLst>
+            <a:off x="7349772" y="698629"/>
+            <a:ext cx="3465711" cy="1832128"/>
+          </a:xfrm>
+          <a:prstGeom prst="rect">
+            <a:avLst/>
+          </a:prstGeom>
+          <a:solidFill>
+            <a:schemeClr val="accent3"/>
+          </a:solidFill>
+          <a:ln w="19050" algn="ctr">
+            <a:solidFill>
+              <a:schemeClr val="accent1"/>
+            </a:solidFill>
+            <a:miter lim="800000"/>
+            <a:headEnd/>
+            <a:tailEnd/>
+          </a:ln>
+        </p:spPr>
+        <p:txBody>
+          <a:bodyPr wrap="square" lIns="36000" tIns="0" rIns="88900" bIns="88900" rtlCol="0" anchor="t"/>
+          <a:lstStyle/>
+          <a:p>
+            <a:pPr marL="514350" indent="-514350">
+              <a:lnSpc>
+                <a:spcPct val="106000"/>
+              </a:lnSpc>
+              <a:buFont typeface="Arial" panose="020B0604020202020204" pitchFamily="34" charset="0"/>
+              <a:buChar char="•"/>
+            </a:pPr>
+            <a:r>
+              <a:rPr lang="is-IS" sz="4800" b="1" dirty="0">
+                <a:solidFill>
+                  <a:schemeClr val="bg1"/>
+                </a:solidFill>
+              </a:rPr>
+              <a:t>Order Pizza</a:t>
+            </a:r>
+          </a:p>
+          <a:p>
+            <a:pPr marL="514350" indent="-514350">
+              <a:lnSpc>
+                <a:spcPct val="106000"/>
+              </a:lnSpc>
+              <a:buFont typeface="Arial" panose="020B0604020202020204" pitchFamily="34" charset="0"/>
+              <a:buChar char="•"/>
+            </a:pPr>
+            <a:r>
+              <a:rPr lang="is-IS" sz="4800" b="1" dirty="0">
+                <a:solidFill>
+                  <a:schemeClr val="bg1"/>
+                </a:solidFill>
+              </a:rPr>
+              <a:t>Make Pizza</a:t>
+            </a:r>
+          </a:p>
+        </p:txBody>
+      </p:sp>
+      <p:grpSp>
+        <p:nvGrpSpPr>
+          <p:cNvPr id="20" name="Group 19">
+            <a:extLst>
+              <a:ext uri="{FF2B5EF4-FFF2-40B4-BE49-F238E27FC236}">
+                <a16:creationId xmlns:a16="http://schemas.microsoft.com/office/drawing/2014/main" id="{5F803459-E889-4510-BDD8-45DF28AEFD5C}"/>
+              </a:ext>
+            </a:extLst>
+          </p:cNvPr>
+          <p:cNvGrpSpPr/>
+          <p:nvPr/>
+        </p:nvGrpSpPr>
+        <p:grpSpPr>
+          <a:xfrm>
+            <a:off x="7044972" y="4593866"/>
+            <a:ext cx="1922047" cy="801841"/>
+            <a:chOff x="6956482" y="3944937"/>
+            <a:chExt cx="1922047" cy="801841"/>
+          </a:xfrm>
+        </p:grpSpPr>
+        <p:sp>
+          <p:nvSpPr>
+            <p:cNvPr id="19" name="Rectangle 18">
+              <a:extLst>
+                <a:ext uri="{FF2B5EF4-FFF2-40B4-BE49-F238E27FC236}">
+                  <a16:creationId xmlns:a16="http://schemas.microsoft.com/office/drawing/2014/main" id="{9A6A24B3-592A-4C4B-AF54-0EF3884787AC}"/>
+                </a:ext>
+              </a:extLst>
+            </p:cNvPr>
+            <p:cNvSpPr/>
+            <p:nvPr/>
+          </p:nvSpPr>
+          <p:spPr bwMode="gray">
+            <a:xfrm>
+              <a:off x="7261282" y="4249737"/>
+              <a:ext cx="1617247" cy="497041"/>
+            </a:xfrm>
+            <a:prstGeom prst="rect">
+              <a:avLst/>
+            </a:prstGeom>
+            <a:solidFill>
+              <a:schemeClr val="accent3"/>
+            </a:solidFill>
+            <a:ln w="19050" algn="ctr">
+              <a:solidFill>
+                <a:schemeClr val="accent1"/>
+              </a:solidFill>
+              <a:miter lim="800000"/>
+              <a:headEnd/>
+              <a:tailEnd/>
+            </a:ln>
+          </p:spPr>
+          <p:txBody>
+            <a:bodyPr wrap="square" lIns="36000" tIns="0" rIns="88900" bIns="88900" rtlCol="0" anchor="t"/>
+            <a:lstStyle/>
+            <a:p>
+              <a:pPr>
+                <a:lnSpc>
+                  <a:spcPct val="106000"/>
+                </a:lnSpc>
+              </a:pPr>
+              <a:r>
+                <a:rPr lang="is-IS" sz="2400" b="1" dirty="0">
+                  <a:solidFill>
+                    <a:schemeClr val="bg1"/>
+                  </a:solidFill>
+                </a:rPr>
+                <a:t>Order pizza</a:t>
+              </a:r>
+            </a:p>
+          </p:txBody>
+        </p:sp>
+        <p:sp>
+          <p:nvSpPr>
+            <p:cNvPr id="18" name="Rectangle 17">
+              <a:extLst>
+                <a:ext uri="{FF2B5EF4-FFF2-40B4-BE49-F238E27FC236}">
+                  <a16:creationId xmlns:a16="http://schemas.microsoft.com/office/drawing/2014/main" id="{D8D68291-345D-474E-AE1E-9E945291C16F}"/>
+                </a:ext>
+              </a:extLst>
+            </p:cNvPr>
+            <p:cNvSpPr/>
+            <p:nvPr/>
+          </p:nvSpPr>
+          <p:spPr bwMode="gray">
+            <a:xfrm>
+              <a:off x="7108882" y="4097337"/>
+              <a:ext cx="1617247" cy="497041"/>
+            </a:xfrm>
+            <a:prstGeom prst="rect">
+              <a:avLst/>
+            </a:prstGeom>
+            <a:solidFill>
+              <a:schemeClr val="accent3"/>
+            </a:solidFill>
+            <a:ln w="19050" algn="ctr">
+              <a:solidFill>
+                <a:schemeClr val="accent1"/>
+              </a:solidFill>
+              <a:miter lim="800000"/>
+              <a:headEnd/>
+              <a:tailEnd/>
+            </a:ln>
+          </p:spPr>
+          <p:txBody>
+            <a:bodyPr wrap="square" lIns="36000" tIns="0" rIns="88900" bIns="88900" rtlCol="0" anchor="t"/>
+            <a:lstStyle/>
+            <a:p>
+              <a:pPr>
+                <a:lnSpc>
+                  <a:spcPct val="106000"/>
+                </a:lnSpc>
+              </a:pPr>
+              <a:r>
+                <a:rPr lang="is-IS" sz="2400" b="1" dirty="0">
+                  <a:solidFill>
+                    <a:schemeClr val="bg1"/>
+                  </a:solidFill>
+                </a:rPr>
+                <a:t>Order pizza</a:t>
+              </a:r>
+            </a:p>
+          </p:txBody>
+        </p:sp>
+        <p:sp>
+          <p:nvSpPr>
+            <p:cNvPr id="17" name="Rectangle 16">
+              <a:extLst>
+                <a:ext uri="{FF2B5EF4-FFF2-40B4-BE49-F238E27FC236}">
+                  <a16:creationId xmlns:a16="http://schemas.microsoft.com/office/drawing/2014/main" id="{30AC64B1-5BA6-4FDB-923E-5BC0E3ED8F14}"/>
+                </a:ext>
+              </a:extLst>
+            </p:cNvPr>
+            <p:cNvSpPr/>
+            <p:nvPr/>
+          </p:nvSpPr>
+          <p:spPr bwMode="gray">
+            <a:xfrm>
+              <a:off x="6956482" y="3944937"/>
+              <a:ext cx="1617247" cy="497041"/>
+            </a:xfrm>
+            <a:prstGeom prst="rect">
+              <a:avLst/>
+            </a:prstGeom>
+            <a:solidFill>
+              <a:schemeClr val="accent3"/>
+            </a:solidFill>
+            <a:ln w="19050" algn="ctr">
+              <a:solidFill>
+                <a:schemeClr val="accent1"/>
+              </a:solidFill>
+              <a:miter lim="800000"/>
+              <a:headEnd/>
+              <a:tailEnd/>
+            </a:ln>
+          </p:spPr>
+          <p:txBody>
+            <a:bodyPr wrap="square" lIns="36000" tIns="0" rIns="88900" bIns="88900" rtlCol="0" anchor="t"/>
+            <a:lstStyle/>
+            <a:p>
+              <a:pPr>
+                <a:lnSpc>
+                  <a:spcPct val="106000"/>
+                </a:lnSpc>
+              </a:pPr>
+              <a:r>
+                <a:rPr lang="is-IS" sz="2400" b="1" dirty="0">
+                  <a:solidFill>
+                    <a:schemeClr val="bg1"/>
+                  </a:solidFill>
+                </a:rPr>
+                <a:t>Order pizza</a:t>
+              </a:r>
+            </a:p>
+          </p:txBody>
+        </p:sp>
+      </p:grpSp>
+      <p:grpSp>
+        <p:nvGrpSpPr>
+          <p:cNvPr id="21" name="Group 20">
+            <a:extLst>
+              <a:ext uri="{FF2B5EF4-FFF2-40B4-BE49-F238E27FC236}">
+                <a16:creationId xmlns:a16="http://schemas.microsoft.com/office/drawing/2014/main" id="{86FB8F4A-5840-4652-8EE6-213D828D4E62}"/>
+              </a:ext>
+            </a:extLst>
+          </p:cNvPr>
+          <p:cNvGrpSpPr/>
+          <p:nvPr/>
+        </p:nvGrpSpPr>
+        <p:grpSpPr>
+          <a:xfrm>
+            <a:off x="9444043" y="4593866"/>
+            <a:ext cx="1922047" cy="801841"/>
+            <a:chOff x="6956482" y="3944937"/>
+            <a:chExt cx="1922047" cy="801841"/>
+          </a:xfrm>
+        </p:grpSpPr>
+        <p:sp>
+          <p:nvSpPr>
+            <p:cNvPr id="22" name="Rectangle 21">
+              <a:extLst>
+                <a:ext uri="{FF2B5EF4-FFF2-40B4-BE49-F238E27FC236}">
+                  <a16:creationId xmlns:a16="http://schemas.microsoft.com/office/drawing/2014/main" id="{FA7E9A90-C64D-44E8-B142-99459D0F6AE9}"/>
+                </a:ext>
+              </a:extLst>
+            </p:cNvPr>
+            <p:cNvSpPr/>
+            <p:nvPr/>
+          </p:nvSpPr>
+          <p:spPr bwMode="gray">
+            <a:xfrm>
+              <a:off x="7261282" y="4249737"/>
+              <a:ext cx="1617247" cy="497041"/>
+            </a:xfrm>
+            <a:prstGeom prst="rect">
+              <a:avLst/>
+            </a:prstGeom>
+            <a:solidFill>
+              <a:schemeClr val="accent3"/>
+            </a:solidFill>
+            <a:ln w="19050" algn="ctr">
+              <a:solidFill>
+                <a:schemeClr val="accent1"/>
+              </a:solidFill>
+              <a:miter lim="800000"/>
+              <a:headEnd/>
+              <a:tailEnd/>
+            </a:ln>
+          </p:spPr>
+          <p:txBody>
+            <a:bodyPr wrap="square" lIns="36000" tIns="0" rIns="88900" bIns="88900" rtlCol="0" anchor="t"/>
+            <a:lstStyle/>
+            <a:p>
+              <a:pPr>
+                <a:lnSpc>
+                  <a:spcPct val="106000"/>
+                </a:lnSpc>
+              </a:pPr>
+              <a:r>
+                <a:rPr lang="is-IS" sz="2400" b="1" dirty="0">
+                  <a:solidFill>
+                    <a:schemeClr val="bg1"/>
+                  </a:solidFill>
+                </a:rPr>
+                <a:t>Order pizza</a:t>
+              </a:r>
+            </a:p>
+          </p:txBody>
+        </p:sp>
+        <p:sp>
+          <p:nvSpPr>
+            <p:cNvPr id="23" name="Rectangle 22">
+              <a:extLst>
+                <a:ext uri="{FF2B5EF4-FFF2-40B4-BE49-F238E27FC236}">
+                  <a16:creationId xmlns:a16="http://schemas.microsoft.com/office/drawing/2014/main" id="{3D7E034D-715B-460F-B8E6-7CBA1475AAD1}"/>
+                </a:ext>
+              </a:extLst>
+            </p:cNvPr>
+            <p:cNvSpPr/>
+            <p:nvPr/>
+          </p:nvSpPr>
+          <p:spPr bwMode="gray">
+            <a:xfrm>
+              <a:off x="7108882" y="4097337"/>
+              <a:ext cx="1617247" cy="497041"/>
+            </a:xfrm>
+            <a:prstGeom prst="rect">
+              <a:avLst/>
+            </a:prstGeom>
+            <a:solidFill>
+              <a:schemeClr val="accent3"/>
+            </a:solidFill>
+            <a:ln w="19050" algn="ctr">
+              <a:solidFill>
+                <a:schemeClr val="accent1"/>
+              </a:solidFill>
+              <a:miter lim="800000"/>
+              <a:headEnd/>
+              <a:tailEnd/>
+            </a:ln>
+          </p:spPr>
+          <p:txBody>
+            <a:bodyPr wrap="square" lIns="36000" tIns="0" rIns="88900" bIns="88900" rtlCol="0" anchor="t"/>
+            <a:lstStyle/>
+            <a:p>
+              <a:pPr>
+                <a:lnSpc>
+                  <a:spcPct val="106000"/>
+                </a:lnSpc>
+              </a:pPr>
+              <a:r>
+                <a:rPr lang="is-IS" sz="2400" b="1" dirty="0">
+                  <a:solidFill>
+                    <a:schemeClr val="bg1"/>
+                  </a:solidFill>
+                </a:rPr>
+                <a:t>Order pizza</a:t>
+              </a:r>
+            </a:p>
+          </p:txBody>
+        </p:sp>
+        <p:sp>
+          <p:nvSpPr>
+            <p:cNvPr id="24" name="Rectangle 23">
+              <a:extLst>
+                <a:ext uri="{FF2B5EF4-FFF2-40B4-BE49-F238E27FC236}">
+                  <a16:creationId xmlns:a16="http://schemas.microsoft.com/office/drawing/2014/main" id="{02A85207-A48D-4188-B3D8-29E6BED2472A}"/>
+                </a:ext>
+              </a:extLst>
+            </p:cNvPr>
+            <p:cNvSpPr/>
+            <p:nvPr/>
+          </p:nvSpPr>
+          <p:spPr bwMode="gray">
+            <a:xfrm>
+              <a:off x="6956482" y="3944937"/>
+              <a:ext cx="1617247" cy="497041"/>
+            </a:xfrm>
+            <a:prstGeom prst="rect">
+              <a:avLst/>
+            </a:prstGeom>
+            <a:solidFill>
+              <a:schemeClr val="accent3"/>
+            </a:solidFill>
+            <a:ln w="19050" algn="ctr">
+              <a:solidFill>
+                <a:schemeClr val="accent1"/>
+              </a:solidFill>
+              <a:miter lim="800000"/>
+              <a:headEnd/>
+              <a:tailEnd/>
+            </a:ln>
+          </p:spPr>
+          <p:txBody>
+            <a:bodyPr wrap="square" lIns="36000" tIns="0" rIns="88900" bIns="88900" rtlCol="0" anchor="t"/>
+            <a:lstStyle/>
+            <a:p>
+              <a:pPr>
+                <a:lnSpc>
+                  <a:spcPct val="106000"/>
+                </a:lnSpc>
+              </a:pPr>
+              <a:r>
+                <a:rPr lang="is-IS" sz="2400" b="1" dirty="0">
+                  <a:solidFill>
+                    <a:schemeClr val="bg1"/>
+                  </a:solidFill>
+                </a:rPr>
+                <a:t>Make pizza</a:t>
+              </a:r>
+            </a:p>
+          </p:txBody>
+        </p:sp>
+      </p:grpSp>
+      <p:sp>
+        <p:nvSpPr>
+          <p:cNvPr id="25" name="Arrow: Down 24">
+            <a:extLst>
+              <a:ext uri="{FF2B5EF4-FFF2-40B4-BE49-F238E27FC236}">
+                <a16:creationId xmlns:a16="http://schemas.microsoft.com/office/drawing/2014/main" id="{6E6C5732-D41E-4C9A-8057-74206CC710C0}"/>
+              </a:ext>
+            </a:extLst>
+          </p:cNvPr>
+          <p:cNvSpPr/>
+          <p:nvPr/>
+        </p:nvSpPr>
+        <p:spPr bwMode="gray">
+          <a:xfrm>
+            <a:off x="8858943" y="3111910"/>
+            <a:ext cx="447368" cy="766916"/>
+          </a:xfrm>
+          <a:prstGeom prst="downArrow">
+            <a:avLst/>
           </a:prstGeom>
           <a:solidFill>
             <a:schemeClr val="accent3"/>
@@ -21302,39 +22048,10 @@
           </a:p>
         </p:txBody>
       </p:sp>
-      <p:pic>
-        <p:nvPicPr>
-          <p:cNvPr id="3" name="Picture 2">
-            <a:extLst>
-              <a:ext uri="{FF2B5EF4-FFF2-40B4-BE49-F238E27FC236}">
-                <a16:creationId xmlns:a16="http://schemas.microsoft.com/office/drawing/2014/main" id="{88720707-6D7B-4382-95CD-40E75001BCB4}"/>
-              </a:ext>
-            </a:extLst>
-          </p:cNvPr>
-          <p:cNvPicPr>
-            <a:picLocks noChangeAspect="1"/>
-          </p:cNvPicPr>
-          <p:nvPr/>
-        </p:nvPicPr>
-        <p:blipFill rotWithShape="1">
-          <a:blip r:embed="rId3"/>
-          <a:srcRect t="32380"/>
-          <a:stretch/>
-        </p:blipFill>
-        <p:spPr>
-          <a:xfrm>
-            <a:off x="6937374" y="2158205"/>
-            <a:ext cx="4038600" cy="3040061"/>
-          </a:xfrm>
-          <a:prstGeom prst="rect">
-            <a:avLst/>
-          </a:prstGeom>
-        </p:spPr>
-      </p:pic>
     </p:spTree>
     <p:extLst>
       <p:ext uri="{BB962C8B-B14F-4D97-AF65-F5344CB8AC3E}">
-        <p14:creationId xmlns:p14="http://schemas.microsoft.com/office/powerpoint/2010/main" val="4133261997"/>
+        <p14:creationId xmlns:p14="http://schemas.microsoft.com/office/powerpoint/2010/main" val="3940561390"/>
       </p:ext>
     </p:extLst>
   </p:cSld>
@@ -21357,400 +22074,6 @@
 </file>
 
 <file path=ppt/slides/slide4.xml><?xml version="1.0" encoding="utf-8"?>
-<p:sld xmlns:a="http://schemas.openxmlformats.org/drawingml/2006/main" xmlns:r="http://schemas.openxmlformats.org/officeDocument/2006/relationships" xmlns:p="http://schemas.openxmlformats.org/presentationml/2006/main">
-  <p:cSld>
-    <p:spTree>
-      <p:nvGrpSpPr>
-        <p:cNvPr id="1" name=""/>
-        <p:cNvGrpSpPr/>
-        <p:nvPr/>
-      </p:nvGrpSpPr>
-      <p:grpSpPr>
-        <a:xfrm>
-          <a:off x="0" y="0"/>
-          <a:ext cx="0" cy="0"/>
-          <a:chOff x="0" y="0"/>
-          <a:chExt cx="0" cy="0"/>
-        </a:xfrm>
-      </p:grpSpPr>
-      <p:sp>
-        <p:nvSpPr>
-          <p:cNvPr id="6" name="Title 5">
-            <a:extLst>
-              <a:ext uri="{FF2B5EF4-FFF2-40B4-BE49-F238E27FC236}">
-                <a16:creationId xmlns:a16="http://schemas.microsoft.com/office/drawing/2014/main" id="{991C4C60-D549-4836-B4EA-770904367F52}"/>
-              </a:ext>
-            </a:extLst>
-          </p:cNvPr>
-          <p:cNvSpPr>
-            <a:spLocks noGrp="1"/>
-          </p:cNvSpPr>
-          <p:nvPr>
-            <p:ph type="title"/>
-          </p:nvPr>
-        </p:nvSpPr>
-        <p:spPr/>
-        <p:txBody>
-          <a:bodyPr/>
-          <a:lstStyle/>
-          <a:p>
-            <a:r>
-              <a:rPr lang="is-IS" dirty="0"/>
-              <a:t>Terraform – Instead of using the GUI</a:t>
-            </a:r>
-            <a:endParaRPr lang="da-DK" dirty="0"/>
-          </a:p>
-        </p:txBody>
-      </p:sp>
-      <p:pic>
-        <p:nvPicPr>
-          <p:cNvPr id="11" name="Picture 10">
-            <a:extLst>
-              <a:ext uri="{FF2B5EF4-FFF2-40B4-BE49-F238E27FC236}">
-                <a16:creationId xmlns:a16="http://schemas.microsoft.com/office/drawing/2014/main" id="{CCECAC6C-27D9-4725-BCF7-9FA166726083}"/>
-              </a:ext>
-            </a:extLst>
-          </p:cNvPr>
-          <p:cNvPicPr>
-            <a:picLocks noChangeAspect="1"/>
-          </p:cNvPicPr>
-          <p:nvPr/>
-        </p:nvPicPr>
-        <p:blipFill>
-          <a:blip r:embed="rId2"/>
-          <a:stretch>
-            <a:fillRect/>
-          </a:stretch>
-        </p:blipFill>
-        <p:spPr>
-          <a:xfrm>
-            <a:off x="524933" y="1328311"/>
-            <a:ext cx="5019675" cy="4829175"/>
-          </a:xfrm>
-          <a:prstGeom prst="rect">
-            <a:avLst/>
-          </a:prstGeom>
-        </p:spPr>
-      </p:pic>
-      <p:sp>
-        <p:nvSpPr>
-          <p:cNvPr id="16" name="Arrow: Chevron 15">
-            <a:extLst>
-              <a:ext uri="{FF2B5EF4-FFF2-40B4-BE49-F238E27FC236}">
-                <a16:creationId xmlns:a16="http://schemas.microsoft.com/office/drawing/2014/main" id="{DC38A1FE-9193-48F3-980D-C7570E0226BE}"/>
-              </a:ext>
-            </a:extLst>
-          </p:cNvPr>
-          <p:cNvSpPr/>
-          <p:nvPr/>
-        </p:nvSpPr>
-        <p:spPr bwMode="gray">
-          <a:xfrm>
-            <a:off x="5888325" y="3105030"/>
-            <a:ext cx="705332" cy="1146412"/>
-          </a:xfrm>
-          <a:prstGeom prst="chevron">
-            <a:avLst>
-              <a:gd name="adj" fmla="val 62286"/>
-            </a:avLst>
-          </a:prstGeom>
-          <a:solidFill>
-            <a:schemeClr val="accent3"/>
-          </a:solidFill>
-          <a:ln w="19050" algn="ctr">
-            <a:noFill/>
-            <a:miter lim="800000"/>
-            <a:headEnd/>
-            <a:tailEnd/>
-          </a:ln>
-        </p:spPr>
-        <p:txBody>
-          <a:bodyPr wrap="square" lIns="88900" tIns="88900" rIns="88900" bIns="88900" rtlCol="0" anchor="ctr"/>
-          <a:lstStyle/>
-          <a:p>
-            <a:pPr algn="ctr">
-              <a:lnSpc>
-                <a:spcPct val="106000"/>
-              </a:lnSpc>
-              <a:buFont typeface="Wingdings 2" pitchFamily="18" charset="2"/>
-              <a:buNone/>
-            </a:pPr>
-            <a:endParaRPr lang="da-DK" sz="1600" b="1" dirty="0">
-              <a:solidFill>
-                <a:schemeClr val="bg1"/>
-              </a:solidFill>
-            </a:endParaRPr>
-          </a:p>
-        </p:txBody>
-      </p:sp>
-      <p:pic>
-        <p:nvPicPr>
-          <p:cNvPr id="3" name="Picture 2">
-            <a:extLst>
-              <a:ext uri="{FF2B5EF4-FFF2-40B4-BE49-F238E27FC236}">
-                <a16:creationId xmlns:a16="http://schemas.microsoft.com/office/drawing/2014/main" id="{88720707-6D7B-4382-95CD-40E75001BCB4}"/>
-              </a:ext>
-            </a:extLst>
-          </p:cNvPr>
-          <p:cNvPicPr>
-            <a:picLocks noChangeAspect="1"/>
-          </p:cNvPicPr>
-          <p:nvPr/>
-        </p:nvPicPr>
-        <p:blipFill>
-          <a:blip r:embed="rId3"/>
-          <a:stretch>
-            <a:fillRect/>
-          </a:stretch>
-        </p:blipFill>
-        <p:spPr>
-          <a:xfrm>
-            <a:off x="6937374" y="1430336"/>
-            <a:ext cx="4038600" cy="4495800"/>
-          </a:xfrm>
-          <a:prstGeom prst="rect">
-            <a:avLst/>
-          </a:prstGeom>
-        </p:spPr>
-      </p:pic>
-    </p:spTree>
-    <p:extLst>
-      <p:ext uri="{BB962C8B-B14F-4D97-AF65-F5344CB8AC3E}">
-        <p14:creationId xmlns:p14="http://schemas.microsoft.com/office/powerpoint/2010/main" val="557562315"/>
-      </p:ext>
-    </p:extLst>
-  </p:cSld>
-  <p:clrMapOvr>
-    <a:masterClrMapping/>
-  </p:clrMapOvr>
-  <mc:AlternateContent xmlns:mc="http://schemas.openxmlformats.org/markup-compatibility/2006" xmlns:p159="http://schemas.microsoft.com/office/powerpoint/2015/09/main">
-    <mc:Choice Requires="p159">
-      <p:transition spd="slow">
-        <p159:morph option="byObject"/>
-      </p:transition>
-    </mc:Choice>
-    <mc:Fallback xmlns="">
-      <p:transition spd="slow">
-        <p:fade/>
-      </p:transition>
-    </mc:Fallback>
-  </mc:AlternateContent>
-</p:sld>
-</file>
-
-<file path=ppt/slides/slide5.xml><?xml version="1.0" encoding="utf-8"?>
-<p:sld xmlns:a="http://schemas.openxmlformats.org/drawingml/2006/main" xmlns:r="http://schemas.openxmlformats.org/officeDocument/2006/relationships" xmlns:p="http://schemas.openxmlformats.org/presentationml/2006/main">
-  <p:cSld>
-    <p:spTree>
-      <p:nvGrpSpPr>
-        <p:cNvPr id="1" name=""/>
-        <p:cNvGrpSpPr/>
-        <p:nvPr/>
-      </p:nvGrpSpPr>
-      <p:grpSpPr>
-        <a:xfrm>
-          <a:off x="0" y="0"/>
-          <a:ext cx="0" cy="0"/>
-          <a:chOff x="0" y="0"/>
-          <a:chExt cx="0" cy="0"/>
-        </a:xfrm>
-      </p:grpSpPr>
-      <p:sp>
-        <p:nvSpPr>
-          <p:cNvPr id="6" name="Title 5">
-            <a:extLst>
-              <a:ext uri="{FF2B5EF4-FFF2-40B4-BE49-F238E27FC236}">
-                <a16:creationId xmlns:a16="http://schemas.microsoft.com/office/drawing/2014/main" id="{991C4C60-D549-4836-B4EA-770904367F52}"/>
-              </a:ext>
-            </a:extLst>
-          </p:cNvPr>
-          <p:cNvSpPr>
-            <a:spLocks noGrp="1"/>
-          </p:cNvSpPr>
-          <p:nvPr>
-            <p:ph type="title"/>
-          </p:nvPr>
-        </p:nvSpPr>
-        <p:spPr/>
-        <p:txBody>
-          <a:bodyPr/>
-          <a:lstStyle/>
-          <a:p>
-            <a:r>
-              <a:rPr lang="is-IS" dirty="0"/>
-              <a:t>Terraform – Instead of using the GUI</a:t>
-            </a:r>
-            <a:endParaRPr lang="da-DK" dirty="0"/>
-          </a:p>
-        </p:txBody>
-      </p:sp>
-      <p:pic>
-        <p:nvPicPr>
-          <p:cNvPr id="11" name="Picture 10">
-            <a:extLst>
-              <a:ext uri="{FF2B5EF4-FFF2-40B4-BE49-F238E27FC236}">
-                <a16:creationId xmlns:a16="http://schemas.microsoft.com/office/drawing/2014/main" id="{CCECAC6C-27D9-4725-BCF7-9FA166726083}"/>
-              </a:ext>
-            </a:extLst>
-          </p:cNvPr>
-          <p:cNvPicPr>
-            <a:picLocks noChangeAspect="1"/>
-          </p:cNvPicPr>
-          <p:nvPr/>
-        </p:nvPicPr>
-        <p:blipFill>
-          <a:blip r:embed="rId2"/>
-          <a:stretch>
-            <a:fillRect/>
-          </a:stretch>
-        </p:blipFill>
-        <p:spPr>
-          <a:xfrm>
-            <a:off x="524933" y="1328311"/>
-            <a:ext cx="5019675" cy="4829175"/>
-          </a:xfrm>
-          <a:prstGeom prst="rect">
-            <a:avLst/>
-          </a:prstGeom>
-        </p:spPr>
-      </p:pic>
-      <p:sp>
-        <p:nvSpPr>
-          <p:cNvPr id="16" name="Arrow: Chevron 15">
-            <a:extLst>
-              <a:ext uri="{FF2B5EF4-FFF2-40B4-BE49-F238E27FC236}">
-                <a16:creationId xmlns:a16="http://schemas.microsoft.com/office/drawing/2014/main" id="{DC38A1FE-9193-48F3-980D-C7570E0226BE}"/>
-              </a:ext>
-            </a:extLst>
-          </p:cNvPr>
-          <p:cNvSpPr/>
-          <p:nvPr/>
-        </p:nvSpPr>
-        <p:spPr bwMode="gray">
-          <a:xfrm>
-            <a:off x="5888325" y="3105030"/>
-            <a:ext cx="705332" cy="1146412"/>
-          </a:xfrm>
-          <a:prstGeom prst="chevron">
-            <a:avLst>
-              <a:gd name="adj" fmla="val 62286"/>
-            </a:avLst>
-          </a:prstGeom>
-          <a:solidFill>
-            <a:schemeClr val="accent3"/>
-          </a:solidFill>
-          <a:ln w="19050" algn="ctr">
-            <a:noFill/>
-            <a:miter lim="800000"/>
-            <a:headEnd/>
-            <a:tailEnd/>
-          </a:ln>
-        </p:spPr>
-        <p:txBody>
-          <a:bodyPr wrap="square" lIns="88900" tIns="88900" rIns="88900" bIns="88900" rtlCol="0" anchor="ctr"/>
-          <a:lstStyle/>
-          <a:p>
-            <a:pPr algn="ctr">
-              <a:lnSpc>
-                <a:spcPct val="106000"/>
-              </a:lnSpc>
-              <a:buFont typeface="Wingdings 2" pitchFamily="18" charset="2"/>
-              <a:buNone/>
-            </a:pPr>
-            <a:endParaRPr lang="da-DK" sz="1600" b="1" dirty="0">
-              <a:solidFill>
-                <a:schemeClr val="bg1"/>
-              </a:solidFill>
-            </a:endParaRPr>
-          </a:p>
-        </p:txBody>
-      </p:sp>
-      <p:pic>
-        <p:nvPicPr>
-          <p:cNvPr id="3" name="Picture 2">
-            <a:extLst>
-              <a:ext uri="{FF2B5EF4-FFF2-40B4-BE49-F238E27FC236}">
-                <a16:creationId xmlns:a16="http://schemas.microsoft.com/office/drawing/2014/main" id="{88720707-6D7B-4382-95CD-40E75001BCB4}"/>
-              </a:ext>
-            </a:extLst>
-          </p:cNvPr>
-          <p:cNvPicPr>
-            <a:picLocks noChangeAspect="1"/>
-          </p:cNvPicPr>
-          <p:nvPr/>
-        </p:nvPicPr>
-        <p:blipFill>
-          <a:blip r:embed="rId3"/>
-          <a:stretch>
-            <a:fillRect/>
-          </a:stretch>
-        </p:blipFill>
-        <p:spPr>
-          <a:xfrm>
-            <a:off x="6937374" y="1430336"/>
-            <a:ext cx="4038600" cy="4495800"/>
-          </a:xfrm>
-          <a:prstGeom prst="rect">
-            <a:avLst/>
-          </a:prstGeom>
-        </p:spPr>
-      </p:pic>
-      <p:pic>
-        <p:nvPicPr>
-          <p:cNvPr id="7" name="Picture 6">
-            <a:extLst>
-              <a:ext uri="{FF2B5EF4-FFF2-40B4-BE49-F238E27FC236}">
-                <a16:creationId xmlns:a16="http://schemas.microsoft.com/office/drawing/2014/main" id="{78DFD3DB-6378-49B0-924A-0C588CD55223}"/>
-              </a:ext>
-            </a:extLst>
-          </p:cNvPr>
-          <p:cNvPicPr>
-            <a:picLocks noChangeAspect="1"/>
-          </p:cNvPicPr>
-          <p:nvPr/>
-        </p:nvPicPr>
-        <p:blipFill>
-          <a:blip r:embed="rId4"/>
-          <a:stretch>
-            <a:fillRect/>
-          </a:stretch>
-        </p:blipFill>
-        <p:spPr>
-          <a:xfrm>
-            <a:off x="6937374" y="1430336"/>
-            <a:ext cx="4686300" cy="4524375"/>
-          </a:xfrm>
-          <a:prstGeom prst="rect">
-            <a:avLst/>
-          </a:prstGeom>
-        </p:spPr>
-      </p:pic>
-    </p:spTree>
-    <p:extLst>
-      <p:ext uri="{BB962C8B-B14F-4D97-AF65-F5344CB8AC3E}">
-        <p14:creationId xmlns:p14="http://schemas.microsoft.com/office/powerpoint/2010/main" val="4148441264"/>
-      </p:ext>
-    </p:extLst>
-  </p:cSld>
-  <p:clrMapOvr>
-    <a:masterClrMapping/>
-  </p:clrMapOvr>
-  <mc:AlternateContent xmlns:mc="http://schemas.openxmlformats.org/markup-compatibility/2006" xmlns:p159="http://schemas.microsoft.com/office/powerpoint/2015/09/main">
-    <mc:Choice Requires="p159">
-      <p:transition spd="slow">
-        <p159:morph option="byObject"/>
-      </p:transition>
-    </mc:Choice>
-    <mc:Fallback xmlns="">
-      <p:transition spd="slow">
-        <p:fade/>
-      </p:transition>
-    </mc:Fallback>
-  </mc:AlternateContent>
-</p:sld>
-</file>
-
-<file path=ppt/slides/slide6.xml><?xml version="1.0" encoding="utf-8"?>
 <p:sld xmlns:a="http://schemas.openxmlformats.org/drawingml/2006/main" xmlns:r="http://schemas.openxmlformats.org/officeDocument/2006/relationships" xmlns:p="http://schemas.openxmlformats.org/presentationml/2006/main">
   <p:cSld>
     <p:spTree>
@@ -23235,6 +23558,678 @@
     </mc:Choice>
     <mc:Fallback xmlns="">
       <p:transition/>
+    </mc:Fallback>
+  </mc:AlternateContent>
+</p:sld>
+</file>
+
+<file path=ppt/slides/slide5.xml><?xml version="1.0" encoding="utf-8"?>
+<p:sld xmlns:a="http://schemas.openxmlformats.org/drawingml/2006/main" xmlns:r="http://schemas.openxmlformats.org/officeDocument/2006/relationships" xmlns:p="http://schemas.openxmlformats.org/presentationml/2006/main">
+  <p:cSld>
+    <p:spTree>
+      <p:nvGrpSpPr>
+        <p:cNvPr id="1" name=""/>
+        <p:cNvGrpSpPr/>
+        <p:nvPr/>
+      </p:nvGrpSpPr>
+      <p:grpSpPr>
+        <a:xfrm>
+          <a:off x="0" y="0"/>
+          <a:ext cx="0" cy="0"/>
+          <a:chOff x="0" y="0"/>
+          <a:chExt cx="0" cy="0"/>
+        </a:xfrm>
+      </p:grpSpPr>
+      <p:sp>
+        <p:nvSpPr>
+          <p:cNvPr id="6" name="Title 5">
+            <a:extLst>
+              <a:ext uri="{FF2B5EF4-FFF2-40B4-BE49-F238E27FC236}">
+                <a16:creationId xmlns:a16="http://schemas.microsoft.com/office/drawing/2014/main" id="{991C4C60-D549-4836-B4EA-770904367F52}"/>
+              </a:ext>
+            </a:extLst>
+          </p:cNvPr>
+          <p:cNvSpPr>
+            <a:spLocks noGrp="1"/>
+          </p:cNvSpPr>
+          <p:nvPr>
+            <p:ph type="title"/>
+          </p:nvPr>
+        </p:nvSpPr>
+        <p:spPr/>
+        <p:txBody>
+          <a:bodyPr/>
+          <a:lstStyle/>
+          <a:p>
+            <a:r>
+              <a:rPr lang="is-IS" dirty="0"/>
+              <a:t>Terraform – Instead of using the GUI</a:t>
+            </a:r>
+            <a:endParaRPr lang="da-DK" dirty="0"/>
+          </a:p>
+        </p:txBody>
+      </p:sp>
+      <p:pic>
+        <p:nvPicPr>
+          <p:cNvPr id="11" name="Picture 10">
+            <a:extLst>
+              <a:ext uri="{FF2B5EF4-FFF2-40B4-BE49-F238E27FC236}">
+                <a16:creationId xmlns:a16="http://schemas.microsoft.com/office/drawing/2014/main" id="{CCECAC6C-27D9-4725-BCF7-9FA166726083}"/>
+              </a:ext>
+            </a:extLst>
+          </p:cNvPr>
+          <p:cNvPicPr>
+            <a:picLocks noChangeAspect="1"/>
+          </p:cNvPicPr>
+          <p:nvPr/>
+        </p:nvPicPr>
+        <p:blipFill>
+          <a:blip r:embed="rId2"/>
+          <a:stretch>
+            <a:fillRect/>
+          </a:stretch>
+        </p:blipFill>
+        <p:spPr>
+          <a:xfrm>
+            <a:off x="3586162" y="1328311"/>
+            <a:ext cx="5019675" cy="4829175"/>
+          </a:xfrm>
+          <a:prstGeom prst="rect">
+            <a:avLst/>
+          </a:prstGeom>
+        </p:spPr>
+      </p:pic>
+    </p:spTree>
+    <p:extLst>
+      <p:ext uri="{BB962C8B-B14F-4D97-AF65-F5344CB8AC3E}">
+        <p14:creationId xmlns:p14="http://schemas.microsoft.com/office/powerpoint/2010/main" val="2948531841"/>
+      </p:ext>
+    </p:extLst>
+  </p:cSld>
+  <p:clrMapOvr>
+    <a:masterClrMapping/>
+  </p:clrMapOvr>
+  <mc:AlternateContent xmlns:mc="http://schemas.openxmlformats.org/markup-compatibility/2006" xmlns:p14="http://schemas.microsoft.com/office/powerpoint/2010/main">
+    <mc:Choice Requires="p14">
+      <p:transition p14:dur="0"/>
+    </mc:Choice>
+    <mc:Fallback xmlns="">
+      <p:transition/>
+    </mc:Fallback>
+  </mc:AlternateContent>
+</p:sld>
+</file>
+
+<file path=ppt/slides/slide6.xml><?xml version="1.0" encoding="utf-8"?>
+<p:sld xmlns:a="http://schemas.openxmlformats.org/drawingml/2006/main" xmlns:r="http://schemas.openxmlformats.org/officeDocument/2006/relationships" xmlns:p="http://schemas.openxmlformats.org/presentationml/2006/main">
+  <p:cSld>
+    <p:spTree>
+      <p:nvGrpSpPr>
+        <p:cNvPr id="1" name=""/>
+        <p:cNvGrpSpPr/>
+        <p:nvPr/>
+      </p:nvGrpSpPr>
+      <p:grpSpPr>
+        <a:xfrm>
+          <a:off x="0" y="0"/>
+          <a:ext cx="0" cy="0"/>
+          <a:chOff x="0" y="0"/>
+          <a:chExt cx="0" cy="0"/>
+        </a:xfrm>
+      </p:grpSpPr>
+      <p:sp>
+        <p:nvSpPr>
+          <p:cNvPr id="6" name="Title 5">
+            <a:extLst>
+              <a:ext uri="{FF2B5EF4-FFF2-40B4-BE49-F238E27FC236}">
+                <a16:creationId xmlns:a16="http://schemas.microsoft.com/office/drawing/2014/main" id="{991C4C60-D549-4836-B4EA-770904367F52}"/>
+              </a:ext>
+            </a:extLst>
+          </p:cNvPr>
+          <p:cNvSpPr>
+            <a:spLocks noGrp="1"/>
+          </p:cNvSpPr>
+          <p:nvPr>
+            <p:ph type="title"/>
+          </p:nvPr>
+        </p:nvSpPr>
+        <p:spPr/>
+        <p:txBody>
+          <a:bodyPr/>
+          <a:lstStyle/>
+          <a:p>
+            <a:r>
+              <a:rPr lang="is-IS" dirty="0"/>
+              <a:t>Terraform – Instead of using the GUI</a:t>
+            </a:r>
+            <a:endParaRPr lang="da-DK" dirty="0"/>
+          </a:p>
+        </p:txBody>
+      </p:sp>
+      <p:pic>
+        <p:nvPicPr>
+          <p:cNvPr id="11" name="Picture 10">
+            <a:extLst>
+              <a:ext uri="{FF2B5EF4-FFF2-40B4-BE49-F238E27FC236}">
+                <a16:creationId xmlns:a16="http://schemas.microsoft.com/office/drawing/2014/main" id="{CCECAC6C-27D9-4725-BCF7-9FA166726083}"/>
+              </a:ext>
+            </a:extLst>
+          </p:cNvPr>
+          <p:cNvPicPr>
+            <a:picLocks noChangeAspect="1"/>
+          </p:cNvPicPr>
+          <p:nvPr/>
+        </p:nvPicPr>
+        <p:blipFill>
+          <a:blip r:embed="rId2"/>
+          <a:stretch>
+            <a:fillRect/>
+          </a:stretch>
+        </p:blipFill>
+        <p:spPr>
+          <a:xfrm>
+            <a:off x="524933" y="1328311"/>
+            <a:ext cx="5019675" cy="4829175"/>
+          </a:xfrm>
+          <a:prstGeom prst="rect">
+            <a:avLst/>
+          </a:prstGeom>
+        </p:spPr>
+      </p:pic>
+      <p:sp>
+        <p:nvSpPr>
+          <p:cNvPr id="16" name="Arrow: Chevron 15">
+            <a:extLst>
+              <a:ext uri="{FF2B5EF4-FFF2-40B4-BE49-F238E27FC236}">
+                <a16:creationId xmlns:a16="http://schemas.microsoft.com/office/drawing/2014/main" id="{DC38A1FE-9193-48F3-980D-C7570E0226BE}"/>
+              </a:ext>
+            </a:extLst>
+          </p:cNvPr>
+          <p:cNvSpPr/>
+          <p:nvPr/>
+        </p:nvSpPr>
+        <p:spPr bwMode="gray">
+          <a:xfrm>
+            <a:off x="5888325" y="3105030"/>
+            <a:ext cx="705332" cy="1146412"/>
+          </a:xfrm>
+          <a:prstGeom prst="chevron">
+            <a:avLst>
+              <a:gd name="adj" fmla="val 62286"/>
+            </a:avLst>
+          </a:prstGeom>
+          <a:solidFill>
+            <a:schemeClr val="accent3"/>
+          </a:solidFill>
+          <a:ln w="19050" algn="ctr">
+            <a:noFill/>
+            <a:miter lim="800000"/>
+            <a:headEnd/>
+            <a:tailEnd/>
+          </a:ln>
+        </p:spPr>
+        <p:txBody>
+          <a:bodyPr wrap="square" lIns="88900" tIns="88900" rIns="88900" bIns="88900" rtlCol="0" anchor="ctr"/>
+          <a:lstStyle/>
+          <a:p>
+            <a:pPr algn="ctr">
+              <a:lnSpc>
+                <a:spcPct val="106000"/>
+              </a:lnSpc>
+              <a:buFont typeface="Wingdings 2" pitchFamily="18" charset="2"/>
+              <a:buNone/>
+            </a:pPr>
+            <a:endParaRPr lang="da-DK" sz="1600" b="1" dirty="0">
+              <a:solidFill>
+                <a:schemeClr val="bg1"/>
+              </a:solidFill>
+            </a:endParaRPr>
+          </a:p>
+        </p:txBody>
+      </p:sp>
+      <p:pic>
+        <p:nvPicPr>
+          <p:cNvPr id="3" name="Picture 2">
+            <a:extLst>
+              <a:ext uri="{FF2B5EF4-FFF2-40B4-BE49-F238E27FC236}">
+                <a16:creationId xmlns:a16="http://schemas.microsoft.com/office/drawing/2014/main" id="{88720707-6D7B-4382-95CD-40E75001BCB4}"/>
+              </a:ext>
+            </a:extLst>
+          </p:cNvPr>
+          <p:cNvPicPr>
+            <a:picLocks noChangeAspect="1"/>
+          </p:cNvPicPr>
+          <p:nvPr/>
+        </p:nvPicPr>
+        <p:blipFill rotWithShape="1">
+          <a:blip r:embed="rId3"/>
+          <a:srcRect t="32380"/>
+          <a:stretch/>
+        </p:blipFill>
+        <p:spPr>
+          <a:xfrm>
+            <a:off x="6937374" y="2158205"/>
+            <a:ext cx="4038600" cy="3040061"/>
+          </a:xfrm>
+          <a:prstGeom prst="rect">
+            <a:avLst/>
+          </a:prstGeom>
+        </p:spPr>
+      </p:pic>
+    </p:spTree>
+    <p:extLst>
+      <p:ext uri="{BB962C8B-B14F-4D97-AF65-F5344CB8AC3E}">
+        <p14:creationId xmlns:p14="http://schemas.microsoft.com/office/powerpoint/2010/main" val="4133261997"/>
+      </p:ext>
+    </p:extLst>
+  </p:cSld>
+  <p:clrMapOvr>
+    <a:masterClrMapping/>
+  </p:clrMapOvr>
+  <mc:AlternateContent xmlns:mc="http://schemas.openxmlformats.org/markup-compatibility/2006" xmlns:p159="http://schemas.microsoft.com/office/powerpoint/2015/09/main">
+    <mc:Choice Requires="p159">
+      <p:transition spd="slow">
+        <p159:morph option="byObject"/>
+      </p:transition>
+    </mc:Choice>
+    <mc:Fallback xmlns="">
+      <p:transition spd="slow">
+        <p:fade/>
+      </p:transition>
+    </mc:Fallback>
+  </mc:AlternateContent>
+</p:sld>
+</file>
+
+<file path=ppt/slides/slide7.xml><?xml version="1.0" encoding="utf-8"?>
+<p:sld xmlns:a="http://schemas.openxmlformats.org/drawingml/2006/main" xmlns:r="http://schemas.openxmlformats.org/officeDocument/2006/relationships" xmlns:p="http://schemas.openxmlformats.org/presentationml/2006/main">
+  <p:cSld>
+    <p:spTree>
+      <p:nvGrpSpPr>
+        <p:cNvPr id="1" name=""/>
+        <p:cNvGrpSpPr/>
+        <p:nvPr/>
+      </p:nvGrpSpPr>
+      <p:grpSpPr>
+        <a:xfrm>
+          <a:off x="0" y="0"/>
+          <a:ext cx="0" cy="0"/>
+          <a:chOff x="0" y="0"/>
+          <a:chExt cx="0" cy="0"/>
+        </a:xfrm>
+      </p:grpSpPr>
+      <p:sp>
+        <p:nvSpPr>
+          <p:cNvPr id="6" name="Title 5">
+            <a:extLst>
+              <a:ext uri="{FF2B5EF4-FFF2-40B4-BE49-F238E27FC236}">
+                <a16:creationId xmlns:a16="http://schemas.microsoft.com/office/drawing/2014/main" id="{991C4C60-D549-4836-B4EA-770904367F52}"/>
+              </a:ext>
+            </a:extLst>
+          </p:cNvPr>
+          <p:cNvSpPr>
+            <a:spLocks noGrp="1"/>
+          </p:cNvSpPr>
+          <p:nvPr>
+            <p:ph type="title"/>
+          </p:nvPr>
+        </p:nvSpPr>
+        <p:spPr/>
+        <p:txBody>
+          <a:bodyPr/>
+          <a:lstStyle/>
+          <a:p>
+            <a:r>
+              <a:rPr lang="is-IS" dirty="0"/>
+              <a:t>Terraform – Instead of using the GUI</a:t>
+            </a:r>
+            <a:endParaRPr lang="da-DK" dirty="0"/>
+          </a:p>
+        </p:txBody>
+      </p:sp>
+      <p:pic>
+        <p:nvPicPr>
+          <p:cNvPr id="11" name="Picture 10">
+            <a:extLst>
+              <a:ext uri="{FF2B5EF4-FFF2-40B4-BE49-F238E27FC236}">
+                <a16:creationId xmlns:a16="http://schemas.microsoft.com/office/drawing/2014/main" id="{CCECAC6C-27D9-4725-BCF7-9FA166726083}"/>
+              </a:ext>
+            </a:extLst>
+          </p:cNvPr>
+          <p:cNvPicPr>
+            <a:picLocks noChangeAspect="1"/>
+          </p:cNvPicPr>
+          <p:nvPr/>
+        </p:nvPicPr>
+        <p:blipFill>
+          <a:blip r:embed="rId2"/>
+          <a:stretch>
+            <a:fillRect/>
+          </a:stretch>
+        </p:blipFill>
+        <p:spPr>
+          <a:xfrm>
+            <a:off x="524933" y="1328311"/>
+            <a:ext cx="5019675" cy="4829175"/>
+          </a:xfrm>
+          <a:prstGeom prst="rect">
+            <a:avLst/>
+          </a:prstGeom>
+        </p:spPr>
+      </p:pic>
+      <p:sp>
+        <p:nvSpPr>
+          <p:cNvPr id="16" name="Arrow: Chevron 15">
+            <a:extLst>
+              <a:ext uri="{FF2B5EF4-FFF2-40B4-BE49-F238E27FC236}">
+                <a16:creationId xmlns:a16="http://schemas.microsoft.com/office/drawing/2014/main" id="{DC38A1FE-9193-48F3-980D-C7570E0226BE}"/>
+              </a:ext>
+            </a:extLst>
+          </p:cNvPr>
+          <p:cNvSpPr/>
+          <p:nvPr/>
+        </p:nvSpPr>
+        <p:spPr bwMode="gray">
+          <a:xfrm>
+            <a:off x="5888325" y="3105030"/>
+            <a:ext cx="705332" cy="1146412"/>
+          </a:xfrm>
+          <a:prstGeom prst="chevron">
+            <a:avLst>
+              <a:gd name="adj" fmla="val 62286"/>
+            </a:avLst>
+          </a:prstGeom>
+          <a:solidFill>
+            <a:schemeClr val="accent3"/>
+          </a:solidFill>
+          <a:ln w="19050" algn="ctr">
+            <a:noFill/>
+            <a:miter lim="800000"/>
+            <a:headEnd/>
+            <a:tailEnd/>
+          </a:ln>
+        </p:spPr>
+        <p:txBody>
+          <a:bodyPr wrap="square" lIns="88900" tIns="88900" rIns="88900" bIns="88900" rtlCol="0" anchor="ctr"/>
+          <a:lstStyle/>
+          <a:p>
+            <a:pPr algn="ctr">
+              <a:lnSpc>
+                <a:spcPct val="106000"/>
+              </a:lnSpc>
+              <a:buFont typeface="Wingdings 2" pitchFamily="18" charset="2"/>
+              <a:buNone/>
+            </a:pPr>
+            <a:endParaRPr lang="da-DK" sz="1600" b="1" dirty="0">
+              <a:solidFill>
+                <a:schemeClr val="bg1"/>
+              </a:solidFill>
+            </a:endParaRPr>
+          </a:p>
+        </p:txBody>
+      </p:sp>
+      <p:pic>
+        <p:nvPicPr>
+          <p:cNvPr id="3" name="Picture 2">
+            <a:extLst>
+              <a:ext uri="{FF2B5EF4-FFF2-40B4-BE49-F238E27FC236}">
+                <a16:creationId xmlns:a16="http://schemas.microsoft.com/office/drawing/2014/main" id="{88720707-6D7B-4382-95CD-40E75001BCB4}"/>
+              </a:ext>
+            </a:extLst>
+          </p:cNvPr>
+          <p:cNvPicPr>
+            <a:picLocks noChangeAspect="1"/>
+          </p:cNvPicPr>
+          <p:nvPr/>
+        </p:nvPicPr>
+        <p:blipFill>
+          <a:blip r:embed="rId3"/>
+          <a:stretch>
+            <a:fillRect/>
+          </a:stretch>
+        </p:blipFill>
+        <p:spPr>
+          <a:xfrm>
+            <a:off x="6937374" y="1430336"/>
+            <a:ext cx="4038600" cy="4495800"/>
+          </a:xfrm>
+          <a:prstGeom prst="rect">
+            <a:avLst/>
+          </a:prstGeom>
+        </p:spPr>
+      </p:pic>
+    </p:spTree>
+    <p:extLst>
+      <p:ext uri="{BB962C8B-B14F-4D97-AF65-F5344CB8AC3E}">
+        <p14:creationId xmlns:p14="http://schemas.microsoft.com/office/powerpoint/2010/main" val="557562315"/>
+      </p:ext>
+    </p:extLst>
+  </p:cSld>
+  <p:clrMapOvr>
+    <a:masterClrMapping/>
+  </p:clrMapOvr>
+  <mc:AlternateContent xmlns:mc="http://schemas.openxmlformats.org/markup-compatibility/2006" xmlns:p159="http://schemas.microsoft.com/office/powerpoint/2015/09/main">
+    <mc:Choice Requires="p159">
+      <p:transition spd="slow">
+        <p159:morph option="byObject"/>
+      </p:transition>
+    </mc:Choice>
+    <mc:Fallback xmlns="">
+      <p:transition spd="slow">
+        <p:fade/>
+      </p:transition>
+    </mc:Fallback>
+  </mc:AlternateContent>
+</p:sld>
+</file>
+
+<file path=ppt/slides/slide8.xml><?xml version="1.0" encoding="utf-8"?>
+<p:sld xmlns:a="http://schemas.openxmlformats.org/drawingml/2006/main" xmlns:r="http://schemas.openxmlformats.org/officeDocument/2006/relationships" xmlns:p="http://schemas.openxmlformats.org/presentationml/2006/main">
+  <p:cSld>
+    <p:spTree>
+      <p:nvGrpSpPr>
+        <p:cNvPr id="1" name=""/>
+        <p:cNvGrpSpPr/>
+        <p:nvPr/>
+      </p:nvGrpSpPr>
+      <p:grpSpPr>
+        <a:xfrm>
+          <a:off x="0" y="0"/>
+          <a:ext cx="0" cy="0"/>
+          <a:chOff x="0" y="0"/>
+          <a:chExt cx="0" cy="0"/>
+        </a:xfrm>
+      </p:grpSpPr>
+      <p:sp>
+        <p:nvSpPr>
+          <p:cNvPr id="6" name="Title 5">
+            <a:extLst>
+              <a:ext uri="{FF2B5EF4-FFF2-40B4-BE49-F238E27FC236}">
+                <a16:creationId xmlns:a16="http://schemas.microsoft.com/office/drawing/2014/main" id="{991C4C60-D549-4836-B4EA-770904367F52}"/>
+              </a:ext>
+            </a:extLst>
+          </p:cNvPr>
+          <p:cNvSpPr>
+            <a:spLocks noGrp="1"/>
+          </p:cNvSpPr>
+          <p:nvPr>
+            <p:ph type="title"/>
+          </p:nvPr>
+        </p:nvSpPr>
+        <p:spPr/>
+        <p:txBody>
+          <a:bodyPr/>
+          <a:lstStyle/>
+          <a:p>
+            <a:r>
+              <a:rPr lang="is-IS" dirty="0"/>
+              <a:t>Terraform – Instead of using the GUI</a:t>
+            </a:r>
+            <a:endParaRPr lang="da-DK" dirty="0"/>
+          </a:p>
+        </p:txBody>
+      </p:sp>
+      <p:pic>
+        <p:nvPicPr>
+          <p:cNvPr id="11" name="Picture 10">
+            <a:extLst>
+              <a:ext uri="{FF2B5EF4-FFF2-40B4-BE49-F238E27FC236}">
+                <a16:creationId xmlns:a16="http://schemas.microsoft.com/office/drawing/2014/main" id="{CCECAC6C-27D9-4725-BCF7-9FA166726083}"/>
+              </a:ext>
+            </a:extLst>
+          </p:cNvPr>
+          <p:cNvPicPr>
+            <a:picLocks noChangeAspect="1"/>
+          </p:cNvPicPr>
+          <p:nvPr/>
+        </p:nvPicPr>
+        <p:blipFill>
+          <a:blip r:embed="rId2"/>
+          <a:stretch>
+            <a:fillRect/>
+          </a:stretch>
+        </p:blipFill>
+        <p:spPr>
+          <a:xfrm>
+            <a:off x="524933" y="1328311"/>
+            <a:ext cx="5019675" cy="4829175"/>
+          </a:xfrm>
+          <a:prstGeom prst="rect">
+            <a:avLst/>
+          </a:prstGeom>
+        </p:spPr>
+      </p:pic>
+      <p:sp>
+        <p:nvSpPr>
+          <p:cNvPr id="16" name="Arrow: Chevron 15">
+            <a:extLst>
+              <a:ext uri="{FF2B5EF4-FFF2-40B4-BE49-F238E27FC236}">
+                <a16:creationId xmlns:a16="http://schemas.microsoft.com/office/drawing/2014/main" id="{DC38A1FE-9193-48F3-980D-C7570E0226BE}"/>
+              </a:ext>
+            </a:extLst>
+          </p:cNvPr>
+          <p:cNvSpPr/>
+          <p:nvPr/>
+        </p:nvSpPr>
+        <p:spPr bwMode="gray">
+          <a:xfrm>
+            <a:off x="5888325" y="3105030"/>
+            <a:ext cx="705332" cy="1146412"/>
+          </a:xfrm>
+          <a:prstGeom prst="chevron">
+            <a:avLst>
+              <a:gd name="adj" fmla="val 62286"/>
+            </a:avLst>
+          </a:prstGeom>
+          <a:solidFill>
+            <a:schemeClr val="accent3"/>
+          </a:solidFill>
+          <a:ln w="19050" algn="ctr">
+            <a:noFill/>
+            <a:miter lim="800000"/>
+            <a:headEnd/>
+            <a:tailEnd/>
+          </a:ln>
+        </p:spPr>
+        <p:txBody>
+          <a:bodyPr wrap="square" lIns="88900" tIns="88900" rIns="88900" bIns="88900" rtlCol="0" anchor="ctr"/>
+          <a:lstStyle/>
+          <a:p>
+            <a:pPr algn="ctr">
+              <a:lnSpc>
+                <a:spcPct val="106000"/>
+              </a:lnSpc>
+              <a:buFont typeface="Wingdings 2" pitchFamily="18" charset="2"/>
+              <a:buNone/>
+            </a:pPr>
+            <a:endParaRPr lang="da-DK" sz="1600" b="1" dirty="0">
+              <a:solidFill>
+                <a:schemeClr val="bg1"/>
+              </a:solidFill>
+            </a:endParaRPr>
+          </a:p>
+        </p:txBody>
+      </p:sp>
+      <p:pic>
+        <p:nvPicPr>
+          <p:cNvPr id="3" name="Picture 2">
+            <a:extLst>
+              <a:ext uri="{FF2B5EF4-FFF2-40B4-BE49-F238E27FC236}">
+                <a16:creationId xmlns:a16="http://schemas.microsoft.com/office/drawing/2014/main" id="{88720707-6D7B-4382-95CD-40E75001BCB4}"/>
+              </a:ext>
+            </a:extLst>
+          </p:cNvPr>
+          <p:cNvPicPr>
+            <a:picLocks noChangeAspect="1"/>
+          </p:cNvPicPr>
+          <p:nvPr/>
+        </p:nvPicPr>
+        <p:blipFill>
+          <a:blip r:embed="rId3"/>
+          <a:stretch>
+            <a:fillRect/>
+          </a:stretch>
+        </p:blipFill>
+        <p:spPr>
+          <a:xfrm>
+            <a:off x="6937374" y="1430336"/>
+            <a:ext cx="4038600" cy="4495800"/>
+          </a:xfrm>
+          <a:prstGeom prst="rect">
+            <a:avLst/>
+          </a:prstGeom>
+        </p:spPr>
+      </p:pic>
+      <p:pic>
+        <p:nvPicPr>
+          <p:cNvPr id="7" name="Picture 6">
+            <a:extLst>
+              <a:ext uri="{FF2B5EF4-FFF2-40B4-BE49-F238E27FC236}">
+                <a16:creationId xmlns:a16="http://schemas.microsoft.com/office/drawing/2014/main" id="{78DFD3DB-6378-49B0-924A-0C588CD55223}"/>
+              </a:ext>
+            </a:extLst>
+          </p:cNvPr>
+          <p:cNvPicPr>
+            <a:picLocks noChangeAspect="1"/>
+          </p:cNvPicPr>
+          <p:nvPr/>
+        </p:nvPicPr>
+        <p:blipFill>
+          <a:blip r:embed="rId4"/>
+          <a:stretch>
+            <a:fillRect/>
+          </a:stretch>
+        </p:blipFill>
+        <p:spPr>
+          <a:xfrm>
+            <a:off x="6937374" y="1430336"/>
+            <a:ext cx="4686300" cy="4524375"/>
+          </a:xfrm>
+          <a:prstGeom prst="rect">
+            <a:avLst/>
+          </a:prstGeom>
+        </p:spPr>
+      </p:pic>
+    </p:spTree>
+    <p:extLst>
+      <p:ext uri="{BB962C8B-B14F-4D97-AF65-F5344CB8AC3E}">
+        <p14:creationId xmlns:p14="http://schemas.microsoft.com/office/powerpoint/2010/main" val="4148441264"/>
+      </p:ext>
+    </p:extLst>
+  </p:cSld>
+  <p:clrMapOvr>
+    <a:masterClrMapping/>
+  </p:clrMapOvr>
+  <mc:AlternateContent xmlns:mc="http://schemas.openxmlformats.org/markup-compatibility/2006" xmlns:p159="http://schemas.microsoft.com/office/powerpoint/2015/09/main">
+    <mc:Choice Requires="p159">
+      <p:transition spd="slow">
+        <p159:morph option="byObject"/>
+      </p:transition>
+    </mc:Choice>
+    <mc:Fallback xmlns="">
+      <p:transition spd="slow">
+        <p:fade/>
+      </p:transition>
     </mc:Fallback>
   </mc:AlternateContent>
 </p:sld>

</xml_diff>

<commit_message>
updating slideshow and readme
</commit_message>
<xml_diff>
--- a/Microservices from the ground up.pptx
+++ b/Microservices from the ground up.pptx
@@ -6,11 +6,17 @@
   </p:sldMasterIdLst>
   <p:sldIdLst>
     <p:sldId id="258" r:id="rId2"/>
-    <p:sldId id="260" r:id="rId3"/>
-    <p:sldId id="261" r:id="rId4"/>
-    <p:sldId id="264" r:id="rId5"/>
-    <p:sldId id="263" r:id="rId6"/>
-    <p:sldId id="257" r:id="rId7"/>
+    <p:sldId id="265" r:id="rId3"/>
+    <p:sldId id="270" r:id="rId4"/>
+    <p:sldId id="266" r:id="rId5"/>
+    <p:sldId id="257" r:id="rId6"/>
+    <p:sldId id="267" r:id="rId7"/>
+    <p:sldId id="269" r:id="rId8"/>
+    <p:sldId id="268" r:id="rId9"/>
+    <p:sldId id="260" r:id="rId10"/>
+    <p:sldId id="261" r:id="rId11"/>
+    <p:sldId id="264" r:id="rId12"/>
+    <p:sldId id="263" r:id="rId13"/>
   </p:sldIdLst>
   <p:sldSz cx="12192000" cy="6858000"/>
   <p:notesSz cx="7315200" cy="9601200"/>
@@ -12857,7 +12863,7 @@
           </p:cNvGraphicFramePr>
           <p:nvPr>
             <p:custDataLst>
-              <p:tags r:id="rId1"/>
+              <p:tags r:id="rId2"/>
             </p:custDataLst>
           </p:nvPr>
         </p:nvGraphicFramePr>
@@ -12869,12 +12875,12 @@
           <a:graphicData uri="http://schemas.openxmlformats.org/presentationml/2006/ole">
             <mc:AlternateContent xmlns:mc="http://schemas.openxmlformats.org/markup-compatibility/2006">
               <mc:Choice xmlns:v="urn:schemas-microsoft-com:vml" Requires="v">
-                <p:oleObj name="think-cell Slide" r:id="rId4" imgW="360" imgH="360" progId="TCLayout.ActiveDocument.1">
+                <p:oleObj spid="_x0000_s2055" name="think-cell Slide" r:id="rId5" imgW="360" imgH="360" progId="TCLayout.ActiveDocument.1">
                   <p:embed/>
                 </p:oleObj>
               </mc:Choice>
               <mc:Fallback>
-                <p:oleObj name="think-cell Slide" r:id="rId4" imgW="360" imgH="360" progId="TCLayout.ActiveDocument.1">
+                <p:oleObj name="think-cell Slide" r:id="rId5" imgW="360" imgH="360" progId="TCLayout.ActiveDocument.1">
                   <p:embed/>
                   <p:pic>
                     <p:nvPicPr>
@@ -12883,7 +12889,7 @@
                       <p:nvPr/>
                     </p:nvPicPr>
                     <p:blipFill>
-                      <a:blip r:embed="rId5"/>
+                      <a:blip r:embed="rId6"/>
                       <a:stretch>
                         <a:fillRect/>
                       </a:stretch>
@@ -12910,7 +12916,7 @@
           <p:cNvSpPr/>
           <p:nvPr>
             <p:custDataLst>
-              <p:tags r:id="rId2"/>
+              <p:tags r:id="rId3"/>
             </p:custDataLst>
           </p:nvPr>
         </p:nvSpPr>
@@ -14502,7 +14508,7 @@
           </p:cNvGraphicFramePr>
           <p:nvPr>
             <p:custDataLst>
-              <p:tags r:id="rId1"/>
+              <p:tags r:id="rId2"/>
             </p:custDataLst>
           </p:nvPr>
         </p:nvGraphicFramePr>
@@ -14514,12 +14520,12 @@
           <a:graphicData uri="http://schemas.openxmlformats.org/presentationml/2006/ole">
             <mc:AlternateContent xmlns:mc="http://schemas.openxmlformats.org/markup-compatibility/2006">
               <mc:Choice xmlns:v="urn:schemas-microsoft-com:vml" Requires="v">
-                <p:oleObj name="think-cell Slide" r:id="rId4" imgW="473" imgH="473" progId="TCLayout.ActiveDocument.1">
+                <p:oleObj spid="_x0000_s3079" name="think-cell Slide" r:id="rId5" imgW="473" imgH="473" progId="TCLayout.ActiveDocument.1">
                   <p:embed/>
                 </p:oleObj>
               </mc:Choice>
               <mc:Fallback>
-                <p:oleObj name="think-cell Slide" r:id="rId4" imgW="473" imgH="473" progId="TCLayout.ActiveDocument.1">
+                <p:oleObj name="think-cell Slide" r:id="rId5" imgW="473" imgH="473" progId="TCLayout.ActiveDocument.1">
                   <p:embed/>
                   <p:pic>
                     <p:nvPicPr>
@@ -14534,7 +14540,7 @@
                       <p:nvPr/>
                     </p:nvPicPr>
                     <p:blipFill>
-                      <a:blip r:embed="rId5"/>
+                      <a:blip r:embed="rId6"/>
                       <a:stretch>
                         <a:fillRect/>
                       </a:stretch>
@@ -14567,7 +14573,7 @@
           <p:cNvSpPr/>
           <p:nvPr>
             <p:custDataLst>
-              <p:tags r:id="rId2"/>
+              <p:tags r:id="rId3"/>
             </p:custDataLst>
           </p:nvPr>
         </p:nvSpPr>
@@ -16614,7 +16620,7 @@
           </p:cNvGraphicFramePr>
           <p:nvPr>
             <p:custDataLst>
-              <p:tags r:id="rId1"/>
+              <p:tags r:id="rId2"/>
             </p:custDataLst>
           </p:nvPr>
         </p:nvGraphicFramePr>
@@ -16626,12 +16632,12 @@
           <a:graphicData uri="http://schemas.openxmlformats.org/presentationml/2006/ole">
             <mc:AlternateContent xmlns:mc="http://schemas.openxmlformats.org/markup-compatibility/2006">
               <mc:Choice xmlns:v="urn:schemas-microsoft-com:vml" Requires="v">
-                <p:oleObj name="think-cell Slide" r:id="rId4" imgW="360" imgH="360" progId="TCLayout.ActiveDocument.1">
+                <p:oleObj spid="_x0000_s4103" name="think-cell Slide" r:id="rId5" imgW="360" imgH="360" progId="TCLayout.ActiveDocument.1">
                   <p:embed/>
                 </p:oleObj>
               </mc:Choice>
               <mc:Fallback>
-                <p:oleObj name="think-cell Slide" r:id="rId4" imgW="360" imgH="360" progId="TCLayout.ActiveDocument.1">
+                <p:oleObj name="think-cell Slide" r:id="rId5" imgW="360" imgH="360" progId="TCLayout.ActiveDocument.1">
                   <p:embed/>
                   <p:pic>
                     <p:nvPicPr>
@@ -16640,7 +16646,7 @@
                       <p:nvPr/>
                     </p:nvPicPr>
                     <p:blipFill>
-                      <a:blip r:embed="rId5"/>
+                      <a:blip r:embed="rId6"/>
                       <a:stretch>
                         <a:fillRect/>
                       </a:stretch>
@@ -16667,7 +16673,7 @@
           <p:cNvSpPr/>
           <p:nvPr>
             <p:custDataLst>
-              <p:tags r:id="rId2"/>
+              <p:tags r:id="rId3"/>
             </p:custDataLst>
           </p:nvPr>
         </p:nvSpPr>
@@ -20119,7 +20125,7 @@
           </p:cNvGraphicFramePr>
           <p:nvPr>
             <p:custDataLst>
-              <p:tags r:id="rId45"/>
+              <p:tags r:id="rId46"/>
             </p:custDataLst>
             <p:extLst>
               <p:ext uri="{D42A27DB-BD31-4B8C-83A1-F6EECF244321}">
@@ -20136,12 +20142,12 @@
           <a:graphicData uri="http://schemas.openxmlformats.org/presentationml/2006/ole">
             <mc:AlternateContent xmlns:mc="http://schemas.openxmlformats.org/markup-compatibility/2006">
               <mc:Choice xmlns:v="urn:schemas-microsoft-com:vml" Requires="v">
-                <p:oleObj name="think-cell Slide" r:id="rId46" imgW="270" imgH="270" progId="TCLayout.ActiveDocument.1">
+                <p:oleObj spid="_x0000_s1031" name="think-cell Slide" r:id="rId47" imgW="270" imgH="270" progId="TCLayout.ActiveDocument.1">
                   <p:embed/>
                 </p:oleObj>
               </mc:Choice>
               <mc:Fallback>
-                <p:oleObj name="think-cell Slide" r:id="rId46" imgW="270" imgH="270" progId="TCLayout.ActiveDocument.1">
+                <p:oleObj name="think-cell Slide" r:id="rId47" imgW="270" imgH="270" progId="TCLayout.ActiveDocument.1">
                   <p:embed/>
                   <p:pic>
                     <p:nvPicPr>
@@ -20150,7 +20156,7 @@
                       <p:nvPr/>
                     </p:nvPicPr>
                     <p:blipFill>
-                      <a:blip r:embed="rId47"/>
+                      <a:blip r:embed="rId48"/>
                       <a:stretch>
                         <a:fillRect/>
                       </a:stretch>
@@ -21078,7 +21084,7 @@
 </p:sld>
 </file>
 
-<file path=ppt/slides/slide2.xml><?xml version="1.0" encoding="utf-8"?>
+<file path=ppt/slides/slide10.xml><?xml version="1.0" encoding="utf-8"?>
 <p:sld xmlns:a="http://schemas.openxmlformats.org/drawingml/2006/main" xmlns:r="http://schemas.openxmlformats.org/officeDocument/2006/relationships" xmlns:p="http://schemas.openxmlformats.org/presentationml/2006/main">
   <p:cSld>
     <p:spTree>
@@ -21146,8 +21152,88 @@
         </p:blipFill>
         <p:spPr>
           <a:xfrm>
-            <a:off x="3586162" y="1328311"/>
+            <a:off x="524933" y="1328311"/>
             <a:ext cx="5019675" cy="4829175"/>
+          </a:xfrm>
+          <a:prstGeom prst="rect">
+            <a:avLst/>
+          </a:prstGeom>
+        </p:spPr>
+      </p:pic>
+      <p:sp>
+        <p:nvSpPr>
+          <p:cNvPr id="16" name="Arrow: Chevron 15">
+            <a:extLst>
+              <a:ext uri="{FF2B5EF4-FFF2-40B4-BE49-F238E27FC236}">
+                <a16:creationId xmlns:a16="http://schemas.microsoft.com/office/drawing/2014/main" id="{DC38A1FE-9193-48F3-980D-C7570E0226BE}"/>
+              </a:ext>
+            </a:extLst>
+          </p:cNvPr>
+          <p:cNvSpPr/>
+          <p:nvPr/>
+        </p:nvSpPr>
+        <p:spPr bwMode="gray">
+          <a:xfrm>
+            <a:off x="5888325" y="3105030"/>
+            <a:ext cx="705332" cy="1146412"/>
+          </a:xfrm>
+          <a:prstGeom prst="chevron">
+            <a:avLst>
+              <a:gd name="adj" fmla="val 62286"/>
+            </a:avLst>
+          </a:prstGeom>
+          <a:solidFill>
+            <a:schemeClr val="accent3"/>
+          </a:solidFill>
+          <a:ln w="19050" algn="ctr">
+            <a:noFill/>
+            <a:miter lim="800000"/>
+            <a:headEnd/>
+            <a:tailEnd/>
+          </a:ln>
+        </p:spPr>
+        <p:txBody>
+          <a:bodyPr wrap="square" lIns="88900" tIns="88900" rIns="88900" bIns="88900" rtlCol="0" anchor="ctr"/>
+          <a:lstStyle/>
+          <a:p>
+            <a:pPr algn="ctr">
+              <a:lnSpc>
+                <a:spcPct val="106000"/>
+              </a:lnSpc>
+              <a:buFont typeface="Wingdings 2" pitchFamily="18" charset="2"/>
+              <a:buNone/>
+            </a:pPr>
+            <a:endParaRPr lang="da-DK" sz="1600" b="1" dirty="0">
+              <a:solidFill>
+                <a:schemeClr val="bg1"/>
+              </a:solidFill>
+            </a:endParaRPr>
+          </a:p>
+        </p:txBody>
+      </p:sp>
+      <p:pic>
+        <p:nvPicPr>
+          <p:cNvPr id="3" name="Picture 2">
+            <a:extLst>
+              <a:ext uri="{FF2B5EF4-FFF2-40B4-BE49-F238E27FC236}">
+                <a16:creationId xmlns:a16="http://schemas.microsoft.com/office/drawing/2014/main" id="{88720707-6D7B-4382-95CD-40E75001BCB4}"/>
+              </a:ext>
+            </a:extLst>
+          </p:cNvPr>
+          <p:cNvPicPr>
+            <a:picLocks noChangeAspect="1"/>
+          </p:cNvPicPr>
+          <p:nvPr/>
+        </p:nvPicPr>
+        <p:blipFill rotWithShape="1">
+          <a:blip r:embed="rId3"/>
+          <a:srcRect t="32380"/>
+          <a:stretch/>
+        </p:blipFill>
+        <p:spPr>
+          <a:xfrm>
+            <a:off x="6937374" y="2158205"/>
+            <a:ext cx="4038600" cy="3040061"/>
           </a:xfrm>
           <a:prstGeom prst="rect">
             <a:avLst/>
@@ -21157,19 +21243,802 @@
     </p:spTree>
     <p:extLst>
       <p:ext uri="{BB962C8B-B14F-4D97-AF65-F5344CB8AC3E}">
-        <p14:creationId xmlns:p14="http://schemas.microsoft.com/office/powerpoint/2010/main" val="2948531841"/>
+        <p14:creationId xmlns:p14="http://schemas.microsoft.com/office/powerpoint/2010/main" val="4133261997"/>
       </p:ext>
     </p:extLst>
   </p:cSld>
   <p:clrMapOvr>
     <a:masterClrMapping/>
   </p:clrMapOvr>
-  <mc:AlternateContent xmlns:mc="http://schemas.openxmlformats.org/markup-compatibility/2006" xmlns:p14="http://schemas.microsoft.com/office/powerpoint/2010/main">
-    <mc:Choice Requires="p14">
-      <p:transition p14:dur="0"/>
+  <mc:AlternateContent xmlns:mc="http://schemas.openxmlformats.org/markup-compatibility/2006" xmlns:p159="http://schemas.microsoft.com/office/powerpoint/2015/09/main">
+    <mc:Choice Requires="p159">
+      <p:transition spd="slow">
+        <p159:morph option="byObject"/>
+      </p:transition>
     </mc:Choice>
     <mc:Fallback xmlns="">
-      <p:transition/>
+      <p:transition spd="slow">
+        <p:fade/>
+      </p:transition>
+    </mc:Fallback>
+  </mc:AlternateContent>
+</p:sld>
+</file>
+
+<file path=ppt/slides/slide11.xml><?xml version="1.0" encoding="utf-8"?>
+<p:sld xmlns:a="http://schemas.openxmlformats.org/drawingml/2006/main" xmlns:r="http://schemas.openxmlformats.org/officeDocument/2006/relationships" xmlns:p="http://schemas.openxmlformats.org/presentationml/2006/main">
+  <p:cSld>
+    <p:spTree>
+      <p:nvGrpSpPr>
+        <p:cNvPr id="1" name=""/>
+        <p:cNvGrpSpPr/>
+        <p:nvPr/>
+      </p:nvGrpSpPr>
+      <p:grpSpPr>
+        <a:xfrm>
+          <a:off x="0" y="0"/>
+          <a:ext cx="0" cy="0"/>
+          <a:chOff x="0" y="0"/>
+          <a:chExt cx="0" cy="0"/>
+        </a:xfrm>
+      </p:grpSpPr>
+      <p:sp>
+        <p:nvSpPr>
+          <p:cNvPr id="6" name="Title 5">
+            <a:extLst>
+              <a:ext uri="{FF2B5EF4-FFF2-40B4-BE49-F238E27FC236}">
+                <a16:creationId xmlns:a16="http://schemas.microsoft.com/office/drawing/2014/main" id="{991C4C60-D549-4836-B4EA-770904367F52}"/>
+              </a:ext>
+            </a:extLst>
+          </p:cNvPr>
+          <p:cNvSpPr>
+            <a:spLocks noGrp="1"/>
+          </p:cNvSpPr>
+          <p:nvPr>
+            <p:ph type="title"/>
+          </p:nvPr>
+        </p:nvSpPr>
+        <p:spPr/>
+        <p:txBody>
+          <a:bodyPr/>
+          <a:lstStyle/>
+          <a:p>
+            <a:r>
+              <a:rPr lang="is-IS" dirty="0"/>
+              <a:t>Terraform – Instead of using the GUI</a:t>
+            </a:r>
+            <a:endParaRPr lang="da-DK" dirty="0"/>
+          </a:p>
+        </p:txBody>
+      </p:sp>
+      <p:pic>
+        <p:nvPicPr>
+          <p:cNvPr id="11" name="Picture 10">
+            <a:extLst>
+              <a:ext uri="{FF2B5EF4-FFF2-40B4-BE49-F238E27FC236}">
+                <a16:creationId xmlns:a16="http://schemas.microsoft.com/office/drawing/2014/main" id="{CCECAC6C-27D9-4725-BCF7-9FA166726083}"/>
+              </a:ext>
+            </a:extLst>
+          </p:cNvPr>
+          <p:cNvPicPr>
+            <a:picLocks noChangeAspect="1"/>
+          </p:cNvPicPr>
+          <p:nvPr/>
+        </p:nvPicPr>
+        <p:blipFill>
+          <a:blip r:embed="rId2"/>
+          <a:stretch>
+            <a:fillRect/>
+          </a:stretch>
+        </p:blipFill>
+        <p:spPr>
+          <a:xfrm>
+            <a:off x="524933" y="1328311"/>
+            <a:ext cx="5019675" cy="4829175"/>
+          </a:xfrm>
+          <a:prstGeom prst="rect">
+            <a:avLst/>
+          </a:prstGeom>
+        </p:spPr>
+      </p:pic>
+      <p:sp>
+        <p:nvSpPr>
+          <p:cNvPr id="16" name="Arrow: Chevron 15">
+            <a:extLst>
+              <a:ext uri="{FF2B5EF4-FFF2-40B4-BE49-F238E27FC236}">
+                <a16:creationId xmlns:a16="http://schemas.microsoft.com/office/drawing/2014/main" id="{DC38A1FE-9193-48F3-980D-C7570E0226BE}"/>
+              </a:ext>
+            </a:extLst>
+          </p:cNvPr>
+          <p:cNvSpPr/>
+          <p:nvPr/>
+        </p:nvSpPr>
+        <p:spPr bwMode="gray">
+          <a:xfrm>
+            <a:off x="5888325" y="3105030"/>
+            <a:ext cx="705332" cy="1146412"/>
+          </a:xfrm>
+          <a:prstGeom prst="chevron">
+            <a:avLst>
+              <a:gd name="adj" fmla="val 62286"/>
+            </a:avLst>
+          </a:prstGeom>
+          <a:solidFill>
+            <a:schemeClr val="accent3"/>
+          </a:solidFill>
+          <a:ln w="19050" algn="ctr">
+            <a:noFill/>
+            <a:miter lim="800000"/>
+            <a:headEnd/>
+            <a:tailEnd/>
+          </a:ln>
+        </p:spPr>
+        <p:txBody>
+          <a:bodyPr wrap="square" lIns="88900" tIns="88900" rIns="88900" bIns="88900" rtlCol="0" anchor="ctr"/>
+          <a:lstStyle/>
+          <a:p>
+            <a:pPr algn="ctr">
+              <a:lnSpc>
+                <a:spcPct val="106000"/>
+              </a:lnSpc>
+              <a:buFont typeface="Wingdings 2" pitchFamily="18" charset="2"/>
+              <a:buNone/>
+            </a:pPr>
+            <a:endParaRPr lang="da-DK" sz="1600" b="1" dirty="0">
+              <a:solidFill>
+                <a:schemeClr val="bg1"/>
+              </a:solidFill>
+            </a:endParaRPr>
+          </a:p>
+        </p:txBody>
+      </p:sp>
+      <p:pic>
+        <p:nvPicPr>
+          <p:cNvPr id="3" name="Picture 2">
+            <a:extLst>
+              <a:ext uri="{FF2B5EF4-FFF2-40B4-BE49-F238E27FC236}">
+                <a16:creationId xmlns:a16="http://schemas.microsoft.com/office/drawing/2014/main" id="{88720707-6D7B-4382-95CD-40E75001BCB4}"/>
+              </a:ext>
+            </a:extLst>
+          </p:cNvPr>
+          <p:cNvPicPr>
+            <a:picLocks noChangeAspect="1"/>
+          </p:cNvPicPr>
+          <p:nvPr/>
+        </p:nvPicPr>
+        <p:blipFill>
+          <a:blip r:embed="rId3"/>
+          <a:stretch>
+            <a:fillRect/>
+          </a:stretch>
+        </p:blipFill>
+        <p:spPr>
+          <a:xfrm>
+            <a:off x="6937374" y="1430336"/>
+            <a:ext cx="4038600" cy="4495800"/>
+          </a:xfrm>
+          <a:prstGeom prst="rect">
+            <a:avLst/>
+          </a:prstGeom>
+        </p:spPr>
+      </p:pic>
+    </p:spTree>
+    <p:extLst>
+      <p:ext uri="{BB962C8B-B14F-4D97-AF65-F5344CB8AC3E}">
+        <p14:creationId xmlns:p14="http://schemas.microsoft.com/office/powerpoint/2010/main" val="557562315"/>
+      </p:ext>
+    </p:extLst>
+  </p:cSld>
+  <p:clrMapOvr>
+    <a:masterClrMapping/>
+  </p:clrMapOvr>
+  <mc:AlternateContent xmlns:mc="http://schemas.openxmlformats.org/markup-compatibility/2006" xmlns:p159="http://schemas.microsoft.com/office/powerpoint/2015/09/main">
+    <mc:Choice Requires="p159">
+      <p:transition spd="slow">
+        <p159:morph option="byObject"/>
+      </p:transition>
+    </mc:Choice>
+    <mc:Fallback xmlns="">
+      <p:transition spd="slow">
+        <p:fade/>
+      </p:transition>
+    </mc:Fallback>
+  </mc:AlternateContent>
+</p:sld>
+</file>
+
+<file path=ppt/slides/slide12.xml><?xml version="1.0" encoding="utf-8"?>
+<p:sld xmlns:a="http://schemas.openxmlformats.org/drawingml/2006/main" xmlns:r="http://schemas.openxmlformats.org/officeDocument/2006/relationships" xmlns:p="http://schemas.openxmlformats.org/presentationml/2006/main">
+  <p:cSld>
+    <p:spTree>
+      <p:nvGrpSpPr>
+        <p:cNvPr id="1" name=""/>
+        <p:cNvGrpSpPr/>
+        <p:nvPr/>
+      </p:nvGrpSpPr>
+      <p:grpSpPr>
+        <a:xfrm>
+          <a:off x="0" y="0"/>
+          <a:ext cx="0" cy="0"/>
+          <a:chOff x="0" y="0"/>
+          <a:chExt cx="0" cy="0"/>
+        </a:xfrm>
+      </p:grpSpPr>
+      <p:sp>
+        <p:nvSpPr>
+          <p:cNvPr id="6" name="Title 5">
+            <a:extLst>
+              <a:ext uri="{FF2B5EF4-FFF2-40B4-BE49-F238E27FC236}">
+                <a16:creationId xmlns:a16="http://schemas.microsoft.com/office/drawing/2014/main" id="{991C4C60-D549-4836-B4EA-770904367F52}"/>
+              </a:ext>
+            </a:extLst>
+          </p:cNvPr>
+          <p:cNvSpPr>
+            <a:spLocks noGrp="1"/>
+          </p:cNvSpPr>
+          <p:nvPr>
+            <p:ph type="title"/>
+          </p:nvPr>
+        </p:nvSpPr>
+        <p:spPr/>
+        <p:txBody>
+          <a:bodyPr/>
+          <a:lstStyle/>
+          <a:p>
+            <a:r>
+              <a:rPr lang="is-IS" dirty="0"/>
+              <a:t>Terraform – Instead of using the GUI</a:t>
+            </a:r>
+            <a:endParaRPr lang="da-DK" dirty="0"/>
+          </a:p>
+        </p:txBody>
+      </p:sp>
+      <p:pic>
+        <p:nvPicPr>
+          <p:cNvPr id="11" name="Picture 10">
+            <a:extLst>
+              <a:ext uri="{FF2B5EF4-FFF2-40B4-BE49-F238E27FC236}">
+                <a16:creationId xmlns:a16="http://schemas.microsoft.com/office/drawing/2014/main" id="{CCECAC6C-27D9-4725-BCF7-9FA166726083}"/>
+              </a:ext>
+            </a:extLst>
+          </p:cNvPr>
+          <p:cNvPicPr>
+            <a:picLocks noChangeAspect="1"/>
+          </p:cNvPicPr>
+          <p:nvPr/>
+        </p:nvPicPr>
+        <p:blipFill>
+          <a:blip r:embed="rId2"/>
+          <a:stretch>
+            <a:fillRect/>
+          </a:stretch>
+        </p:blipFill>
+        <p:spPr>
+          <a:xfrm>
+            <a:off x="524933" y="1328311"/>
+            <a:ext cx="5019675" cy="4829175"/>
+          </a:xfrm>
+          <a:prstGeom prst="rect">
+            <a:avLst/>
+          </a:prstGeom>
+        </p:spPr>
+      </p:pic>
+      <p:sp>
+        <p:nvSpPr>
+          <p:cNvPr id="16" name="Arrow: Chevron 15">
+            <a:extLst>
+              <a:ext uri="{FF2B5EF4-FFF2-40B4-BE49-F238E27FC236}">
+                <a16:creationId xmlns:a16="http://schemas.microsoft.com/office/drawing/2014/main" id="{DC38A1FE-9193-48F3-980D-C7570E0226BE}"/>
+              </a:ext>
+            </a:extLst>
+          </p:cNvPr>
+          <p:cNvSpPr/>
+          <p:nvPr/>
+        </p:nvSpPr>
+        <p:spPr bwMode="gray">
+          <a:xfrm>
+            <a:off x="5888325" y="3105030"/>
+            <a:ext cx="705332" cy="1146412"/>
+          </a:xfrm>
+          <a:prstGeom prst="chevron">
+            <a:avLst>
+              <a:gd name="adj" fmla="val 62286"/>
+            </a:avLst>
+          </a:prstGeom>
+          <a:solidFill>
+            <a:schemeClr val="accent3"/>
+          </a:solidFill>
+          <a:ln w="19050" algn="ctr">
+            <a:noFill/>
+            <a:miter lim="800000"/>
+            <a:headEnd/>
+            <a:tailEnd/>
+          </a:ln>
+        </p:spPr>
+        <p:txBody>
+          <a:bodyPr wrap="square" lIns="88900" tIns="88900" rIns="88900" bIns="88900" rtlCol="0" anchor="ctr"/>
+          <a:lstStyle/>
+          <a:p>
+            <a:pPr algn="ctr">
+              <a:lnSpc>
+                <a:spcPct val="106000"/>
+              </a:lnSpc>
+              <a:buFont typeface="Wingdings 2" pitchFamily="18" charset="2"/>
+              <a:buNone/>
+            </a:pPr>
+            <a:endParaRPr lang="da-DK" sz="1600" b="1" dirty="0">
+              <a:solidFill>
+                <a:schemeClr val="bg1"/>
+              </a:solidFill>
+            </a:endParaRPr>
+          </a:p>
+        </p:txBody>
+      </p:sp>
+      <p:pic>
+        <p:nvPicPr>
+          <p:cNvPr id="3" name="Picture 2">
+            <a:extLst>
+              <a:ext uri="{FF2B5EF4-FFF2-40B4-BE49-F238E27FC236}">
+                <a16:creationId xmlns:a16="http://schemas.microsoft.com/office/drawing/2014/main" id="{88720707-6D7B-4382-95CD-40E75001BCB4}"/>
+              </a:ext>
+            </a:extLst>
+          </p:cNvPr>
+          <p:cNvPicPr>
+            <a:picLocks noChangeAspect="1"/>
+          </p:cNvPicPr>
+          <p:nvPr/>
+        </p:nvPicPr>
+        <p:blipFill>
+          <a:blip r:embed="rId3"/>
+          <a:stretch>
+            <a:fillRect/>
+          </a:stretch>
+        </p:blipFill>
+        <p:spPr>
+          <a:xfrm>
+            <a:off x="6937374" y="1430336"/>
+            <a:ext cx="4038600" cy="4495800"/>
+          </a:xfrm>
+          <a:prstGeom prst="rect">
+            <a:avLst/>
+          </a:prstGeom>
+        </p:spPr>
+      </p:pic>
+      <p:pic>
+        <p:nvPicPr>
+          <p:cNvPr id="7" name="Picture 6">
+            <a:extLst>
+              <a:ext uri="{FF2B5EF4-FFF2-40B4-BE49-F238E27FC236}">
+                <a16:creationId xmlns:a16="http://schemas.microsoft.com/office/drawing/2014/main" id="{78DFD3DB-6378-49B0-924A-0C588CD55223}"/>
+              </a:ext>
+            </a:extLst>
+          </p:cNvPr>
+          <p:cNvPicPr>
+            <a:picLocks noChangeAspect="1"/>
+          </p:cNvPicPr>
+          <p:nvPr/>
+        </p:nvPicPr>
+        <p:blipFill>
+          <a:blip r:embed="rId4"/>
+          <a:stretch>
+            <a:fillRect/>
+          </a:stretch>
+        </p:blipFill>
+        <p:spPr>
+          <a:xfrm>
+            <a:off x="6937374" y="1430336"/>
+            <a:ext cx="4686300" cy="4524375"/>
+          </a:xfrm>
+          <a:prstGeom prst="rect">
+            <a:avLst/>
+          </a:prstGeom>
+        </p:spPr>
+      </p:pic>
+    </p:spTree>
+    <p:extLst>
+      <p:ext uri="{BB962C8B-B14F-4D97-AF65-F5344CB8AC3E}">
+        <p14:creationId xmlns:p14="http://schemas.microsoft.com/office/powerpoint/2010/main" val="4148441264"/>
+      </p:ext>
+    </p:extLst>
+  </p:cSld>
+  <p:clrMapOvr>
+    <a:masterClrMapping/>
+  </p:clrMapOvr>
+  <mc:AlternateContent xmlns:mc="http://schemas.openxmlformats.org/markup-compatibility/2006" xmlns:p159="http://schemas.microsoft.com/office/powerpoint/2015/09/main">
+    <mc:Choice Requires="p159">
+      <p:transition spd="slow">
+        <p159:morph option="byObject"/>
+      </p:transition>
+    </mc:Choice>
+    <mc:Fallback xmlns="">
+      <p:transition spd="slow">
+        <p:fade/>
+      </p:transition>
+    </mc:Fallback>
+  </mc:AlternateContent>
+</p:sld>
+</file>
+
+<file path=ppt/slides/slide2.xml><?xml version="1.0" encoding="utf-8"?>
+<p:sld xmlns:a="http://schemas.openxmlformats.org/drawingml/2006/main" xmlns:r="http://schemas.openxmlformats.org/officeDocument/2006/relationships" xmlns:p="http://schemas.openxmlformats.org/presentationml/2006/main">
+  <p:cSld>
+    <p:spTree>
+      <p:nvGrpSpPr>
+        <p:cNvPr id="1" name=""/>
+        <p:cNvGrpSpPr/>
+        <p:nvPr/>
+      </p:nvGrpSpPr>
+      <p:grpSpPr>
+        <a:xfrm>
+          <a:off x="0" y="0"/>
+          <a:ext cx="0" cy="0"/>
+          <a:chOff x="0" y="0"/>
+          <a:chExt cx="0" cy="0"/>
+        </a:xfrm>
+      </p:grpSpPr>
+      <p:sp>
+        <p:nvSpPr>
+          <p:cNvPr id="6" name="Title 5">
+            <a:extLst>
+              <a:ext uri="{FF2B5EF4-FFF2-40B4-BE49-F238E27FC236}">
+                <a16:creationId xmlns:a16="http://schemas.microsoft.com/office/drawing/2014/main" id="{35C556C4-3F4B-4FC6-ACF9-7339460ED114}"/>
+              </a:ext>
+            </a:extLst>
+          </p:cNvPr>
+          <p:cNvSpPr>
+            <a:spLocks noGrp="1"/>
+          </p:cNvSpPr>
+          <p:nvPr>
+            <p:ph type="title"/>
+          </p:nvPr>
+        </p:nvSpPr>
+        <p:spPr/>
+        <p:txBody>
+          <a:bodyPr/>
+          <a:lstStyle/>
+          <a:p>
+            <a:r>
+              <a:rPr lang="is-IS" dirty="0"/>
+              <a:t>Agenda</a:t>
+            </a:r>
+            <a:endParaRPr lang="da-DK" dirty="0"/>
+          </a:p>
+        </p:txBody>
+      </p:sp>
+      <p:sp>
+        <p:nvSpPr>
+          <p:cNvPr id="7" name="Text Placeholder 6">
+            <a:extLst>
+              <a:ext uri="{FF2B5EF4-FFF2-40B4-BE49-F238E27FC236}">
+                <a16:creationId xmlns:a16="http://schemas.microsoft.com/office/drawing/2014/main" id="{3F035295-6CF9-4DA5-B613-28BB55C2D329}"/>
+              </a:ext>
+            </a:extLst>
+          </p:cNvPr>
+          <p:cNvSpPr>
+            <a:spLocks noGrp="1"/>
+          </p:cNvSpPr>
+          <p:nvPr>
+            <p:ph type="body" idx="1"/>
+          </p:nvPr>
+        </p:nvSpPr>
+        <p:spPr>
+          <a:xfrm>
+            <a:off x="2723535" y="3840983"/>
+            <a:ext cx="6545140" cy="1566532"/>
+          </a:xfrm>
+        </p:spPr>
+        <p:txBody>
+          <a:bodyPr/>
+          <a:lstStyle/>
+          <a:p>
+            <a:r>
+              <a:rPr lang="is-IS" dirty="0">
+                <a:latin typeface="+mj-lt"/>
+              </a:rPr>
+              <a:t>Microservices</a:t>
+            </a:r>
+          </a:p>
+          <a:p>
+            <a:r>
+              <a:rPr lang="is-IS" dirty="0">
+                <a:latin typeface="+mj-lt"/>
+              </a:rPr>
+              <a:t>Container Orchestration</a:t>
+            </a:r>
+          </a:p>
+          <a:p>
+            <a:r>
+              <a:rPr lang="is-IS" dirty="0">
+                <a:latin typeface="+mj-lt"/>
+              </a:rPr>
+              <a:t>Cloud providers</a:t>
+            </a:r>
+            <a:endParaRPr lang="da-DK" dirty="0">
+              <a:latin typeface="+mj-lt"/>
+            </a:endParaRPr>
+          </a:p>
+        </p:txBody>
+      </p:sp>
+      <p:sp>
+        <p:nvSpPr>
+          <p:cNvPr id="8" name="Text Placeholder 6">
+            <a:extLst>
+              <a:ext uri="{FF2B5EF4-FFF2-40B4-BE49-F238E27FC236}">
+                <a16:creationId xmlns:a16="http://schemas.microsoft.com/office/drawing/2014/main" id="{240ABAD7-B643-4B5B-85AB-37F897021F27}"/>
+              </a:ext>
+            </a:extLst>
+          </p:cNvPr>
+          <p:cNvSpPr txBox="1">
+            <a:spLocks/>
+          </p:cNvSpPr>
+          <p:nvPr/>
+        </p:nvSpPr>
+        <p:spPr bwMode="gray">
+          <a:xfrm>
+            <a:off x="469900" y="3840983"/>
+            <a:ext cx="2125816" cy="1566532"/>
+          </a:xfrm>
+          <a:prstGeom prst="rect">
+            <a:avLst/>
+          </a:prstGeom>
+        </p:spPr>
+        <p:txBody>
+          <a:bodyPr vert="horz" lIns="0" tIns="0" rIns="0" bIns="0" rtlCol="0">
+            <a:noAutofit/>
+          </a:bodyPr>
+          <a:lstStyle>
+            <a:lvl1pPr marL="0" indent="0" algn="l" defTabSz="914400" rtl="0" eaLnBrk="1" latinLnBrk="0" hangingPunct="1">
+              <a:lnSpc>
+                <a:spcPct val="95000"/>
+              </a:lnSpc>
+              <a:spcBef>
+                <a:spcPts val="0"/>
+              </a:spcBef>
+              <a:spcAft>
+                <a:spcPts val="0"/>
+              </a:spcAft>
+              <a:buSzPct val="100000"/>
+              <a:buFont typeface="Arial" panose="020B0604020202020204" pitchFamily="34" charset="0"/>
+              <a:buNone/>
+              <a:defRPr sz="3600" b="0" kern="1200">
+                <a:solidFill>
+                  <a:schemeClr val="bg1"/>
+                </a:solidFill>
+                <a:latin typeface="+mn-lt"/>
+                <a:ea typeface="+mn-ea"/>
+                <a:cs typeface="Calibri Light" panose="020F0302020204030204" pitchFamily="34" charset="0"/>
+              </a:defRPr>
+            </a:lvl1pPr>
+            <a:lvl2pPr marL="609585" indent="0" algn="l" defTabSz="914400" rtl="0" eaLnBrk="1" latinLnBrk="0" hangingPunct="1">
+              <a:spcBef>
+                <a:spcPts val="0"/>
+              </a:spcBef>
+              <a:spcAft>
+                <a:spcPts val="1000"/>
+              </a:spcAft>
+              <a:buClrTx/>
+              <a:buSzPct val="100000"/>
+              <a:buFont typeface="Arial"/>
+              <a:buNone/>
+              <a:defRPr lang="en-US" sz="2667" b="1" kern="1200">
+                <a:solidFill>
+                  <a:schemeClr val="tx1">
+                    <a:tint val="75000"/>
+                  </a:schemeClr>
+                </a:solidFill>
+                <a:latin typeface="+mj-lt"/>
+                <a:ea typeface="+mn-ea"/>
+                <a:cs typeface="Calibri Light" panose="020F0302020204030204" pitchFamily="34" charset="0"/>
+              </a:defRPr>
+            </a:lvl2pPr>
+            <a:lvl3pPr marL="1219170" indent="0" algn="l" defTabSz="914400" rtl="0" eaLnBrk="1" latinLnBrk="0" hangingPunct="1">
+              <a:spcBef>
+                <a:spcPts val="0"/>
+              </a:spcBef>
+              <a:spcAft>
+                <a:spcPts val="1000"/>
+              </a:spcAft>
+              <a:buClrTx/>
+              <a:buSzPct val="100000"/>
+              <a:buFont typeface="Arial" panose="020B0604020202020204" pitchFamily="34" charset="0"/>
+              <a:buNone/>
+              <a:defRPr lang="en-US" sz="2400" kern="1200">
+                <a:solidFill>
+                  <a:schemeClr val="tx1">
+                    <a:tint val="75000"/>
+                  </a:schemeClr>
+                </a:solidFill>
+                <a:latin typeface="+mn-lt"/>
+                <a:ea typeface="+mn-ea"/>
+                <a:cs typeface="Calibri Light" panose="020F0302020204030204" pitchFamily="34" charset="0"/>
+              </a:defRPr>
+            </a:lvl3pPr>
+            <a:lvl4pPr marL="1828754" indent="0" algn="l" defTabSz="914400" rtl="0" eaLnBrk="1" latinLnBrk="0" hangingPunct="1">
+              <a:spcBef>
+                <a:spcPts val="0"/>
+              </a:spcBef>
+              <a:spcAft>
+                <a:spcPts val="1000"/>
+              </a:spcAft>
+              <a:buClrTx/>
+              <a:buSzPct val="100000"/>
+              <a:buFont typeface="Verdana" panose="020B0604030504040204" pitchFamily="34" charset="0"/>
+              <a:buNone/>
+              <a:defRPr lang="en-US" sz="2133" kern="1200" baseline="0">
+                <a:solidFill>
+                  <a:schemeClr val="tx1">
+                    <a:tint val="75000"/>
+                  </a:schemeClr>
+                </a:solidFill>
+                <a:latin typeface="+mn-lt"/>
+                <a:ea typeface="+mn-ea"/>
+                <a:cs typeface="Calibri Light" panose="020F0302020204030204" pitchFamily="34" charset="0"/>
+              </a:defRPr>
+            </a:lvl4pPr>
+            <a:lvl5pPr marL="2438339" indent="0" algn="l" defTabSz="798513" rtl="0" eaLnBrk="1" latinLnBrk="0" hangingPunct="1">
+              <a:spcBef>
+                <a:spcPts val="0"/>
+              </a:spcBef>
+              <a:spcAft>
+                <a:spcPts val="1000"/>
+              </a:spcAft>
+              <a:buClrTx/>
+              <a:buSzPct val="100000"/>
+              <a:buFont typeface="Verdana" panose="020B0604030504040204" pitchFamily="34" charset="0"/>
+              <a:buNone/>
+              <a:tabLst/>
+              <a:defRPr lang="en-US" sz="2133" kern="1200" baseline="0">
+                <a:solidFill>
+                  <a:schemeClr val="tx1">
+                    <a:tint val="75000"/>
+                  </a:schemeClr>
+                </a:solidFill>
+                <a:latin typeface="+mn-lt"/>
+                <a:ea typeface="+mn-ea"/>
+                <a:cs typeface="Calibri Light" panose="020F0302020204030204" pitchFamily="34" charset="0"/>
+              </a:defRPr>
+            </a:lvl5pPr>
+            <a:lvl6pPr marL="3047924" indent="0" algn="l" defTabSz="914400" rtl="0" eaLnBrk="1" latinLnBrk="0" hangingPunct="1">
+              <a:spcBef>
+                <a:spcPts val="0"/>
+              </a:spcBef>
+              <a:spcAft>
+                <a:spcPts val="1000"/>
+              </a:spcAft>
+              <a:buFont typeface="Verdana" panose="020B0604030504040204" pitchFamily="34" charset="0"/>
+              <a:buNone/>
+              <a:defRPr sz="2133" kern="1200" baseline="0">
+                <a:solidFill>
+                  <a:schemeClr val="tx1">
+                    <a:tint val="75000"/>
+                  </a:schemeClr>
+                </a:solidFill>
+                <a:latin typeface="+mn-lt"/>
+                <a:ea typeface="+mn-ea"/>
+                <a:cs typeface="+mn-cs"/>
+              </a:defRPr>
+            </a:lvl6pPr>
+            <a:lvl7pPr marL="3657509" indent="0" algn="l" defTabSz="914400" rtl="0" eaLnBrk="1" latinLnBrk="0" hangingPunct="1">
+              <a:spcBef>
+                <a:spcPts val="0"/>
+              </a:spcBef>
+              <a:spcAft>
+                <a:spcPts val="1000"/>
+              </a:spcAft>
+              <a:buFont typeface="Verdana" panose="020B0604030504040204" pitchFamily="34" charset="0"/>
+              <a:buNone/>
+              <a:defRPr sz="2133" kern="1200">
+                <a:solidFill>
+                  <a:schemeClr val="tx1">
+                    <a:tint val="75000"/>
+                  </a:schemeClr>
+                </a:solidFill>
+                <a:latin typeface="+mn-lt"/>
+                <a:ea typeface="+mn-ea"/>
+                <a:cs typeface="+mn-cs"/>
+              </a:defRPr>
+            </a:lvl7pPr>
+            <a:lvl8pPr marL="4267093" indent="0" algn="l" defTabSz="914400" rtl="0" eaLnBrk="1" latinLnBrk="0" hangingPunct="1">
+              <a:spcBef>
+                <a:spcPts val="0"/>
+              </a:spcBef>
+              <a:spcAft>
+                <a:spcPts val="1000"/>
+              </a:spcAft>
+              <a:buFont typeface="Verdana" panose="020B0604030504040204" pitchFamily="34" charset="0"/>
+              <a:buNone/>
+              <a:defRPr sz="2133" kern="1200" baseline="0">
+                <a:solidFill>
+                  <a:schemeClr val="tx1">
+                    <a:tint val="75000"/>
+                  </a:schemeClr>
+                </a:solidFill>
+                <a:latin typeface="+mn-lt"/>
+                <a:ea typeface="+mn-ea"/>
+                <a:cs typeface="+mn-cs"/>
+              </a:defRPr>
+            </a:lvl8pPr>
+            <a:lvl9pPr marL="4876678" indent="0" algn="l" defTabSz="914400" rtl="0" eaLnBrk="1" latinLnBrk="0" hangingPunct="1">
+              <a:spcBef>
+                <a:spcPts val="0"/>
+              </a:spcBef>
+              <a:spcAft>
+                <a:spcPts val="1000"/>
+              </a:spcAft>
+              <a:buFont typeface="Verdana" panose="020B0604030504040204" pitchFamily="34" charset="0"/>
+              <a:buNone/>
+              <a:defRPr sz="2133" kern="1200" baseline="0">
+                <a:solidFill>
+                  <a:schemeClr val="tx1">
+                    <a:tint val="75000"/>
+                  </a:schemeClr>
+                </a:solidFill>
+                <a:latin typeface="+mn-lt"/>
+                <a:ea typeface="+mn-ea"/>
+                <a:cs typeface="+mn-cs"/>
+              </a:defRPr>
+            </a:lvl9pPr>
+          </a:lstStyle>
+          <a:p>
+            <a:pPr algn="r"/>
+            <a:r>
+              <a:rPr lang="is-IS" dirty="0">
+                <a:solidFill>
+                  <a:srgbClr val="2C5234"/>
+                </a:solidFill>
+              </a:rPr>
+              <a:t>Docker</a:t>
+            </a:r>
+          </a:p>
+          <a:p>
+            <a:pPr algn="r"/>
+            <a:r>
+              <a:rPr lang="is-IS" dirty="0">
+                <a:solidFill>
+                  <a:srgbClr val="2C5234"/>
+                </a:solidFill>
+              </a:rPr>
+              <a:t>Kubernetes</a:t>
+            </a:r>
+          </a:p>
+          <a:p>
+            <a:pPr algn="r"/>
+            <a:r>
+              <a:rPr lang="is-IS" dirty="0">
+                <a:solidFill>
+                  <a:srgbClr val="2C5234"/>
+                </a:solidFill>
+              </a:rPr>
+              <a:t>Terraform</a:t>
+            </a:r>
+            <a:endParaRPr lang="da-DK" dirty="0">
+              <a:solidFill>
+                <a:srgbClr val="2C5234"/>
+              </a:solidFill>
+            </a:endParaRPr>
+          </a:p>
+        </p:txBody>
+      </p:sp>
+    </p:spTree>
+    <p:extLst>
+      <p:ext uri="{BB962C8B-B14F-4D97-AF65-F5344CB8AC3E}">
+        <p14:creationId xmlns:p14="http://schemas.microsoft.com/office/powerpoint/2010/main" val="4269435591"/>
+      </p:ext>
+    </p:extLst>
+  </p:cSld>
+  <p:clrMapOvr>
+    <a:masterClrMapping/>
+  </p:clrMapOvr>
+  <mc:AlternateContent xmlns:mc="http://schemas.openxmlformats.org/markup-compatibility/2006" xmlns:p159="http://schemas.microsoft.com/office/powerpoint/2015/09/main">
+    <mc:Choice Requires="p159">
+      <p:transition spd="slow">
+        <p159:morph option="byObject"/>
+      </p:transition>
+    </mc:Choice>
+    <mc:Fallback xmlns="">
+      <p:transition spd="slow">
+        <p:fade/>
+      </p:transition>
     </mc:Fallback>
   </mc:AlternateContent>
 </p:sld>
@@ -21194,10 +22063,87 @@
       </p:grpSpPr>
       <p:sp>
         <p:nvSpPr>
+          <p:cNvPr id="3" name="Text Placeholder 2">
+            <a:extLst>
+              <a:ext uri="{FF2B5EF4-FFF2-40B4-BE49-F238E27FC236}">
+                <a16:creationId xmlns:a16="http://schemas.microsoft.com/office/drawing/2014/main" id="{8E22C860-6393-4582-B457-CF89A0A4AD52}"/>
+              </a:ext>
+            </a:extLst>
+          </p:cNvPr>
+          <p:cNvSpPr>
+            <a:spLocks noGrp="1"/>
+          </p:cNvSpPr>
+          <p:nvPr>
+            <p:ph type="body" idx="1"/>
+          </p:nvPr>
+        </p:nvSpPr>
+        <p:spPr>
+          <a:xfrm>
+            <a:off x="469900" y="3677264"/>
+            <a:ext cx="10418233" cy="2644877"/>
+          </a:xfrm>
+        </p:spPr>
+        <p:txBody>
+          <a:bodyPr/>
+          <a:lstStyle/>
+          <a:p>
+            <a:pPr marL="571500" indent="-571500">
+              <a:buFont typeface="Arial" panose="020B0604020202020204" pitchFamily="34" charset="0"/>
+              <a:buChar char="•"/>
+            </a:pPr>
+            <a:r>
+              <a:rPr lang="is-IS" dirty="0"/>
+              <a:t>Microsoft Dotnet (C#)</a:t>
+            </a:r>
+          </a:p>
+          <a:p>
+            <a:pPr marL="571500" indent="-571500">
+              <a:buFont typeface="Arial" panose="020B0604020202020204" pitchFamily="34" charset="0"/>
+              <a:buChar char="•"/>
+            </a:pPr>
+            <a:r>
+              <a:rPr lang="is-IS" dirty="0"/>
+              <a:t>Docker</a:t>
+            </a:r>
+          </a:p>
+          <a:p>
+            <a:pPr marL="571500" indent="-571500">
+              <a:buFont typeface="Arial" panose="020B0604020202020204" pitchFamily="34" charset="0"/>
+              <a:buChar char="•"/>
+            </a:pPr>
+            <a:r>
+              <a:rPr lang="is-IS" dirty="0"/>
+              <a:t>RabbitMQ</a:t>
+            </a:r>
+          </a:p>
+          <a:p>
+            <a:pPr marL="571500" indent="-571500">
+              <a:buFont typeface="Arial" panose="020B0604020202020204" pitchFamily="34" charset="0"/>
+              <a:buChar char="•"/>
+            </a:pPr>
+            <a:r>
+              <a:rPr lang="is-IS" dirty="0"/>
+              <a:t>Kubernetes</a:t>
+            </a:r>
+          </a:p>
+          <a:p>
+            <a:pPr marL="571500" indent="-571500">
+              <a:buFont typeface="Arial" panose="020B0604020202020204" pitchFamily="34" charset="0"/>
+              <a:buChar char="•"/>
+            </a:pPr>
+            <a:r>
+              <a:rPr lang="is-IS" dirty="0"/>
+              <a:t>Helm</a:t>
+            </a:r>
+          </a:p>
+        </p:txBody>
+      </p:sp>
+      <p:sp>
+        <p:nvSpPr>
           <p:cNvPr id="6" name="Title 5">
             <a:extLst>
               <a:ext uri="{FF2B5EF4-FFF2-40B4-BE49-F238E27FC236}">
-                <a16:creationId xmlns:a16="http://schemas.microsoft.com/office/drawing/2014/main" id="{991C4C60-D549-4836-B4EA-770904367F52}"/>
+                <a16:creationId xmlns:a16="http://schemas.microsoft.com/office/drawing/2014/main" id="{30EAF868-97B7-4BB1-9E32-CD5E83D9DBB5}"/>
               </a:ext>
             </a:extLst>
           </p:cNvPr>
@@ -21215,126 +22161,16 @@
           <a:p>
             <a:r>
               <a:rPr lang="is-IS" dirty="0"/>
-              <a:t>Terraform – Instead of using the GUI</a:t>
+              <a:t>Technology we‘re using today</a:t>
             </a:r>
             <a:endParaRPr lang="da-DK" dirty="0"/>
           </a:p>
         </p:txBody>
       </p:sp>
-      <p:pic>
-        <p:nvPicPr>
-          <p:cNvPr id="11" name="Picture 10">
-            <a:extLst>
-              <a:ext uri="{FF2B5EF4-FFF2-40B4-BE49-F238E27FC236}">
-                <a16:creationId xmlns:a16="http://schemas.microsoft.com/office/drawing/2014/main" id="{CCECAC6C-27D9-4725-BCF7-9FA166726083}"/>
-              </a:ext>
-            </a:extLst>
-          </p:cNvPr>
-          <p:cNvPicPr>
-            <a:picLocks noChangeAspect="1"/>
-          </p:cNvPicPr>
-          <p:nvPr/>
-        </p:nvPicPr>
-        <p:blipFill>
-          <a:blip r:embed="rId2"/>
-          <a:stretch>
-            <a:fillRect/>
-          </a:stretch>
-        </p:blipFill>
-        <p:spPr>
-          <a:xfrm>
-            <a:off x="524933" y="1328311"/>
-            <a:ext cx="5019675" cy="4829175"/>
-          </a:xfrm>
-          <a:prstGeom prst="rect">
-            <a:avLst/>
-          </a:prstGeom>
-        </p:spPr>
-      </p:pic>
-      <p:sp>
-        <p:nvSpPr>
-          <p:cNvPr id="16" name="Arrow: Chevron 15">
-            <a:extLst>
-              <a:ext uri="{FF2B5EF4-FFF2-40B4-BE49-F238E27FC236}">
-                <a16:creationId xmlns:a16="http://schemas.microsoft.com/office/drawing/2014/main" id="{DC38A1FE-9193-48F3-980D-C7570E0226BE}"/>
-              </a:ext>
-            </a:extLst>
-          </p:cNvPr>
-          <p:cNvSpPr/>
-          <p:nvPr/>
-        </p:nvSpPr>
-        <p:spPr bwMode="gray">
-          <a:xfrm>
-            <a:off x="5888325" y="3105030"/>
-            <a:ext cx="705332" cy="1146412"/>
-          </a:xfrm>
-          <a:prstGeom prst="chevron">
-            <a:avLst>
-              <a:gd name="adj" fmla="val 62286"/>
-            </a:avLst>
-          </a:prstGeom>
-          <a:solidFill>
-            <a:schemeClr val="accent3"/>
-          </a:solidFill>
-          <a:ln w="19050" algn="ctr">
-            <a:noFill/>
-            <a:miter lim="800000"/>
-            <a:headEnd/>
-            <a:tailEnd/>
-          </a:ln>
-        </p:spPr>
-        <p:txBody>
-          <a:bodyPr wrap="square" lIns="88900" tIns="88900" rIns="88900" bIns="88900" rtlCol="0" anchor="ctr"/>
-          <a:lstStyle/>
-          <a:p>
-            <a:pPr algn="ctr">
-              <a:lnSpc>
-                <a:spcPct val="106000"/>
-              </a:lnSpc>
-              <a:buFont typeface="Wingdings 2" pitchFamily="18" charset="2"/>
-              <a:buNone/>
-            </a:pPr>
-            <a:endParaRPr lang="da-DK" sz="1600" b="1" dirty="0">
-              <a:solidFill>
-                <a:schemeClr val="bg1"/>
-              </a:solidFill>
-            </a:endParaRPr>
-          </a:p>
-        </p:txBody>
-      </p:sp>
-      <p:pic>
-        <p:nvPicPr>
-          <p:cNvPr id="3" name="Picture 2">
-            <a:extLst>
-              <a:ext uri="{FF2B5EF4-FFF2-40B4-BE49-F238E27FC236}">
-                <a16:creationId xmlns:a16="http://schemas.microsoft.com/office/drawing/2014/main" id="{88720707-6D7B-4382-95CD-40E75001BCB4}"/>
-              </a:ext>
-            </a:extLst>
-          </p:cNvPr>
-          <p:cNvPicPr>
-            <a:picLocks noChangeAspect="1"/>
-          </p:cNvPicPr>
-          <p:nvPr/>
-        </p:nvPicPr>
-        <p:blipFill rotWithShape="1">
-          <a:blip r:embed="rId3"/>
-          <a:srcRect t="32380"/>
-          <a:stretch/>
-        </p:blipFill>
-        <p:spPr>
-          <a:xfrm>
-            <a:off x="6937374" y="2158205"/>
-            <a:ext cx="4038600" cy="3040061"/>
-          </a:xfrm>
-          <a:prstGeom prst="rect">
-            <a:avLst/>
-          </a:prstGeom>
-        </p:spPr>
-      </p:pic>
     </p:spTree>
     <p:extLst>
       <p:ext uri="{BB962C8B-B14F-4D97-AF65-F5344CB8AC3E}">
-        <p14:creationId xmlns:p14="http://schemas.microsoft.com/office/powerpoint/2010/main" val="4133261997"/>
+        <p14:creationId xmlns:p14="http://schemas.microsoft.com/office/powerpoint/2010/main" val="3369953627"/>
       </p:ext>
     </p:extLst>
   </p:cSld>
@@ -21375,10 +22211,10 @@
       </p:grpSpPr>
       <p:sp>
         <p:nvSpPr>
-          <p:cNvPr id="6" name="Title 5">
+          <p:cNvPr id="14" name="Text Placeholder 13">
             <a:extLst>
               <a:ext uri="{FF2B5EF4-FFF2-40B4-BE49-F238E27FC236}">
-                <a16:creationId xmlns:a16="http://schemas.microsoft.com/office/drawing/2014/main" id="{991C4C60-D549-4836-B4EA-770904367F52}"/>
+                <a16:creationId xmlns:a16="http://schemas.microsoft.com/office/drawing/2014/main" id="{CEBEB6DB-5DC1-42DA-A441-0E6F2D6B4E99}"/>
               </a:ext>
             </a:extLst>
           </p:cNvPr>
@@ -21386,58 +22222,91 @@
             <a:spLocks noGrp="1"/>
           </p:cNvSpPr>
           <p:nvPr>
-            <p:ph type="title"/>
+            <p:ph type="body" sz="quarter" idx="10"/>
           </p:nvPr>
         </p:nvSpPr>
-        <p:spPr/>
+        <p:spPr>
+          <a:xfrm>
+            <a:off x="480484" y="1590675"/>
+            <a:ext cx="5846574" cy="4708525"/>
+          </a:xfrm>
+        </p:spPr>
         <p:txBody>
           <a:bodyPr/>
           <a:lstStyle/>
           <a:p>
+            <a:pPr marL="571500" indent="-571500">
+              <a:buFont typeface="Arial" panose="020B0604020202020204" pitchFamily="34" charset="0"/>
+              <a:buChar char="•"/>
+            </a:pPr>
             <a:r>
               <a:rPr lang="is-IS" dirty="0"/>
-              <a:t>Terraform – Instead of using the GUI</a:t>
+              <a:t>Focused purpose</a:t>
+            </a:r>
+          </a:p>
+          <a:p>
+            <a:pPr marL="571500" indent="-571500">
+              <a:buFont typeface="Arial" panose="020B0604020202020204" pitchFamily="34" charset="0"/>
+              <a:buChar char="•"/>
+            </a:pPr>
+            <a:r>
+              <a:rPr lang="is-IS" dirty="0"/>
+              <a:t>Stateless</a:t>
+            </a:r>
+          </a:p>
+          <a:p>
+            <a:pPr marL="571500" indent="-571500">
+              <a:buFont typeface="Arial" panose="020B0604020202020204" pitchFamily="34" charset="0"/>
+              <a:buChar char="•"/>
+            </a:pPr>
+            <a:r>
+              <a:rPr lang="is-IS" dirty="0"/>
+              <a:t>Elastic</a:t>
             </a:r>
             <a:endParaRPr lang="da-DK" dirty="0"/>
           </a:p>
         </p:txBody>
       </p:sp>
-      <p:pic>
-        <p:nvPicPr>
-          <p:cNvPr id="11" name="Picture 10">
+      <p:sp>
+        <p:nvSpPr>
+          <p:cNvPr id="12" name="Title 11">
             <a:extLst>
               <a:ext uri="{FF2B5EF4-FFF2-40B4-BE49-F238E27FC236}">
-                <a16:creationId xmlns:a16="http://schemas.microsoft.com/office/drawing/2014/main" id="{CCECAC6C-27D9-4725-BCF7-9FA166726083}"/>
+                <a16:creationId xmlns:a16="http://schemas.microsoft.com/office/drawing/2014/main" id="{E5E24B97-4DF4-4829-A6FD-A723EAB61A54}"/>
               </a:ext>
             </a:extLst>
           </p:cNvPr>
-          <p:cNvPicPr>
-            <a:picLocks noChangeAspect="1"/>
-          </p:cNvPicPr>
-          <p:nvPr/>
-        </p:nvPicPr>
-        <p:blipFill>
-          <a:blip r:embed="rId2"/>
-          <a:stretch>
-            <a:fillRect/>
-          </a:stretch>
-        </p:blipFill>
-        <p:spPr>
-          <a:xfrm>
-            <a:off x="524933" y="1328311"/>
-            <a:ext cx="5019675" cy="4829175"/>
-          </a:xfrm>
-          <a:prstGeom prst="rect">
-            <a:avLst/>
-          </a:prstGeom>
-        </p:spPr>
-      </p:pic>
-      <p:sp>
-        <p:nvSpPr>
-          <p:cNvPr id="16" name="Arrow: Chevron 15">
+          <p:cNvSpPr>
+            <a:spLocks noGrp="1"/>
+          </p:cNvSpPr>
+          <p:nvPr>
+            <p:ph type="title" idx="4294967295"/>
+          </p:nvPr>
+        </p:nvSpPr>
+        <p:spPr>
+          <a:xfrm>
+            <a:off x="480484" y="317500"/>
+            <a:ext cx="10708216" cy="698500"/>
+          </a:xfrm>
+        </p:spPr>
+        <p:txBody>
+          <a:bodyPr/>
+          <a:lstStyle/>
+          <a:p>
+            <a:r>
+              <a:rPr lang="is-IS" sz="3200" dirty="0"/>
+              <a:t>Microservices</a:t>
+            </a:r>
+            <a:endParaRPr lang="da-DK" sz="3200" dirty="0"/>
+          </a:p>
+        </p:txBody>
+      </p:sp>
+      <p:sp>
+        <p:nvSpPr>
+          <p:cNvPr id="16" name="Rectangle 15">
             <a:extLst>
               <a:ext uri="{FF2B5EF4-FFF2-40B4-BE49-F238E27FC236}">
-                <a16:creationId xmlns:a16="http://schemas.microsoft.com/office/drawing/2014/main" id="{DC38A1FE-9193-48F3-980D-C7570E0226BE}"/>
+                <a16:creationId xmlns:a16="http://schemas.microsoft.com/office/drawing/2014/main" id="{76D49961-9D66-4027-BAF6-95C05D597384}"/>
               </a:ext>
             </a:extLst>
           </p:cNvPr>
@@ -21446,13 +22315,436 @@
         </p:nvSpPr>
         <p:spPr bwMode="gray">
           <a:xfrm>
-            <a:off x="5888325" y="3105030"/>
-            <a:ext cx="705332" cy="1146412"/>
-          </a:xfrm>
-          <a:prstGeom prst="chevron">
-            <a:avLst>
-              <a:gd name="adj" fmla="val 62286"/>
-            </a:avLst>
+            <a:off x="7349772" y="698629"/>
+            <a:ext cx="3465711" cy="1832128"/>
+          </a:xfrm>
+          <a:prstGeom prst="rect">
+            <a:avLst/>
+          </a:prstGeom>
+          <a:solidFill>
+            <a:schemeClr val="accent3"/>
+          </a:solidFill>
+          <a:ln w="19050" algn="ctr">
+            <a:solidFill>
+              <a:schemeClr val="accent1"/>
+            </a:solidFill>
+            <a:miter lim="800000"/>
+            <a:headEnd/>
+            <a:tailEnd/>
+          </a:ln>
+        </p:spPr>
+        <p:txBody>
+          <a:bodyPr wrap="square" lIns="36000" tIns="0" rIns="88900" bIns="88900" rtlCol="0" anchor="t"/>
+          <a:lstStyle/>
+          <a:p>
+            <a:pPr marL="514350" indent="-514350">
+              <a:lnSpc>
+                <a:spcPct val="106000"/>
+              </a:lnSpc>
+              <a:buFont typeface="Arial" panose="020B0604020202020204" pitchFamily="34" charset="0"/>
+              <a:buChar char="•"/>
+            </a:pPr>
+            <a:r>
+              <a:rPr lang="is-IS" sz="4800" b="1" dirty="0">
+                <a:solidFill>
+                  <a:schemeClr val="bg1"/>
+                </a:solidFill>
+              </a:rPr>
+              <a:t>Order Pizza</a:t>
+            </a:r>
+          </a:p>
+          <a:p>
+            <a:pPr marL="514350" indent="-514350">
+              <a:lnSpc>
+                <a:spcPct val="106000"/>
+              </a:lnSpc>
+              <a:buFont typeface="Arial" panose="020B0604020202020204" pitchFamily="34" charset="0"/>
+              <a:buChar char="•"/>
+            </a:pPr>
+            <a:r>
+              <a:rPr lang="is-IS" sz="4800" b="1" dirty="0">
+                <a:solidFill>
+                  <a:schemeClr val="bg1"/>
+                </a:solidFill>
+              </a:rPr>
+              <a:t>Make Pizza</a:t>
+            </a:r>
+          </a:p>
+        </p:txBody>
+      </p:sp>
+      <p:grpSp>
+        <p:nvGrpSpPr>
+          <p:cNvPr id="20" name="Group 19">
+            <a:extLst>
+              <a:ext uri="{FF2B5EF4-FFF2-40B4-BE49-F238E27FC236}">
+                <a16:creationId xmlns:a16="http://schemas.microsoft.com/office/drawing/2014/main" id="{5F803459-E889-4510-BDD8-45DF28AEFD5C}"/>
+              </a:ext>
+            </a:extLst>
+          </p:cNvPr>
+          <p:cNvGrpSpPr/>
+          <p:nvPr/>
+        </p:nvGrpSpPr>
+        <p:grpSpPr>
+          <a:xfrm>
+            <a:off x="7044972" y="4593866"/>
+            <a:ext cx="1922047" cy="801841"/>
+            <a:chOff x="6956482" y="3944937"/>
+            <a:chExt cx="1922047" cy="801841"/>
+          </a:xfrm>
+        </p:grpSpPr>
+        <p:sp>
+          <p:nvSpPr>
+            <p:cNvPr id="19" name="Rectangle 18">
+              <a:extLst>
+                <a:ext uri="{FF2B5EF4-FFF2-40B4-BE49-F238E27FC236}">
+                  <a16:creationId xmlns:a16="http://schemas.microsoft.com/office/drawing/2014/main" id="{9A6A24B3-592A-4C4B-AF54-0EF3884787AC}"/>
+                </a:ext>
+              </a:extLst>
+            </p:cNvPr>
+            <p:cNvSpPr/>
+            <p:nvPr/>
+          </p:nvSpPr>
+          <p:spPr bwMode="gray">
+            <a:xfrm>
+              <a:off x="7261282" y="4249737"/>
+              <a:ext cx="1617247" cy="497041"/>
+            </a:xfrm>
+            <a:prstGeom prst="rect">
+              <a:avLst/>
+            </a:prstGeom>
+            <a:solidFill>
+              <a:schemeClr val="accent3"/>
+            </a:solidFill>
+            <a:ln w="19050" algn="ctr">
+              <a:solidFill>
+                <a:schemeClr val="accent1"/>
+              </a:solidFill>
+              <a:miter lim="800000"/>
+              <a:headEnd/>
+              <a:tailEnd/>
+            </a:ln>
+          </p:spPr>
+          <p:txBody>
+            <a:bodyPr wrap="square" lIns="36000" tIns="0" rIns="88900" bIns="88900" rtlCol="0" anchor="t"/>
+            <a:lstStyle/>
+            <a:p>
+              <a:pPr>
+                <a:lnSpc>
+                  <a:spcPct val="106000"/>
+                </a:lnSpc>
+              </a:pPr>
+              <a:r>
+                <a:rPr lang="is-IS" sz="2400" b="1" dirty="0">
+                  <a:solidFill>
+                    <a:schemeClr val="bg1"/>
+                  </a:solidFill>
+                </a:rPr>
+                <a:t>Order pizza</a:t>
+              </a:r>
+            </a:p>
+          </p:txBody>
+        </p:sp>
+        <p:sp>
+          <p:nvSpPr>
+            <p:cNvPr id="18" name="Rectangle 17">
+              <a:extLst>
+                <a:ext uri="{FF2B5EF4-FFF2-40B4-BE49-F238E27FC236}">
+                  <a16:creationId xmlns:a16="http://schemas.microsoft.com/office/drawing/2014/main" id="{D8D68291-345D-474E-AE1E-9E945291C16F}"/>
+                </a:ext>
+              </a:extLst>
+            </p:cNvPr>
+            <p:cNvSpPr/>
+            <p:nvPr/>
+          </p:nvSpPr>
+          <p:spPr bwMode="gray">
+            <a:xfrm>
+              <a:off x="7108882" y="4097337"/>
+              <a:ext cx="1617247" cy="497041"/>
+            </a:xfrm>
+            <a:prstGeom prst="rect">
+              <a:avLst/>
+            </a:prstGeom>
+            <a:solidFill>
+              <a:schemeClr val="accent3"/>
+            </a:solidFill>
+            <a:ln w="19050" algn="ctr">
+              <a:solidFill>
+                <a:schemeClr val="accent1"/>
+              </a:solidFill>
+              <a:miter lim="800000"/>
+              <a:headEnd/>
+              <a:tailEnd/>
+            </a:ln>
+          </p:spPr>
+          <p:txBody>
+            <a:bodyPr wrap="square" lIns="36000" tIns="0" rIns="88900" bIns="88900" rtlCol="0" anchor="t"/>
+            <a:lstStyle/>
+            <a:p>
+              <a:pPr>
+                <a:lnSpc>
+                  <a:spcPct val="106000"/>
+                </a:lnSpc>
+              </a:pPr>
+              <a:r>
+                <a:rPr lang="is-IS" sz="2400" b="1" dirty="0">
+                  <a:solidFill>
+                    <a:schemeClr val="bg1"/>
+                  </a:solidFill>
+                </a:rPr>
+                <a:t>Order pizza</a:t>
+              </a:r>
+            </a:p>
+          </p:txBody>
+        </p:sp>
+        <p:sp>
+          <p:nvSpPr>
+            <p:cNvPr id="17" name="Rectangle 16">
+              <a:extLst>
+                <a:ext uri="{FF2B5EF4-FFF2-40B4-BE49-F238E27FC236}">
+                  <a16:creationId xmlns:a16="http://schemas.microsoft.com/office/drawing/2014/main" id="{30AC64B1-5BA6-4FDB-923E-5BC0E3ED8F14}"/>
+                </a:ext>
+              </a:extLst>
+            </p:cNvPr>
+            <p:cNvSpPr/>
+            <p:nvPr/>
+          </p:nvSpPr>
+          <p:spPr bwMode="gray">
+            <a:xfrm>
+              <a:off x="6956482" y="3944937"/>
+              <a:ext cx="1617247" cy="497041"/>
+            </a:xfrm>
+            <a:prstGeom prst="rect">
+              <a:avLst/>
+            </a:prstGeom>
+            <a:solidFill>
+              <a:schemeClr val="accent3"/>
+            </a:solidFill>
+            <a:ln w="19050" algn="ctr">
+              <a:solidFill>
+                <a:schemeClr val="accent1"/>
+              </a:solidFill>
+              <a:miter lim="800000"/>
+              <a:headEnd/>
+              <a:tailEnd/>
+            </a:ln>
+          </p:spPr>
+          <p:txBody>
+            <a:bodyPr wrap="square" lIns="36000" tIns="0" rIns="88900" bIns="88900" rtlCol="0" anchor="t"/>
+            <a:lstStyle/>
+            <a:p>
+              <a:pPr>
+                <a:lnSpc>
+                  <a:spcPct val="106000"/>
+                </a:lnSpc>
+              </a:pPr>
+              <a:r>
+                <a:rPr lang="is-IS" sz="2400" b="1" dirty="0">
+                  <a:solidFill>
+                    <a:schemeClr val="bg1"/>
+                  </a:solidFill>
+                </a:rPr>
+                <a:t>Order pizza</a:t>
+              </a:r>
+            </a:p>
+          </p:txBody>
+        </p:sp>
+      </p:grpSp>
+      <p:grpSp>
+        <p:nvGrpSpPr>
+          <p:cNvPr id="21" name="Group 20">
+            <a:extLst>
+              <a:ext uri="{FF2B5EF4-FFF2-40B4-BE49-F238E27FC236}">
+                <a16:creationId xmlns:a16="http://schemas.microsoft.com/office/drawing/2014/main" id="{86FB8F4A-5840-4652-8EE6-213D828D4E62}"/>
+              </a:ext>
+            </a:extLst>
+          </p:cNvPr>
+          <p:cNvGrpSpPr/>
+          <p:nvPr/>
+        </p:nvGrpSpPr>
+        <p:grpSpPr>
+          <a:xfrm>
+            <a:off x="9444043" y="4593866"/>
+            <a:ext cx="1922047" cy="801841"/>
+            <a:chOff x="6956482" y="3944937"/>
+            <a:chExt cx="1922047" cy="801841"/>
+          </a:xfrm>
+        </p:grpSpPr>
+        <p:sp>
+          <p:nvSpPr>
+            <p:cNvPr id="22" name="Rectangle 21">
+              <a:extLst>
+                <a:ext uri="{FF2B5EF4-FFF2-40B4-BE49-F238E27FC236}">
+                  <a16:creationId xmlns:a16="http://schemas.microsoft.com/office/drawing/2014/main" id="{FA7E9A90-C64D-44E8-B142-99459D0F6AE9}"/>
+                </a:ext>
+              </a:extLst>
+            </p:cNvPr>
+            <p:cNvSpPr/>
+            <p:nvPr/>
+          </p:nvSpPr>
+          <p:spPr bwMode="gray">
+            <a:xfrm>
+              <a:off x="7261282" y="4249737"/>
+              <a:ext cx="1617247" cy="497041"/>
+            </a:xfrm>
+            <a:prstGeom prst="rect">
+              <a:avLst/>
+            </a:prstGeom>
+            <a:solidFill>
+              <a:schemeClr val="accent3"/>
+            </a:solidFill>
+            <a:ln w="19050" algn="ctr">
+              <a:solidFill>
+                <a:schemeClr val="accent1"/>
+              </a:solidFill>
+              <a:miter lim="800000"/>
+              <a:headEnd/>
+              <a:tailEnd/>
+            </a:ln>
+          </p:spPr>
+          <p:txBody>
+            <a:bodyPr wrap="square" lIns="36000" tIns="0" rIns="88900" bIns="88900" rtlCol="0" anchor="t"/>
+            <a:lstStyle/>
+            <a:p>
+              <a:pPr>
+                <a:lnSpc>
+                  <a:spcPct val="106000"/>
+                </a:lnSpc>
+              </a:pPr>
+              <a:r>
+                <a:rPr lang="is-IS" sz="2400" b="1" dirty="0">
+                  <a:solidFill>
+                    <a:schemeClr val="bg1"/>
+                  </a:solidFill>
+                </a:rPr>
+                <a:t>Order pizza</a:t>
+              </a:r>
+            </a:p>
+          </p:txBody>
+        </p:sp>
+        <p:sp>
+          <p:nvSpPr>
+            <p:cNvPr id="23" name="Rectangle 22">
+              <a:extLst>
+                <a:ext uri="{FF2B5EF4-FFF2-40B4-BE49-F238E27FC236}">
+                  <a16:creationId xmlns:a16="http://schemas.microsoft.com/office/drawing/2014/main" id="{3D7E034D-715B-460F-B8E6-7CBA1475AAD1}"/>
+                </a:ext>
+              </a:extLst>
+            </p:cNvPr>
+            <p:cNvSpPr/>
+            <p:nvPr/>
+          </p:nvSpPr>
+          <p:spPr bwMode="gray">
+            <a:xfrm>
+              <a:off x="7108882" y="4097337"/>
+              <a:ext cx="1617247" cy="497041"/>
+            </a:xfrm>
+            <a:prstGeom prst="rect">
+              <a:avLst/>
+            </a:prstGeom>
+            <a:solidFill>
+              <a:schemeClr val="accent3"/>
+            </a:solidFill>
+            <a:ln w="19050" algn="ctr">
+              <a:solidFill>
+                <a:schemeClr val="accent1"/>
+              </a:solidFill>
+              <a:miter lim="800000"/>
+              <a:headEnd/>
+              <a:tailEnd/>
+            </a:ln>
+          </p:spPr>
+          <p:txBody>
+            <a:bodyPr wrap="square" lIns="36000" tIns="0" rIns="88900" bIns="88900" rtlCol="0" anchor="t"/>
+            <a:lstStyle/>
+            <a:p>
+              <a:pPr>
+                <a:lnSpc>
+                  <a:spcPct val="106000"/>
+                </a:lnSpc>
+              </a:pPr>
+              <a:r>
+                <a:rPr lang="is-IS" sz="2400" b="1" dirty="0">
+                  <a:solidFill>
+                    <a:schemeClr val="bg1"/>
+                  </a:solidFill>
+                </a:rPr>
+                <a:t>Order pizza</a:t>
+              </a:r>
+            </a:p>
+          </p:txBody>
+        </p:sp>
+        <p:sp>
+          <p:nvSpPr>
+            <p:cNvPr id="24" name="Rectangle 23">
+              <a:extLst>
+                <a:ext uri="{FF2B5EF4-FFF2-40B4-BE49-F238E27FC236}">
+                  <a16:creationId xmlns:a16="http://schemas.microsoft.com/office/drawing/2014/main" id="{02A85207-A48D-4188-B3D8-29E6BED2472A}"/>
+                </a:ext>
+              </a:extLst>
+            </p:cNvPr>
+            <p:cNvSpPr/>
+            <p:nvPr/>
+          </p:nvSpPr>
+          <p:spPr bwMode="gray">
+            <a:xfrm>
+              <a:off x="6956482" y="3944937"/>
+              <a:ext cx="1617247" cy="497041"/>
+            </a:xfrm>
+            <a:prstGeom prst="rect">
+              <a:avLst/>
+            </a:prstGeom>
+            <a:solidFill>
+              <a:schemeClr val="accent3"/>
+            </a:solidFill>
+            <a:ln w="19050" algn="ctr">
+              <a:solidFill>
+                <a:schemeClr val="accent1"/>
+              </a:solidFill>
+              <a:miter lim="800000"/>
+              <a:headEnd/>
+              <a:tailEnd/>
+            </a:ln>
+          </p:spPr>
+          <p:txBody>
+            <a:bodyPr wrap="square" lIns="36000" tIns="0" rIns="88900" bIns="88900" rtlCol="0" anchor="t"/>
+            <a:lstStyle/>
+            <a:p>
+              <a:pPr>
+                <a:lnSpc>
+                  <a:spcPct val="106000"/>
+                </a:lnSpc>
+              </a:pPr>
+              <a:r>
+                <a:rPr lang="is-IS" sz="2400" b="1" dirty="0">
+                  <a:solidFill>
+                    <a:schemeClr val="bg1"/>
+                  </a:solidFill>
+                </a:rPr>
+                <a:t>Make pizza</a:t>
+              </a:r>
+            </a:p>
+          </p:txBody>
+        </p:sp>
+      </p:grpSp>
+      <p:sp>
+        <p:nvSpPr>
+          <p:cNvPr id="25" name="Arrow: Down 24">
+            <a:extLst>
+              <a:ext uri="{FF2B5EF4-FFF2-40B4-BE49-F238E27FC236}">
+                <a16:creationId xmlns:a16="http://schemas.microsoft.com/office/drawing/2014/main" id="{6E6C5732-D41E-4C9A-8057-74206CC710C0}"/>
+              </a:ext>
+            </a:extLst>
+          </p:cNvPr>
+          <p:cNvSpPr/>
+          <p:nvPr/>
+        </p:nvSpPr>
+        <p:spPr bwMode="gray">
+          <a:xfrm>
+            <a:off x="8858943" y="3111910"/>
+            <a:ext cx="447368" cy="766916"/>
+          </a:xfrm>
+          <a:prstGeom prst="downArrow">
+            <a:avLst/>
           </a:prstGeom>
           <a:solidFill>
             <a:schemeClr val="accent3"/>
@@ -21483,40 +22775,10 @@
           </a:p>
         </p:txBody>
       </p:sp>
-      <p:pic>
-        <p:nvPicPr>
-          <p:cNvPr id="3" name="Picture 2">
-            <a:extLst>
-              <a:ext uri="{FF2B5EF4-FFF2-40B4-BE49-F238E27FC236}">
-                <a16:creationId xmlns:a16="http://schemas.microsoft.com/office/drawing/2014/main" id="{88720707-6D7B-4382-95CD-40E75001BCB4}"/>
-              </a:ext>
-            </a:extLst>
-          </p:cNvPr>
-          <p:cNvPicPr>
-            <a:picLocks noChangeAspect="1"/>
-          </p:cNvPicPr>
-          <p:nvPr/>
-        </p:nvPicPr>
-        <p:blipFill>
-          <a:blip r:embed="rId3"/>
-          <a:stretch>
-            <a:fillRect/>
-          </a:stretch>
-        </p:blipFill>
-        <p:spPr>
-          <a:xfrm>
-            <a:off x="6937374" y="1430336"/>
-            <a:ext cx="4038600" cy="4495800"/>
-          </a:xfrm>
-          <a:prstGeom prst="rect">
-            <a:avLst/>
-          </a:prstGeom>
-        </p:spPr>
-      </p:pic>
     </p:spTree>
     <p:extLst>
       <p:ext uri="{BB962C8B-B14F-4D97-AF65-F5344CB8AC3E}">
-        <p14:creationId xmlns:p14="http://schemas.microsoft.com/office/powerpoint/2010/main" val="557562315"/>
+        <p14:creationId xmlns:p14="http://schemas.microsoft.com/office/powerpoint/2010/main" val="3940561390"/>
       </p:ext>
     </p:extLst>
   </p:cSld>
@@ -21555,71 +22817,116 @@
           <a:chExt cx="0" cy="0"/>
         </a:xfrm>
       </p:grpSpPr>
-      <p:sp>
-        <p:nvSpPr>
-          <p:cNvPr id="6" name="Title 5">
+      <p:grpSp>
+        <p:nvGrpSpPr>
+          <p:cNvPr id="47" name="Group 46">
             <a:extLst>
               <a:ext uri="{FF2B5EF4-FFF2-40B4-BE49-F238E27FC236}">
-                <a16:creationId xmlns:a16="http://schemas.microsoft.com/office/drawing/2014/main" id="{991C4C60-D549-4836-B4EA-770904367F52}"/>
+                <a16:creationId xmlns:a16="http://schemas.microsoft.com/office/drawing/2014/main" id="{AB6068CF-DCFC-4AE9-AD35-C3F083600C3E}"/>
               </a:ext>
             </a:extLst>
           </p:cNvPr>
-          <p:cNvSpPr>
-            <a:spLocks noGrp="1"/>
-          </p:cNvSpPr>
-          <p:nvPr>
-            <p:ph type="title"/>
-          </p:nvPr>
-        </p:nvSpPr>
-        <p:spPr/>
-        <p:txBody>
-          <a:bodyPr/>
-          <a:lstStyle/>
-          <a:p>
-            <a:r>
-              <a:rPr lang="is-IS" dirty="0"/>
-              <a:t>Terraform – Instead of using the GUI</a:t>
-            </a:r>
-            <a:endParaRPr lang="da-DK" dirty="0"/>
-          </a:p>
-        </p:txBody>
-      </p:sp>
-      <p:pic>
-        <p:nvPicPr>
-          <p:cNvPr id="11" name="Picture 10">
+          <p:cNvGrpSpPr/>
+          <p:nvPr/>
+        </p:nvGrpSpPr>
+        <p:grpSpPr>
+          <a:xfrm>
+            <a:off x="5601437" y="3316928"/>
+            <a:ext cx="1643119" cy="938309"/>
+            <a:chOff x="4211995" y="596972"/>
+            <a:chExt cx="1643119" cy="938309"/>
+          </a:xfrm>
+        </p:grpSpPr>
+        <p:cxnSp>
+          <p:nvCxnSpPr>
+            <p:cNvPr id="48" name="Straight Arrow Connector 47">
+              <a:extLst>
+                <a:ext uri="{FF2B5EF4-FFF2-40B4-BE49-F238E27FC236}">
+                  <a16:creationId xmlns:a16="http://schemas.microsoft.com/office/drawing/2014/main" id="{B3BD923E-30B3-4207-AB0E-682876CBB684}"/>
+                </a:ext>
+              </a:extLst>
+            </p:cNvPr>
+            <p:cNvCxnSpPr>
+              <a:cxnSpLocks/>
+              <a:stCxn id="27" idx="2"/>
+              <a:endCxn id="50" idx="0"/>
+            </p:cNvCxnSpPr>
+            <p:nvPr/>
+          </p:nvCxnSpPr>
+          <p:spPr>
+            <a:xfrm flipH="1">
+              <a:off x="4211995" y="596972"/>
+              <a:ext cx="1643119" cy="914991"/>
+            </a:xfrm>
+            <a:prstGeom prst="straightConnector1">
+              <a:avLst/>
+            </a:prstGeom>
+            <a:ln w="19050">
+              <a:solidFill>
+                <a:schemeClr val="accent4"/>
+              </a:solidFill>
+              <a:headEnd type="triangle"/>
+              <a:tailEnd type="triangle"/>
+            </a:ln>
+          </p:spPr>
+          <p:style>
+            <a:lnRef idx="1">
+              <a:schemeClr val="accent1"/>
+            </a:lnRef>
+            <a:fillRef idx="0">
+              <a:schemeClr val="accent1"/>
+            </a:fillRef>
+            <a:effectRef idx="0">
+              <a:schemeClr val="accent1"/>
+            </a:effectRef>
+            <a:fontRef idx="minor">
+              <a:schemeClr val="tx1"/>
+            </a:fontRef>
+          </p:style>
+        </p:cxnSp>
+        <p:sp>
+          <p:nvSpPr>
+            <p:cNvPr id="49" name="TextBox 48">
+              <a:extLst>
+                <a:ext uri="{FF2B5EF4-FFF2-40B4-BE49-F238E27FC236}">
+                  <a16:creationId xmlns:a16="http://schemas.microsoft.com/office/drawing/2014/main" id="{B1E87A33-B1D5-47BC-8009-04B61ED16609}"/>
+                </a:ext>
+              </a:extLst>
+            </p:cNvPr>
+            <p:cNvSpPr txBox="1"/>
+            <p:nvPr/>
+          </p:nvSpPr>
+          <p:spPr bwMode="gray">
+            <a:xfrm>
+              <a:off x="5068259" y="1325628"/>
+              <a:ext cx="590550" cy="209653"/>
+            </a:xfrm>
+            <a:prstGeom prst="rect">
+              <a:avLst/>
+            </a:prstGeom>
+          </p:spPr>
+          <p:txBody>
+            <a:bodyPr vert="horz" wrap="square" lIns="0" tIns="0" rIns="0" bIns="0" rtlCol="0" anchor="b" anchorCtr="0">
+              <a:noAutofit/>
+            </a:bodyPr>
+            <a:lstStyle/>
+            <a:p>
+              <a:pPr algn="ctr"/>
+              <a:r>
+                <a:rPr lang="is-IS" dirty="0"/>
+                <a:t>AQMP</a:t>
+              </a:r>
+              <a:endParaRPr lang="da-DK" dirty="0"/>
+            </a:p>
+          </p:txBody>
+        </p:sp>
+      </p:grpSp>
+      <p:sp>
+        <p:nvSpPr>
+          <p:cNvPr id="50" name="Rectangle 49">
             <a:extLst>
               <a:ext uri="{FF2B5EF4-FFF2-40B4-BE49-F238E27FC236}">
-                <a16:creationId xmlns:a16="http://schemas.microsoft.com/office/drawing/2014/main" id="{CCECAC6C-27D9-4725-BCF7-9FA166726083}"/>
-              </a:ext>
-            </a:extLst>
-          </p:cNvPr>
-          <p:cNvPicPr>
-            <a:picLocks noChangeAspect="1"/>
-          </p:cNvPicPr>
-          <p:nvPr/>
-        </p:nvPicPr>
-        <p:blipFill>
-          <a:blip r:embed="rId2"/>
-          <a:stretch>
-            <a:fillRect/>
-          </a:stretch>
-        </p:blipFill>
-        <p:spPr>
-          <a:xfrm>
-            <a:off x="524933" y="1328311"/>
-            <a:ext cx="5019675" cy="4829175"/>
-          </a:xfrm>
-          <a:prstGeom prst="rect">
-            <a:avLst/>
-          </a:prstGeom>
-        </p:spPr>
-      </p:pic>
-      <p:sp>
-        <p:nvSpPr>
-          <p:cNvPr id="16" name="Arrow: Chevron 15">
-            <a:extLst>
-              <a:ext uri="{FF2B5EF4-FFF2-40B4-BE49-F238E27FC236}">
-                <a16:creationId xmlns:a16="http://schemas.microsoft.com/office/drawing/2014/main" id="{DC38A1FE-9193-48F3-980D-C7570E0226BE}"/>
+                <a16:creationId xmlns:a16="http://schemas.microsoft.com/office/drawing/2014/main" id="{4D8439DF-47D7-493E-BE6E-CFED61E43156}"/>
               </a:ext>
             </a:extLst>
           </p:cNvPr>
@@ -21628,26 +22935,26 @@
         </p:nvSpPr>
         <p:spPr bwMode="gray">
           <a:xfrm>
-            <a:off x="5888325" y="3105030"/>
-            <a:ext cx="705332" cy="1146412"/>
-          </a:xfrm>
-          <a:prstGeom prst="chevron">
-            <a:avLst>
-              <a:gd name="adj" fmla="val 62286"/>
-            </a:avLst>
+            <a:off x="5106874" y="4231919"/>
+            <a:ext cx="989126" cy="517236"/>
+          </a:xfrm>
+          <a:prstGeom prst="rect">
+            <a:avLst/>
           </a:prstGeom>
           <a:solidFill>
             <a:schemeClr val="accent3"/>
           </a:solidFill>
           <a:ln w="19050" algn="ctr">
-            <a:noFill/>
+            <a:solidFill>
+              <a:schemeClr val="accent1"/>
+            </a:solidFill>
             <a:miter lim="800000"/>
             <a:headEnd/>
             <a:tailEnd/>
           </a:ln>
         </p:spPr>
         <p:txBody>
-          <a:bodyPr wrap="square" lIns="88900" tIns="88900" rIns="88900" bIns="88900" rtlCol="0" anchor="ctr"/>
+          <a:bodyPr wrap="square" lIns="36000" tIns="0" rIns="88900" bIns="88900" rtlCol="0" anchor="ctr"/>
           <a:lstStyle/>
           <a:p>
             <a:pPr algn="ctr">
@@ -21657,7 +22964,15 @@
               <a:buFont typeface="Wingdings 2" pitchFamily="18" charset="2"/>
               <a:buNone/>
             </a:pPr>
-            <a:endParaRPr lang="da-DK" sz="1600" b="1" dirty="0">
+            <a:r>
+              <a:rPr lang="is-IS" sz="1600" b="1">
+                <a:solidFill>
+                  <a:schemeClr val="bg1"/>
+                </a:solidFill>
+              </a:rPr>
+              <a:t>RabbitMQ</a:t>
+            </a:r>
+            <a:endParaRPr lang="da-DK" sz="1600" b="1">
               <a:solidFill>
                 <a:schemeClr val="bg1"/>
               </a:solidFill>
@@ -21665,70 +22980,752 @@
           </a:p>
         </p:txBody>
       </p:sp>
-      <p:pic>
-        <p:nvPicPr>
-          <p:cNvPr id="3" name="Picture 2">
+      <p:grpSp>
+        <p:nvGrpSpPr>
+          <p:cNvPr id="53" name="Group 52">
             <a:extLst>
               <a:ext uri="{FF2B5EF4-FFF2-40B4-BE49-F238E27FC236}">
-                <a16:creationId xmlns:a16="http://schemas.microsoft.com/office/drawing/2014/main" id="{88720707-6D7B-4382-95CD-40E75001BCB4}"/>
+                <a16:creationId xmlns:a16="http://schemas.microsoft.com/office/drawing/2014/main" id="{635A5F9B-293B-4AF1-8B19-C8B0B5423AF5}"/>
               </a:ext>
             </a:extLst>
           </p:cNvPr>
-          <p:cNvPicPr>
-            <a:picLocks noChangeAspect="1"/>
-          </p:cNvPicPr>
+          <p:cNvGrpSpPr/>
           <p:nvPr/>
-        </p:nvPicPr>
-        <p:blipFill>
-          <a:blip r:embed="rId3"/>
-          <a:stretch>
-            <a:fillRect/>
-          </a:stretch>
-        </p:blipFill>
-        <p:spPr>
-          <a:xfrm>
-            <a:off x="6937374" y="1430336"/>
-            <a:ext cx="4038600" cy="4495800"/>
+        </p:nvGrpSpPr>
+        <p:grpSpPr>
+          <a:xfrm>
+            <a:off x="2611485" y="3616033"/>
+            <a:ext cx="2495389" cy="1094385"/>
+            <a:chOff x="2983528" y="-32909"/>
+            <a:chExt cx="2495391" cy="1094385"/>
+          </a:xfrm>
+        </p:grpSpPr>
+        <p:cxnSp>
+          <p:nvCxnSpPr>
+            <p:cNvPr id="54" name="Straight Arrow Connector 53">
+              <a:extLst>
+                <a:ext uri="{FF2B5EF4-FFF2-40B4-BE49-F238E27FC236}">
+                  <a16:creationId xmlns:a16="http://schemas.microsoft.com/office/drawing/2014/main" id="{E5A0B0F8-2EA9-43A0-A5F2-6C7B1783391F}"/>
+                </a:ext>
+              </a:extLst>
+            </p:cNvPr>
+            <p:cNvCxnSpPr>
+              <a:cxnSpLocks/>
+              <a:stCxn id="50" idx="1"/>
+              <a:endCxn id="58" idx="3"/>
+            </p:cNvCxnSpPr>
+            <p:nvPr/>
+          </p:nvCxnSpPr>
+          <p:spPr>
+            <a:xfrm flipH="1">
+              <a:off x="2983528" y="841595"/>
+              <a:ext cx="2495391" cy="219881"/>
+            </a:xfrm>
+            <a:prstGeom prst="straightConnector1">
+              <a:avLst/>
+            </a:prstGeom>
+            <a:ln w="19050">
+              <a:solidFill>
+                <a:schemeClr val="accent4"/>
+              </a:solidFill>
+              <a:headEnd type="triangle"/>
+              <a:tailEnd type="triangle"/>
+            </a:ln>
+          </p:spPr>
+          <p:style>
+            <a:lnRef idx="1">
+              <a:schemeClr val="accent1"/>
+            </a:lnRef>
+            <a:fillRef idx="0">
+              <a:schemeClr val="accent1"/>
+            </a:fillRef>
+            <a:effectRef idx="0">
+              <a:schemeClr val="accent1"/>
+            </a:effectRef>
+            <a:fontRef idx="minor">
+              <a:schemeClr val="tx1"/>
+            </a:fontRef>
+          </p:style>
+        </p:cxnSp>
+        <p:sp>
+          <p:nvSpPr>
+            <p:cNvPr id="55" name="TextBox 54">
+              <a:extLst>
+                <a:ext uri="{FF2B5EF4-FFF2-40B4-BE49-F238E27FC236}">
+                  <a16:creationId xmlns:a16="http://schemas.microsoft.com/office/drawing/2014/main" id="{0ACE5573-7789-4299-957C-E2A3BE9AAAA0}"/>
+                </a:ext>
+              </a:extLst>
+            </p:cNvPr>
+            <p:cNvSpPr txBox="1"/>
+            <p:nvPr/>
+          </p:nvSpPr>
+          <p:spPr bwMode="gray">
+            <a:xfrm>
+              <a:off x="4538018" y="-32909"/>
+              <a:ext cx="590550" cy="209653"/>
+            </a:xfrm>
+            <a:prstGeom prst="rect">
+              <a:avLst/>
+            </a:prstGeom>
+          </p:spPr>
+          <p:txBody>
+            <a:bodyPr vert="horz" wrap="square" lIns="0" tIns="0" rIns="0" bIns="0" rtlCol="0" anchor="b" anchorCtr="0">
+              <a:noAutofit/>
+            </a:bodyPr>
+            <a:lstStyle/>
+            <a:p>
+              <a:pPr algn="ctr"/>
+              <a:r>
+                <a:rPr lang="is-IS" dirty="0"/>
+                <a:t>AQMP</a:t>
+              </a:r>
+              <a:endParaRPr lang="da-DK" dirty="0"/>
+            </a:p>
+          </p:txBody>
+        </p:sp>
+      </p:grpSp>
+      <p:sp>
+        <p:nvSpPr>
+          <p:cNvPr id="64" name="Rectangle 63">
+            <a:extLst>
+              <a:ext uri="{FF2B5EF4-FFF2-40B4-BE49-F238E27FC236}">
+                <a16:creationId xmlns:a16="http://schemas.microsoft.com/office/drawing/2014/main" id="{7856B235-2F4D-46CD-83DD-C63BEA79F723}"/>
+              </a:ext>
+            </a:extLst>
+          </p:cNvPr>
+          <p:cNvSpPr/>
+          <p:nvPr/>
+        </p:nvSpPr>
+        <p:spPr bwMode="gray">
+          <a:xfrm>
+            <a:off x="10579219" y="3213116"/>
+            <a:ext cx="833149" cy="517236"/>
           </a:xfrm>
           <a:prstGeom prst="rect">
             <a:avLst/>
           </a:prstGeom>
-        </p:spPr>
-      </p:pic>
-      <p:pic>
-        <p:nvPicPr>
-          <p:cNvPr id="7" name="Picture 6">
+          <a:solidFill>
+            <a:schemeClr val="accent3"/>
+          </a:solidFill>
+          <a:ln w="19050" algn="ctr">
+            <a:solidFill>
+              <a:schemeClr val="accent1"/>
+            </a:solidFill>
+            <a:miter lim="800000"/>
+            <a:headEnd/>
+            <a:tailEnd/>
+          </a:ln>
+        </p:spPr>
+        <p:txBody>
+          <a:bodyPr wrap="square" lIns="36000" tIns="0" rIns="88900" bIns="88900" rtlCol="0" anchor="ctr"/>
+          <a:lstStyle/>
+          <a:p>
+            <a:pPr algn="ctr">
+              <a:lnSpc>
+                <a:spcPct val="106000"/>
+              </a:lnSpc>
+              <a:buFont typeface="Wingdings 2" pitchFamily="18" charset="2"/>
+              <a:buNone/>
+            </a:pPr>
+            <a:r>
+              <a:rPr lang="is-IS" sz="1600" b="1">
+                <a:solidFill>
+                  <a:schemeClr val="bg1"/>
+                </a:solidFill>
+              </a:rPr>
+              <a:t>Client</a:t>
+            </a:r>
+            <a:endParaRPr lang="da-DK" sz="1600" b="1">
+              <a:solidFill>
+                <a:schemeClr val="bg1"/>
+              </a:solidFill>
+            </a:endParaRPr>
+          </a:p>
+        </p:txBody>
+      </p:sp>
+      <p:grpSp>
+        <p:nvGrpSpPr>
+          <p:cNvPr id="65" name="Group 64">
             <a:extLst>
               <a:ext uri="{FF2B5EF4-FFF2-40B4-BE49-F238E27FC236}">
-                <a16:creationId xmlns:a16="http://schemas.microsoft.com/office/drawing/2014/main" id="{78DFD3DB-6378-49B0-924A-0C588CD55223}"/>
+                <a16:creationId xmlns:a16="http://schemas.microsoft.com/office/drawing/2014/main" id="{91CE3FDD-854E-4A80-BF09-7D9C9DF83A5A}"/>
               </a:ext>
             </a:extLst>
           </p:cNvPr>
-          <p:cNvPicPr>
-            <a:picLocks noChangeAspect="1"/>
-          </p:cNvPicPr>
+          <p:cNvGrpSpPr/>
           <p:nvPr/>
-        </p:nvPicPr>
-        <p:blipFill>
-          <a:blip r:embed="rId4"/>
-          <a:stretch>
-            <a:fillRect/>
-          </a:stretch>
-        </p:blipFill>
-        <p:spPr>
-          <a:xfrm>
-            <a:off x="6937374" y="1430336"/>
-            <a:ext cx="4686300" cy="4524375"/>
+        </p:nvGrpSpPr>
+        <p:grpSpPr>
+          <a:xfrm>
+            <a:off x="7661130" y="2820448"/>
+            <a:ext cx="2918089" cy="651286"/>
+            <a:chOff x="5148436" y="2281148"/>
+            <a:chExt cx="2369013" cy="776742"/>
+          </a:xfrm>
+        </p:grpSpPr>
+        <p:cxnSp>
+          <p:nvCxnSpPr>
+            <p:cNvPr id="66" name="Straight Arrow Connector 65">
+              <a:extLst>
+                <a:ext uri="{FF2B5EF4-FFF2-40B4-BE49-F238E27FC236}">
+                  <a16:creationId xmlns:a16="http://schemas.microsoft.com/office/drawing/2014/main" id="{EDB7C801-9C40-45B2-A39B-27CFBB114F4F}"/>
+                </a:ext>
+              </a:extLst>
+            </p:cNvPr>
+            <p:cNvCxnSpPr>
+              <a:cxnSpLocks/>
+              <a:stCxn id="64" idx="1"/>
+              <a:endCxn id="27" idx="3"/>
+            </p:cNvCxnSpPr>
+            <p:nvPr/>
+          </p:nvCxnSpPr>
+          <p:spPr>
+            <a:xfrm flipH="1" flipV="1">
+              <a:off x="5148436" y="2564829"/>
+              <a:ext cx="2369013" cy="493061"/>
+            </a:xfrm>
+            <a:prstGeom prst="straightConnector1">
+              <a:avLst/>
+            </a:prstGeom>
+            <a:ln w="19050">
+              <a:solidFill>
+                <a:schemeClr val="accent4"/>
+              </a:solidFill>
+              <a:tailEnd type="triangle"/>
+            </a:ln>
+          </p:spPr>
+          <p:style>
+            <a:lnRef idx="1">
+              <a:schemeClr val="accent1"/>
+            </a:lnRef>
+            <a:fillRef idx="0">
+              <a:schemeClr val="accent1"/>
+            </a:fillRef>
+            <a:effectRef idx="0">
+              <a:schemeClr val="accent1"/>
+            </a:effectRef>
+            <a:fontRef idx="minor">
+              <a:schemeClr val="tx1"/>
+            </a:fontRef>
+          </p:style>
+        </p:cxnSp>
+        <p:sp>
+          <p:nvSpPr>
+            <p:cNvPr id="67" name="TextBox 66">
+              <a:extLst>
+                <a:ext uri="{FF2B5EF4-FFF2-40B4-BE49-F238E27FC236}">
+                  <a16:creationId xmlns:a16="http://schemas.microsoft.com/office/drawing/2014/main" id="{93587449-5A43-4B6F-980C-14E6533E7F54}"/>
+                </a:ext>
+              </a:extLst>
+            </p:cNvPr>
+            <p:cNvSpPr txBox="1"/>
+            <p:nvPr/>
+          </p:nvSpPr>
+          <p:spPr bwMode="gray">
+            <a:xfrm>
+              <a:off x="6171924" y="2281148"/>
+              <a:ext cx="590550" cy="209653"/>
+            </a:xfrm>
+            <a:prstGeom prst="rect">
+              <a:avLst/>
+            </a:prstGeom>
+          </p:spPr>
+          <p:txBody>
+            <a:bodyPr vert="horz" wrap="square" lIns="0" tIns="0" rIns="0" bIns="0" rtlCol="0" anchor="b" anchorCtr="0">
+              <a:noAutofit/>
+            </a:bodyPr>
+            <a:lstStyle/>
+            <a:p>
+              <a:pPr algn="ctr"/>
+              <a:r>
+                <a:rPr lang="is-IS" dirty="0"/>
+                <a:t>HTTP</a:t>
+              </a:r>
+              <a:endParaRPr lang="da-DK" dirty="0"/>
+            </a:p>
+          </p:txBody>
+        </p:sp>
+      </p:grpSp>
+      <p:grpSp>
+        <p:nvGrpSpPr>
+          <p:cNvPr id="84" name="Group 83">
+            <a:extLst>
+              <a:ext uri="{FF2B5EF4-FFF2-40B4-BE49-F238E27FC236}">
+                <a16:creationId xmlns:a16="http://schemas.microsoft.com/office/drawing/2014/main" id="{D5B825D2-F8D6-45DC-8F4E-FE08D0E6134D}"/>
+              </a:ext>
+            </a:extLst>
+          </p:cNvPr>
+          <p:cNvGrpSpPr/>
+          <p:nvPr/>
+        </p:nvGrpSpPr>
+        <p:grpSpPr>
+          <a:xfrm>
+            <a:off x="6827981" y="2579965"/>
+            <a:ext cx="833149" cy="736963"/>
+            <a:chOff x="3935898" y="1117829"/>
+            <a:chExt cx="833149" cy="736963"/>
+          </a:xfrm>
+        </p:grpSpPr>
+        <p:grpSp>
+          <p:nvGrpSpPr>
+            <p:cNvPr id="82" name="Group 81">
+              <a:extLst>
+                <a:ext uri="{FF2B5EF4-FFF2-40B4-BE49-F238E27FC236}">
+                  <a16:creationId xmlns:a16="http://schemas.microsoft.com/office/drawing/2014/main" id="{7E16D1D7-D356-49DA-AE01-426E3DABFC01}"/>
+                </a:ext>
+              </a:extLst>
+            </p:cNvPr>
+            <p:cNvGrpSpPr/>
+            <p:nvPr/>
+          </p:nvGrpSpPr>
+          <p:grpSpPr>
+            <a:xfrm>
+              <a:off x="3935898" y="1337556"/>
+              <a:ext cx="833149" cy="517236"/>
+              <a:chOff x="3935898" y="1337556"/>
+              <a:chExt cx="833149" cy="517236"/>
+            </a:xfrm>
+          </p:grpSpPr>
+          <p:sp>
+            <p:nvSpPr>
+              <p:cNvPr id="27" name="Rectangle 26">
+                <a:extLst>
+                  <a:ext uri="{FF2B5EF4-FFF2-40B4-BE49-F238E27FC236}">
+                    <a16:creationId xmlns:a16="http://schemas.microsoft.com/office/drawing/2014/main" id="{C22D0508-E87B-4103-BB96-0147AF028CF7}"/>
+                  </a:ext>
+                </a:extLst>
+              </p:cNvPr>
+              <p:cNvSpPr/>
+              <p:nvPr/>
+            </p:nvSpPr>
+            <p:spPr bwMode="gray">
+              <a:xfrm>
+                <a:off x="3935898" y="1337556"/>
+                <a:ext cx="833149" cy="517236"/>
+              </a:xfrm>
+              <a:prstGeom prst="rect">
+                <a:avLst/>
+              </a:prstGeom>
+              <a:solidFill>
+                <a:schemeClr val="accent3"/>
+              </a:solidFill>
+              <a:ln w="19050" algn="ctr">
+                <a:solidFill>
+                  <a:schemeClr val="accent1"/>
+                </a:solidFill>
+                <a:miter lim="800000"/>
+                <a:headEnd/>
+                <a:tailEnd/>
+              </a:ln>
+            </p:spPr>
+            <p:txBody>
+              <a:bodyPr wrap="square" lIns="36000" tIns="0" rIns="88900" bIns="88900" rtlCol="0" anchor="t"/>
+              <a:lstStyle/>
+              <a:p>
+                <a:pPr>
+                  <a:lnSpc>
+                    <a:spcPct val="106000"/>
+                  </a:lnSpc>
+                  <a:buFont typeface="Wingdings 2" pitchFamily="18" charset="2"/>
+                  <a:buNone/>
+                </a:pPr>
+                <a:r>
+                  <a:rPr lang="is-IS" sz="1600" b="1" dirty="0">
+                    <a:solidFill>
+                      <a:schemeClr val="bg1"/>
+                    </a:solidFill>
+                  </a:rPr>
+                  <a:t>Pod</a:t>
+                </a:r>
+                <a:endParaRPr lang="da-DK" sz="1600" b="1" dirty="0">
+                  <a:solidFill>
+                    <a:schemeClr val="bg1"/>
+                  </a:solidFill>
+                </a:endParaRPr>
+              </a:p>
+            </p:txBody>
+          </p:sp>
+          <p:pic>
+            <p:nvPicPr>
+              <p:cNvPr id="28" name="Picture 27" descr="Icon&#10;&#10;Description automatically generated">
+                <a:extLst>
+                  <a:ext uri="{FF2B5EF4-FFF2-40B4-BE49-F238E27FC236}">
+                    <a16:creationId xmlns:a16="http://schemas.microsoft.com/office/drawing/2014/main" id="{54209226-7A36-42D6-85B7-AB326913E2C2}"/>
+                  </a:ext>
+                </a:extLst>
+              </p:cNvPr>
+              <p:cNvPicPr>
+                <a:picLocks noChangeAspect="1"/>
+              </p:cNvPicPr>
+              <p:nvPr/>
+            </p:nvPicPr>
+            <p:blipFill>
+              <a:blip r:embed="rId2"/>
+              <a:stretch>
+                <a:fillRect/>
+              </a:stretch>
+            </p:blipFill>
+            <p:spPr>
+              <a:xfrm>
+                <a:off x="4008118" y="1578244"/>
+                <a:ext cx="295005" cy="207916"/>
+              </a:xfrm>
+              <a:prstGeom prst="rect">
+                <a:avLst/>
+              </a:prstGeom>
+              <a:effectLst>
+                <a:glow rad="12700">
+                  <a:schemeClr val="bg1">
+                    <a:alpha val="65000"/>
+                  </a:schemeClr>
+                </a:glow>
+              </a:effectLst>
+            </p:spPr>
+          </p:pic>
+        </p:grpSp>
+        <p:sp>
+          <p:nvSpPr>
+            <p:cNvPr id="56" name="TextBox 55">
+              <a:extLst>
+                <a:ext uri="{FF2B5EF4-FFF2-40B4-BE49-F238E27FC236}">
+                  <a16:creationId xmlns:a16="http://schemas.microsoft.com/office/drawing/2014/main" id="{B603C23D-D622-484A-8DD8-10F958F44146}"/>
+                </a:ext>
+              </a:extLst>
+            </p:cNvPr>
+            <p:cNvSpPr txBox="1"/>
+            <p:nvPr/>
+          </p:nvSpPr>
+          <p:spPr bwMode="gray">
+            <a:xfrm>
+              <a:off x="3992466" y="1117829"/>
+              <a:ext cx="720012" cy="222254"/>
+            </a:xfrm>
+            <a:prstGeom prst="rect">
+              <a:avLst/>
+            </a:prstGeom>
+          </p:spPr>
+          <p:txBody>
+            <a:bodyPr vert="horz" wrap="square" lIns="0" tIns="0" rIns="0" bIns="0" rtlCol="0" anchor="b" anchorCtr="0">
+              <a:noAutofit/>
+            </a:bodyPr>
+            <a:lstStyle/>
+            <a:p>
+              <a:pPr algn="ctr"/>
+              <a:r>
+                <a:rPr lang="is-IS" sz="1400" dirty="0"/>
+                <a:t>Api</a:t>
+              </a:r>
+              <a:endParaRPr lang="da-DK" sz="1400" dirty="0"/>
+            </a:p>
+          </p:txBody>
+        </p:sp>
+      </p:grpSp>
+      <p:grpSp>
+        <p:nvGrpSpPr>
+          <p:cNvPr id="9" name="Group 8">
+            <a:extLst>
+              <a:ext uri="{FF2B5EF4-FFF2-40B4-BE49-F238E27FC236}">
+                <a16:creationId xmlns:a16="http://schemas.microsoft.com/office/drawing/2014/main" id="{30DA156D-0353-4348-9AB2-CB08612A7122}"/>
+              </a:ext>
+            </a:extLst>
+          </p:cNvPr>
+          <p:cNvGrpSpPr/>
+          <p:nvPr/>
+        </p:nvGrpSpPr>
+        <p:grpSpPr>
+          <a:xfrm>
+            <a:off x="1422245" y="4007290"/>
+            <a:ext cx="1189240" cy="1072280"/>
+            <a:chOff x="705382" y="2685967"/>
+            <a:chExt cx="833149" cy="751210"/>
+          </a:xfrm>
+        </p:grpSpPr>
+        <p:sp>
+          <p:nvSpPr>
+            <p:cNvPr id="58" name="Rectangle 57">
+              <a:extLst>
+                <a:ext uri="{FF2B5EF4-FFF2-40B4-BE49-F238E27FC236}">
+                  <a16:creationId xmlns:a16="http://schemas.microsoft.com/office/drawing/2014/main" id="{4BE60CB1-43B1-4F56-BEFF-7B69CCDF221A}"/>
+                </a:ext>
+              </a:extLst>
+            </p:cNvPr>
+            <p:cNvSpPr/>
+            <p:nvPr/>
+          </p:nvSpPr>
+          <p:spPr bwMode="gray">
+            <a:xfrm>
+              <a:off x="705382" y="2919941"/>
+              <a:ext cx="833149" cy="517236"/>
+            </a:xfrm>
+            <a:prstGeom prst="rect">
+              <a:avLst/>
+            </a:prstGeom>
+            <a:solidFill>
+              <a:schemeClr val="accent3"/>
+            </a:solidFill>
+            <a:ln w="19050" algn="ctr">
+              <a:solidFill>
+                <a:schemeClr val="accent1"/>
+              </a:solidFill>
+              <a:miter lim="800000"/>
+              <a:headEnd/>
+              <a:tailEnd/>
+            </a:ln>
+          </p:spPr>
+          <p:txBody>
+            <a:bodyPr wrap="square" lIns="36000" tIns="0" rIns="88900" bIns="88900" rtlCol="0" anchor="t"/>
+            <a:lstStyle/>
+            <a:p>
+              <a:pPr>
+                <a:lnSpc>
+                  <a:spcPct val="106000"/>
+                </a:lnSpc>
+                <a:buFont typeface="Wingdings 2" pitchFamily="18" charset="2"/>
+                <a:buNone/>
+              </a:pPr>
+              <a:r>
+                <a:rPr lang="is-IS" sz="1600" b="1" dirty="0">
+                  <a:solidFill>
+                    <a:schemeClr val="bg1"/>
+                  </a:solidFill>
+                </a:rPr>
+                <a:t>Pod</a:t>
+              </a:r>
+              <a:endParaRPr lang="da-DK" sz="1600" b="1" dirty="0">
+                <a:solidFill>
+                  <a:schemeClr val="bg1"/>
+                </a:solidFill>
+              </a:endParaRPr>
+            </a:p>
+          </p:txBody>
+        </p:sp>
+        <p:pic>
+          <p:nvPicPr>
+            <p:cNvPr id="59" name="Picture 58" descr="Icon&#10;&#10;Description automatically generated">
+              <a:extLst>
+                <a:ext uri="{FF2B5EF4-FFF2-40B4-BE49-F238E27FC236}">
+                  <a16:creationId xmlns:a16="http://schemas.microsoft.com/office/drawing/2014/main" id="{2B00B697-CCEE-4C25-B910-EF41F9A3A955}"/>
+                </a:ext>
+              </a:extLst>
+            </p:cNvPr>
+            <p:cNvPicPr>
+              <a:picLocks noChangeAspect="1"/>
+            </p:cNvPicPr>
+            <p:nvPr/>
+          </p:nvPicPr>
+          <p:blipFill>
+            <a:blip r:embed="rId2"/>
+            <a:stretch>
+              <a:fillRect/>
+            </a:stretch>
+          </p:blipFill>
+          <p:spPr>
+            <a:xfrm>
+              <a:off x="777602" y="3160629"/>
+              <a:ext cx="295005" cy="207916"/>
+            </a:xfrm>
+            <a:prstGeom prst="rect">
+              <a:avLst/>
+            </a:prstGeom>
+            <a:effectLst>
+              <a:glow rad="12700">
+                <a:schemeClr val="bg1">
+                  <a:alpha val="65000"/>
+                </a:schemeClr>
+              </a:glow>
+            </a:effectLst>
+          </p:spPr>
+        </p:pic>
+        <p:sp>
+          <p:nvSpPr>
+            <p:cNvPr id="57" name="TextBox 56">
+              <a:extLst>
+                <a:ext uri="{FF2B5EF4-FFF2-40B4-BE49-F238E27FC236}">
+                  <a16:creationId xmlns:a16="http://schemas.microsoft.com/office/drawing/2014/main" id="{8E1546DF-C754-48FF-97B6-1F92A9895628}"/>
+                </a:ext>
+              </a:extLst>
+            </p:cNvPr>
+            <p:cNvSpPr txBox="1"/>
+            <p:nvPr/>
+          </p:nvSpPr>
+          <p:spPr bwMode="gray">
+            <a:xfrm>
+              <a:off x="756892" y="2685967"/>
+              <a:ext cx="730128" cy="222254"/>
+            </a:xfrm>
+            <a:prstGeom prst="rect">
+              <a:avLst/>
+            </a:prstGeom>
+          </p:spPr>
+          <p:txBody>
+            <a:bodyPr vert="horz" wrap="square" lIns="0" tIns="0" rIns="0" bIns="0" rtlCol="0" anchor="b" anchorCtr="0">
+              <a:noAutofit/>
+            </a:bodyPr>
+            <a:lstStyle/>
+            <a:p>
+              <a:pPr algn="ctr"/>
+              <a:r>
+                <a:rPr lang="is-IS" sz="1400" dirty="0"/>
+                <a:t>Worker</a:t>
+              </a:r>
+              <a:endParaRPr lang="da-DK" sz="1400" dirty="0"/>
+            </a:p>
+          </p:txBody>
+        </p:sp>
+      </p:grpSp>
+      <p:sp>
+        <p:nvSpPr>
+          <p:cNvPr id="42" name="Title 11">
+            <a:extLst>
+              <a:ext uri="{FF2B5EF4-FFF2-40B4-BE49-F238E27FC236}">
+                <a16:creationId xmlns:a16="http://schemas.microsoft.com/office/drawing/2014/main" id="{4B575543-166F-4B64-82C2-00B071739A0F}"/>
+              </a:ext>
+            </a:extLst>
+          </p:cNvPr>
+          <p:cNvSpPr txBox="1">
+            <a:spLocks/>
+          </p:cNvSpPr>
+          <p:nvPr/>
+        </p:nvSpPr>
+        <p:spPr bwMode="gray">
+          <a:xfrm>
+            <a:off x="480484" y="317500"/>
+            <a:ext cx="10708216" cy="698500"/>
           </a:xfrm>
           <a:prstGeom prst="rect">
             <a:avLst/>
           </a:prstGeom>
         </p:spPr>
-      </p:pic>
+        <p:txBody>
+          <a:bodyPr vert="horz" lIns="0" tIns="0" rIns="0" bIns="0" rtlCol="0" anchor="t" anchorCtr="0">
+            <a:noAutofit/>
+          </a:bodyPr>
+          <a:lstStyle>
+            <a:lvl1pPr algn="l" defTabSz="914400" rtl="0" eaLnBrk="1" latinLnBrk="0" hangingPunct="1">
+              <a:spcBef>
+                <a:spcPct val="0"/>
+              </a:spcBef>
+              <a:buNone/>
+              <a:defRPr sz="2100" kern="1200">
+                <a:solidFill>
+                  <a:schemeClr val="tx1"/>
+                </a:solidFill>
+                <a:latin typeface="+mn-lt"/>
+                <a:ea typeface="+mj-ea"/>
+                <a:cs typeface="Calibri Light" panose="020F0302020204030204" pitchFamily="34" charset="0"/>
+              </a:defRPr>
+            </a:lvl1pPr>
+          </a:lstStyle>
+          <a:p>
+            <a:r>
+              <a:rPr lang="is-IS" sz="3200" dirty="0"/>
+              <a:t>Docker Desktop – Dev machine</a:t>
+            </a:r>
+            <a:endParaRPr lang="da-DK" sz="3200" dirty="0"/>
+          </a:p>
+        </p:txBody>
+      </p:sp>
     </p:spTree>
     <p:extLst>
       <p:ext uri="{BB962C8B-B14F-4D97-AF65-F5344CB8AC3E}">
-        <p14:creationId xmlns:p14="http://schemas.microsoft.com/office/powerpoint/2010/main" val="4148441264"/>
+        <p14:creationId xmlns:p14="http://schemas.microsoft.com/office/powerpoint/2010/main" val="2128354429"/>
+      </p:ext>
+    </p:extLst>
+  </p:cSld>
+  <p:clrMapOvr>
+    <a:masterClrMapping/>
+  </p:clrMapOvr>
+  <mc:AlternateContent xmlns:mc="http://schemas.openxmlformats.org/markup-compatibility/2006" xmlns:p14="http://schemas.microsoft.com/office/powerpoint/2010/main">
+    <mc:Choice Requires="p14">
+      <p:transition p14:dur="0"/>
+    </mc:Choice>
+    <mc:Fallback xmlns="">
+      <p:transition/>
+    </mc:Fallback>
+  </mc:AlternateContent>
+</p:sld>
+</file>
+
+<file path=ppt/slides/slide6.xml><?xml version="1.0" encoding="utf-8"?>
+<p:sld xmlns:a="http://schemas.openxmlformats.org/drawingml/2006/main" xmlns:r="http://schemas.openxmlformats.org/officeDocument/2006/relationships" xmlns:p="http://schemas.openxmlformats.org/presentationml/2006/main">
+  <p:cSld>
+    <p:spTree>
+      <p:nvGrpSpPr>
+        <p:cNvPr id="1" name=""/>
+        <p:cNvGrpSpPr/>
+        <p:nvPr/>
+      </p:nvGrpSpPr>
+      <p:grpSpPr>
+        <a:xfrm>
+          <a:off x="0" y="0"/>
+          <a:ext cx="0" cy="0"/>
+          <a:chOff x="0" y="0"/>
+          <a:chExt cx="0" cy="0"/>
+        </a:xfrm>
+      </p:grpSpPr>
+      <p:sp>
+        <p:nvSpPr>
+          <p:cNvPr id="2" name="TextBox 1">
+            <a:extLst>
+              <a:ext uri="{FF2B5EF4-FFF2-40B4-BE49-F238E27FC236}">
+                <a16:creationId xmlns:a16="http://schemas.microsoft.com/office/drawing/2014/main" id="{EE49E2E3-A8EE-49E1-8498-E1C0DFF4DD32}"/>
+              </a:ext>
+            </a:extLst>
+          </p:cNvPr>
+          <p:cNvSpPr txBox="1"/>
+          <p:nvPr/>
+        </p:nvSpPr>
+        <p:spPr bwMode="gray">
+          <a:xfrm>
+            <a:off x="530942" y="875071"/>
+            <a:ext cx="10677832" cy="4866968"/>
+          </a:xfrm>
+          <a:prstGeom prst="rect">
+            <a:avLst/>
+          </a:prstGeom>
+        </p:spPr>
+        <p:txBody>
+          <a:bodyPr vert="horz" wrap="square" lIns="0" tIns="0" rIns="0" bIns="0" rtlCol="0" anchor="ctr" anchorCtr="0">
+            <a:noAutofit/>
+          </a:bodyPr>
+          <a:lstStyle/>
+          <a:p>
+            <a:pPr algn="l"/>
+            <a:r>
+              <a:rPr lang="fr-FR" sz="4400" b="1" dirty="0"/>
+              <a:t>Code Repo:</a:t>
+            </a:r>
+          </a:p>
+          <a:p>
+            <a:pPr algn="l"/>
+            <a:r>
+              <a:rPr lang="fr-FR" sz="3600" dirty="0"/>
+              <a:t>https://dev.azure.com/dk-consulting-deloitte/DK DC SE </a:t>
+            </a:r>
+            <a:r>
+              <a:rPr lang="fr-FR" sz="3600" dirty="0" err="1"/>
+              <a:t>Developer</a:t>
+            </a:r>
+            <a:r>
+              <a:rPr lang="fr-FR" sz="3600" dirty="0"/>
+              <a:t> Courses/_git/</a:t>
+            </a:r>
+            <a:r>
+              <a:rPr lang="fr-FR" sz="3600" dirty="0" err="1"/>
+              <a:t>microservices</a:t>
+            </a:r>
+            <a:r>
+              <a:rPr lang="fr-FR" sz="3600" dirty="0"/>
+              <a:t>-course</a:t>
+            </a:r>
+            <a:endParaRPr lang="da-DK" sz="3600" dirty="0"/>
+          </a:p>
+        </p:txBody>
+      </p:sp>
+    </p:spTree>
+    <p:extLst>
+      <p:ext uri="{BB962C8B-B14F-4D97-AF65-F5344CB8AC3E}">
+        <p14:creationId xmlns:p14="http://schemas.microsoft.com/office/powerpoint/2010/main" val="866387091"/>
       </p:ext>
     </p:extLst>
   </p:cSld>
@@ -21750,7 +23747,363 @@
 </p:sld>
 </file>
 
-<file path=ppt/slides/slide6.xml><?xml version="1.0" encoding="utf-8"?>
+<file path=ppt/slides/slide7.xml><?xml version="1.0" encoding="utf-8"?>
+<p:sld xmlns:a="http://schemas.openxmlformats.org/drawingml/2006/main" xmlns:r="http://schemas.openxmlformats.org/officeDocument/2006/relationships" xmlns:p="http://schemas.openxmlformats.org/presentationml/2006/main">
+  <p:cSld>
+    <p:spTree>
+      <p:nvGrpSpPr>
+        <p:cNvPr id="1" name=""/>
+        <p:cNvGrpSpPr/>
+        <p:nvPr/>
+      </p:nvGrpSpPr>
+      <p:grpSpPr>
+        <a:xfrm>
+          <a:off x="0" y="0"/>
+          <a:ext cx="0" cy="0"/>
+          <a:chOff x="0" y="0"/>
+          <a:chExt cx="0" cy="0"/>
+        </a:xfrm>
+      </p:grpSpPr>
+      <p:pic>
+        <p:nvPicPr>
+          <p:cNvPr id="3" name="Picture 2">
+            <a:extLst>
+              <a:ext uri="{FF2B5EF4-FFF2-40B4-BE49-F238E27FC236}">
+                <a16:creationId xmlns:a16="http://schemas.microsoft.com/office/drawing/2014/main" id="{1D706C35-4CEA-467B-90B0-37F95268785A}"/>
+              </a:ext>
+            </a:extLst>
+          </p:cNvPr>
+          <p:cNvPicPr>
+            <a:picLocks noChangeAspect="1"/>
+          </p:cNvPicPr>
+          <p:nvPr/>
+        </p:nvPicPr>
+        <p:blipFill>
+          <a:blip r:embed="rId2"/>
+          <a:stretch>
+            <a:fillRect/>
+          </a:stretch>
+        </p:blipFill>
+        <p:spPr>
+          <a:xfrm>
+            <a:off x="8244059" y="117214"/>
+            <a:ext cx="3252997" cy="6623572"/>
+          </a:xfrm>
+          <a:prstGeom prst="rect">
+            <a:avLst/>
+          </a:prstGeom>
+        </p:spPr>
+      </p:pic>
+      <p:sp>
+        <p:nvSpPr>
+          <p:cNvPr id="4" name="Title 11">
+            <a:extLst>
+              <a:ext uri="{FF2B5EF4-FFF2-40B4-BE49-F238E27FC236}">
+                <a16:creationId xmlns:a16="http://schemas.microsoft.com/office/drawing/2014/main" id="{83AA7AC3-1161-40F3-BA03-76B523AB0049}"/>
+              </a:ext>
+            </a:extLst>
+          </p:cNvPr>
+          <p:cNvSpPr txBox="1">
+            <a:spLocks/>
+          </p:cNvSpPr>
+          <p:nvPr/>
+        </p:nvSpPr>
+        <p:spPr bwMode="gray">
+          <a:xfrm>
+            <a:off x="480484" y="317500"/>
+            <a:ext cx="7070690" cy="698500"/>
+          </a:xfrm>
+          <a:prstGeom prst="rect">
+            <a:avLst/>
+          </a:prstGeom>
+        </p:spPr>
+        <p:txBody>
+          <a:bodyPr vert="horz" lIns="0" tIns="0" rIns="0" bIns="0" rtlCol="0" anchor="t" anchorCtr="0">
+            <a:noAutofit/>
+          </a:bodyPr>
+          <a:lstStyle>
+            <a:lvl1pPr algn="l" defTabSz="914400" rtl="0" eaLnBrk="1" latinLnBrk="0" hangingPunct="1">
+              <a:spcBef>
+                <a:spcPct val="0"/>
+              </a:spcBef>
+              <a:buNone/>
+              <a:defRPr sz="2100" kern="1200">
+                <a:solidFill>
+                  <a:schemeClr val="tx1"/>
+                </a:solidFill>
+                <a:latin typeface="+mn-lt"/>
+                <a:ea typeface="+mj-ea"/>
+                <a:cs typeface="Calibri Light" panose="020F0302020204030204" pitchFamily="34" charset="0"/>
+              </a:defRPr>
+            </a:lvl1pPr>
+          </a:lstStyle>
+          <a:p>
+            <a:r>
+              <a:rPr lang="is-IS" sz="3200" dirty="0"/>
+              <a:t>Kubernetes</a:t>
+            </a:r>
+            <a:endParaRPr lang="da-DK" sz="3200" dirty="0"/>
+          </a:p>
+        </p:txBody>
+      </p:sp>
+      <p:sp>
+        <p:nvSpPr>
+          <p:cNvPr id="5" name="Text Placeholder 13">
+            <a:extLst>
+              <a:ext uri="{FF2B5EF4-FFF2-40B4-BE49-F238E27FC236}">
+                <a16:creationId xmlns:a16="http://schemas.microsoft.com/office/drawing/2014/main" id="{CEFA3894-8263-4712-850F-5CC594DB4825}"/>
+              </a:ext>
+            </a:extLst>
+          </p:cNvPr>
+          <p:cNvSpPr txBox="1">
+            <a:spLocks/>
+          </p:cNvSpPr>
+          <p:nvPr/>
+        </p:nvSpPr>
+        <p:spPr>
+          <a:xfrm>
+            <a:off x="480483" y="1590675"/>
+            <a:ext cx="7473813" cy="4708525"/>
+          </a:xfrm>
+          <a:prstGeom prst="rect">
+            <a:avLst/>
+          </a:prstGeom>
+        </p:spPr>
+        <p:txBody>
+          <a:bodyPr/>
+          <a:lstStyle>
+            <a:lvl1pPr marL="0" indent="0" algn="l" defTabSz="914400" rtl="0" eaLnBrk="1" latinLnBrk="0" hangingPunct="1">
+              <a:spcBef>
+                <a:spcPts val="0"/>
+              </a:spcBef>
+              <a:spcAft>
+                <a:spcPts val="1000"/>
+              </a:spcAft>
+              <a:buSzPct val="100000"/>
+              <a:buFont typeface="Arial" panose="020B0604020202020204" pitchFamily="34" charset="0"/>
+              <a:buNone/>
+              <a:defRPr sz="1300" b="0" kern="1200">
+                <a:solidFill>
+                  <a:schemeClr val="tx1"/>
+                </a:solidFill>
+                <a:latin typeface="+mn-lt"/>
+                <a:ea typeface="+mn-ea"/>
+                <a:cs typeface="Calibri Light" panose="020F0302020204030204" pitchFamily="34" charset="0"/>
+              </a:defRPr>
+            </a:lvl1pPr>
+            <a:lvl2pPr marL="0" indent="0" algn="l" defTabSz="914400" rtl="0" eaLnBrk="1" latinLnBrk="0" hangingPunct="1">
+              <a:spcBef>
+                <a:spcPts val="0"/>
+              </a:spcBef>
+              <a:spcAft>
+                <a:spcPts val="1000"/>
+              </a:spcAft>
+              <a:buClrTx/>
+              <a:buSzPct val="100000"/>
+              <a:buFont typeface="Arial"/>
+              <a:buNone/>
+              <a:defRPr lang="en-US" sz="1300" b="1" kern="1200" dirty="0" smtClean="0">
+                <a:solidFill>
+                  <a:schemeClr val="tx1"/>
+                </a:solidFill>
+                <a:latin typeface="+mj-lt"/>
+                <a:ea typeface="+mn-ea"/>
+                <a:cs typeface="Calibri Light" panose="020F0302020204030204" pitchFamily="34" charset="0"/>
+              </a:defRPr>
+            </a:lvl2pPr>
+            <a:lvl3pPr marL="176400" indent="-176400" algn="l" defTabSz="914400" rtl="0" eaLnBrk="1" latinLnBrk="0" hangingPunct="1">
+              <a:spcBef>
+                <a:spcPts val="0"/>
+              </a:spcBef>
+              <a:spcAft>
+                <a:spcPts val="1000"/>
+              </a:spcAft>
+              <a:buClrTx/>
+              <a:buSzPct val="100000"/>
+              <a:buFont typeface="Arial" panose="020B0604020202020204" pitchFamily="34" charset="0"/>
+              <a:buChar char="•"/>
+              <a:defRPr lang="en-US" sz="1300" kern="1200" dirty="0" smtClean="0">
+                <a:solidFill>
+                  <a:schemeClr val="tx1"/>
+                </a:solidFill>
+                <a:latin typeface="+mn-lt"/>
+                <a:ea typeface="+mn-ea"/>
+                <a:cs typeface="Calibri Light" panose="020F0302020204030204" pitchFamily="34" charset="0"/>
+              </a:defRPr>
+            </a:lvl3pPr>
+            <a:lvl4pPr marL="356400" indent="-176400" algn="l" defTabSz="914400" rtl="0" eaLnBrk="1" latinLnBrk="0" hangingPunct="1">
+              <a:spcBef>
+                <a:spcPts val="0"/>
+              </a:spcBef>
+              <a:spcAft>
+                <a:spcPts val="1000"/>
+              </a:spcAft>
+              <a:buClrTx/>
+              <a:buSzPct val="100000"/>
+              <a:buFont typeface="Verdana" panose="020B0604030504040204" pitchFamily="34" charset="0"/>
+              <a:buChar char="−"/>
+              <a:defRPr lang="en-US" sz="1300" kern="1200" baseline="0" dirty="0" smtClean="0">
+                <a:solidFill>
+                  <a:schemeClr val="tx1"/>
+                </a:solidFill>
+                <a:latin typeface="+mn-lt"/>
+                <a:ea typeface="+mn-ea"/>
+                <a:cs typeface="Calibri Light" panose="020F0302020204030204" pitchFamily="34" charset="0"/>
+              </a:defRPr>
+            </a:lvl4pPr>
+            <a:lvl5pPr marL="532800" indent="-176400" algn="l" defTabSz="798513" rtl="0" eaLnBrk="1" latinLnBrk="0" hangingPunct="1">
+              <a:spcBef>
+                <a:spcPts val="0"/>
+              </a:spcBef>
+              <a:spcAft>
+                <a:spcPts val="1000"/>
+              </a:spcAft>
+              <a:buClrTx/>
+              <a:buSzPct val="100000"/>
+              <a:buFont typeface="Verdana" panose="020B0604030504040204" pitchFamily="34" charset="0"/>
+              <a:buChar char="−"/>
+              <a:tabLst/>
+              <a:defRPr lang="en-US" sz="1300" kern="1200" baseline="0" dirty="0" smtClean="0">
+                <a:solidFill>
+                  <a:schemeClr val="tx1"/>
+                </a:solidFill>
+                <a:latin typeface="+mn-lt"/>
+                <a:ea typeface="+mn-ea"/>
+                <a:cs typeface="Calibri Light" panose="020F0302020204030204" pitchFamily="34" charset="0"/>
+              </a:defRPr>
+            </a:lvl5pPr>
+            <a:lvl6pPr marL="532800" indent="-176400" algn="l" defTabSz="914400" rtl="0" eaLnBrk="1" latinLnBrk="0" hangingPunct="1">
+              <a:spcBef>
+                <a:spcPts val="0"/>
+              </a:spcBef>
+              <a:spcAft>
+                <a:spcPts val="1000"/>
+              </a:spcAft>
+              <a:buFont typeface="Verdana" panose="020B0604030504040204" pitchFamily="34" charset="0"/>
+              <a:buChar char="−"/>
+              <a:defRPr sz="1200" kern="1200" baseline="0">
+                <a:solidFill>
+                  <a:schemeClr val="tx1"/>
+                </a:solidFill>
+                <a:latin typeface="+mn-lt"/>
+                <a:ea typeface="+mn-ea"/>
+                <a:cs typeface="+mn-cs"/>
+              </a:defRPr>
+            </a:lvl6pPr>
+            <a:lvl7pPr marL="532800" indent="-176400" algn="l" defTabSz="914400" rtl="0" eaLnBrk="1" latinLnBrk="0" hangingPunct="1">
+              <a:spcBef>
+                <a:spcPts val="0"/>
+              </a:spcBef>
+              <a:spcAft>
+                <a:spcPts val="1000"/>
+              </a:spcAft>
+              <a:buFont typeface="Verdana" panose="020B0604030504040204" pitchFamily="34" charset="0"/>
+              <a:buChar char="−"/>
+              <a:defRPr sz="1200" kern="1200">
+                <a:solidFill>
+                  <a:schemeClr val="tx1"/>
+                </a:solidFill>
+                <a:latin typeface="+mn-lt"/>
+                <a:ea typeface="+mn-ea"/>
+                <a:cs typeface="+mn-cs"/>
+              </a:defRPr>
+            </a:lvl7pPr>
+            <a:lvl8pPr marL="532800" indent="-176400" algn="l" defTabSz="914400" rtl="0" eaLnBrk="1" latinLnBrk="0" hangingPunct="1">
+              <a:spcBef>
+                <a:spcPts val="0"/>
+              </a:spcBef>
+              <a:spcAft>
+                <a:spcPts val="1000"/>
+              </a:spcAft>
+              <a:buFont typeface="Verdana" panose="020B0604030504040204" pitchFamily="34" charset="0"/>
+              <a:buChar char="−"/>
+              <a:defRPr sz="1200" kern="1200" baseline="0">
+                <a:solidFill>
+                  <a:schemeClr val="tx1"/>
+                </a:solidFill>
+                <a:latin typeface="+mn-lt"/>
+                <a:ea typeface="+mn-ea"/>
+                <a:cs typeface="+mn-cs"/>
+              </a:defRPr>
+            </a:lvl8pPr>
+            <a:lvl9pPr marL="532800" indent="-176400" algn="l" defTabSz="914400" rtl="0" eaLnBrk="1" latinLnBrk="0" hangingPunct="1">
+              <a:spcBef>
+                <a:spcPts val="0"/>
+              </a:spcBef>
+              <a:spcAft>
+                <a:spcPts val="1000"/>
+              </a:spcAft>
+              <a:buFont typeface="Verdana" panose="020B0604030504040204" pitchFamily="34" charset="0"/>
+              <a:buChar char="−"/>
+              <a:defRPr sz="1200" kern="1200" baseline="0">
+                <a:solidFill>
+                  <a:schemeClr val="tx1"/>
+                </a:solidFill>
+                <a:latin typeface="+mn-lt"/>
+                <a:ea typeface="+mn-ea"/>
+                <a:cs typeface="+mn-cs"/>
+              </a:defRPr>
+            </a:lvl9pPr>
+          </a:lstStyle>
+          <a:p>
+            <a:pPr marL="571500" indent="-571500">
+              <a:buFont typeface="Arial" panose="020B0604020202020204" pitchFamily="34" charset="0"/>
+              <a:buChar char="•"/>
+            </a:pPr>
+            <a:r>
+              <a:rPr lang="is-IS" sz="4400" dirty="0"/>
+              <a:t>Declarative vs Imperative</a:t>
+            </a:r>
+          </a:p>
+          <a:p>
+            <a:pPr marL="571500" indent="-571500">
+              <a:buFont typeface="Arial" panose="020B0604020202020204" pitchFamily="34" charset="0"/>
+              <a:buChar char="•"/>
+            </a:pPr>
+            <a:r>
+              <a:rPr lang="is-IS" sz="4400" dirty="0"/>
+              <a:t>Deployment options</a:t>
+            </a:r>
+          </a:p>
+          <a:p>
+            <a:pPr marL="571500" indent="-571500">
+              <a:buFont typeface="Arial" panose="020B0604020202020204" pitchFamily="34" charset="0"/>
+              <a:buChar char="•"/>
+            </a:pPr>
+            <a:r>
+              <a:rPr lang="is-IS" sz="4400" dirty="0"/>
+              <a:t>Horizontal vs Vertical scaling</a:t>
+            </a:r>
+            <a:endParaRPr lang="da-DK" sz="4400" dirty="0"/>
+          </a:p>
+        </p:txBody>
+      </p:sp>
+    </p:spTree>
+    <p:extLst>
+      <p:ext uri="{BB962C8B-B14F-4D97-AF65-F5344CB8AC3E}">
+        <p14:creationId xmlns:p14="http://schemas.microsoft.com/office/powerpoint/2010/main" val="2389672938"/>
+      </p:ext>
+    </p:extLst>
+  </p:cSld>
+  <p:clrMapOvr>
+    <a:masterClrMapping/>
+  </p:clrMapOvr>
+  <mc:AlternateContent xmlns:mc="http://schemas.openxmlformats.org/markup-compatibility/2006" xmlns:p159="http://schemas.microsoft.com/office/powerpoint/2015/09/main">
+    <mc:Choice Requires="p159">
+      <p:transition spd="slow">
+        <p159:morph option="byObject"/>
+      </p:transition>
+    </mc:Choice>
+    <mc:Fallback xmlns="">
+      <p:transition spd="slow">
+        <p:fade/>
+      </p:transition>
+    </mc:Fallback>
+  </mc:AlternateContent>
+</p:sld>
+</file>
+
+<file path=ppt/slides/slide8.xml><?xml version="1.0" encoding="utf-8"?>
 <p:sld xmlns:a="http://schemas.openxmlformats.org/drawingml/2006/main" xmlns:r="http://schemas.openxmlformats.org/officeDocument/2006/relationships" xmlns:p="http://schemas.openxmlformats.org/presentationml/2006/main">
   <p:cSld>
     <p:spTree>
@@ -23219,10 +25572,159 @@
           </a:fontRef>
         </p:style>
       </p:cxnSp>
+      <p:sp>
+        <p:nvSpPr>
+          <p:cNvPr id="39" name="Title 11">
+            <a:extLst>
+              <a:ext uri="{FF2B5EF4-FFF2-40B4-BE49-F238E27FC236}">
+                <a16:creationId xmlns:a16="http://schemas.microsoft.com/office/drawing/2014/main" id="{8A218B2A-57F8-4EE1-8DE8-B1452848D059}"/>
+              </a:ext>
+            </a:extLst>
+          </p:cNvPr>
+          <p:cNvSpPr txBox="1">
+            <a:spLocks/>
+          </p:cNvSpPr>
+          <p:nvPr/>
+        </p:nvSpPr>
+        <p:spPr bwMode="gray">
+          <a:xfrm>
+            <a:off x="480484" y="317500"/>
+            <a:ext cx="10708216" cy="698500"/>
+          </a:xfrm>
+          <a:prstGeom prst="rect">
+            <a:avLst/>
+          </a:prstGeom>
+        </p:spPr>
+        <p:txBody>
+          <a:bodyPr vert="horz" lIns="0" tIns="0" rIns="0" bIns="0" rtlCol="0" anchor="t" anchorCtr="0">
+            <a:noAutofit/>
+          </a:bodyPr>
+          <a:lstStyle>
+            <a:lvl1pPr algn="l" defTabSz="914400" rtl="0" eaLnBrk="1" latinLnBrk="0" hangingPunct="1">
+              <a:spcBef>
+                <a:spcPct val="0"/>
+              </a:spcBef>
+              <a:buNone/>
+              <a:defRPr sz="2100" kern="1200">
+                <a:solidFill>
+                  <a:schemeClr val="tx1"/>
+                </a:solidFill>
+                <a:latin typeface="+mn-lt"/>
+                <a:ea typeface="+mj-ea"/>
+                <a:cs typeface="Calibri Light" panose="020F0302020204030204" pitchFamily="34" charset="0"/>
+              </a:defRPr>
+            </a:lvl1pPr>
+          </a:lstStyle>
+          <a:p>
+            <a:r>
+              <a:rPr lang="is-IS" sz="3200" dirty="0"/>
+              <a:t>Kubernetes – Production</a:t>
+            </a:r>
+            <a:endParaRPr lang="da-DK" sz="3200" dirty="0"/>
+          </a:p>
+        </p:txBody>
+      </p:sp>
     </p:spTree>
     <p:extLst>
       <p:ext uri="{BB962C8B-B14F-4D97-AF65-F5344CB8AC3E}">
-        <p14:creationId xmlns:p14="http://schemas.microsoft.com/office/powerpoint/2010/main" val="2128354429"/>
+        <p14:creationId xmlns:p14="http://schemas.microsoft.com/office/powerpoint/2010/main" val="3188194670"/>
+      </p:ext>
+    </p:extLst>
+  </p:cSld>
+  <p:clrMapOvr>
+    <a:masterClrMapping/>
+  </p:clrMapOvr>
+  <mc:AlternateContent xmlns:mc="http://schemas.openxmlformats.org/markup-compatibility/2006" xmlns:p14="http://schemas.microsoft.com/office/powerpoint/2010/main">
+    <mc:Choice Requires="p14">
+      <p:transition p14:dur="0"/>
+    </mc:Choice>
+    <mc:Fallback xmlns="">
+      <p:transition/>
+    </mc:Fallback>
+  </mc:AlternateContent>
+</p:sld>
+</file>
+
+<file path=ppt/slides/slide9.xml><?xml version="1.0" encoding="utf-8"?>
+<p:sld xmlns:a="http://schemas.openxmlformats.org/drawingml/2006/main" xmlns:r="http://schemas.openxmlformats.org/officeDocument/2006/relationships" xmlns:p="http://schemas.openxmlformats.org/presentationml/2006/main">
+  <p:cSld>
+    <p:spTree>
+      <p:nvGrpSpPr>
+        <p:cNvPr id="1" name=""/>
+        <p:cNvGrpSpPr/>
+        <p:nvPr/>
+      </p:nvGrpSpPr>
+      <p:grpSpPr>
+        <a:xfrm>
+          <a:off x="0" y="0"/>
+          <a:ext cx="0" cy="0"/>
+          <a:chOff x="0" y="0"/>
+          <a:chExt cx="0" cy="0"/>
+        </a:xfrm>
+      </p:grpSpPr>
+      <p:sp>
+        <p:nvSpPr>
+          <p:cNvPr id="6" name="Title 5">
+            <a:extLst>
+              <a:ext uri="{FF2B5EF4-FFF2-40B4-BE49-F238E27FC236}">
+                <a16:creationId xmlns:a16="http://schemas.microsoft.com/office/drawing/2014/main" id="{991C4C60-D549-4836-B4EA-770904367F52}"/>
+              </a:ext>
+            </a:extLst>
+          </p:cNvPr>
+          <p:cNvSpPr>
+            <a:spLocks noGrp="1"/>
+          </p:cNvSpPr>
+          <p:nvPr>
+            <p:ph type="title"/>
+          </p:nvPr>
+        </p:nvSpPr>
+        <p:spPr/>
+        <p:txBody>
+          <a:bodyPr/>
+          <a:lstStyle/>
+          <a:p>
+            <a:r>
+              <a:rPr lang="is-IS" dirty="0"/>
+              <a:t>Terraform – Instead of using the GUI</a:t>
+            </a:r>
+            <a:endParaRPr lang="da-DK" dirty="0"/>
+          </a:p>
+        </p:txBody>
+      </p:sp>
+      <p:pic>
+        <p:nvPicPr>
+          <p:cNvPr id="11" name="Picture 10">
+            <a:extLst>
+              <a:ext uri="{FF2B5EF4-FFF2-40B4-BE49-F238E27FC236}">
+                <a16:creationId xmlns:a16="http://schemas.microsoft.com/office/drawing/2014/main" id="{CCECAC6C-27D9-4725-BCF7-9FA166726083}"/>
+              </a:ext>
+            </a:extLst>
+          </p:cNvPr>
+          <p:cNvPicPr>
+            <a:picLocks noChangeAspect="1"/>
+          </p:cNvPicPr>
+          <p:nvPr/>
+        </p:nvPicPr>
+        <p:blipFill>
+          <a:blip r:embed="rId2"/>
+          <a:stretch>
+            <a:fillRect/>
+          </a:stretch>
+        </p:blipFill>
+        <p:spPr>
+          <a:xfrm>
+            <a:off x="3586162" y="1328311"/>
+            <a:ext cx="5019675" cy="4829175"/>
+          </a:xfrm>
+          <a:prstGeom prst="rect">
+            <a:avLst/>
+          </a:prstGeom>
+        </p:spPr>
+      </p:pic>
+    </p:spTree>
+    <p:extLst>
+      <p:ext uri="{BB962C8B-B14F-4D97-AF65-F5344CB8AC3E}">
+        <p14:creationId xmlns:p14="http://schemas.microsoft.com/office/powerpoint/2010/main" val="2948531841"/>
       </p:ext>
     </p:extLst>
   </p:cSld>

</xml_diff>

<commit_message>
Improved the slide deck and the readme
</commit_message>
<xml_diff>
--- a/Microservices from the ground up.pptx
+++ b/Microservices from the ground up.pptx
@@ -13,10 +13,12 @@
     <p:sldId id="267" r:id="rId7"/>
     <p:sldId id="269" r:id="rId8"/>
     <p:sldId id="268" r:id="rId9"/>
-    <p:sldId id="260" r:id="rId10"/>
-    <p:sldId id="261" r:id="rId11"/>
-    <p:sldId id="264" r:id="rId12"/>
-    <p:sldId id="263" r:id="rId13"/>
+    <p:sldId id="287" r:id="rId10"/>
+    <p:sldId id="260" r:id="rId11"/>
+    <p:sldId id="261" r:id="rId12"/>
+    <p:sldId id="264" r:id="rId13"/>
+    <p:sldId id="263" r:id="rId14"/>
+    <p:sldId id="275" r:id="rId15"/>
   </p:sldIdLst>
   <p:sldSz cx="12192000" cy="6858000"/>
   <p:notesSz cx="7315200" cy="9601200"/>
@@ -12875,7 +12877,7 @@
           <a:graphicData uri="http://schemas.openxmlformats.org/presentationml/2006/ole">
             <mc:AlternateContent xmlns:mc="http://schemas.openxmlformats.org/markup-compatibility/2006">
               <mc:Choice xmlns:v="urn:schemas-microsoft-com:vml" Requires="v">
-                <p:oleObj spid="_x0000_s2055" name="think-cell Slide" r:id="rId5" imgW="360" imgH="360" progId="TCLayout.ActiveDocument.1">
+                <p:oleObj spid="_x0000_s2056" name="think-cell Slide" r:id="rId5" imgW="360" imgH="360" progId="TCLayout.ActiveDocument.1">
                   <p:embed/>
                 </p:oleObj>
               </mc:Choice>
@@ -14520,7 +14522,7 @@
           <a:graphicData uri="http://schemas.openxmlformats.org/presentationml/2006/ole">
             <mc:AlternateContent xmlns:mc="http://schemas.openxmlformats.org/markup-compatibility/2006">
               <mc:Choice xmlns:v="urn:schemas-microsoft-com:vml" Requires="v">
-                <p:oleObj spid="_x0000_s3079" name="think-cell Slide" r:id="rId5" imgW="473" imgH="473" progId="TCLayout.ActiveDocument.1">
+                <p:oleObj spid="_x0000_s3080" name="think-cell Slide" r:id="rId5" imgW="473" imgH="473" progId="TCLayout.ActiveDocument.1">
                   <p:embed/>
                 </p:oleObj>
               </mc:Choice>
@@ -16632,7 +16634,7 @@
           <a:graphicData uri="http://schemas.openxmlformats.org/presentationml/2006/ole">
             <mc:AlternateContent xmlns:mc="http://schemas.openxmlformats.org/markup-compatibility/2006">
               <mc:Choice xmlns:v="urn:schemas-microsoft-com:vml" Requires="v">
-                <p:oleObj spid="_x0000_s4103" name="think-cell Slide" r:id="rId5" imgW="360" imgH="360" progId="TCLayout.ActiveDocument.1">
+                <p:oleObj spid="_x0000_s4104" name="think-cell Slide" r:id="rId5" imgW="360" imgH="360" progId="TCLayout.ActiveDocument.1">
                   <p:embed/>
                 </p:oleObj>
               </mc:Choice>
@@ -20142,7 +20144,7 @@
           <a:graphicData uri="http://schemas.openxmlformats.org/presentationml/2006/ole">
             <mc:AlternateContent xmlns:mc="http://schemas.openxmlformats.org/markup-compatibility/2006">
               <mc:Choice xmlns:v="urn:schemas-microsoft-com:vml" Requires="v">
-                <p:oleObj spid="_x0000_s1031" name="think-cell Slide" r:id="rId47" imgW="270" imgH="270" progId="TCLayout.ActiveDocument.1">
+                <p:oleObj spid="_x0000_s1032" name="think-cell Slide" r:id="rId47" imgW="270" imgH="270" progId="TCLayout.ActiveDocument.1">
                   <p:embed/>
                 </p:oleObj>
               </mc:Choice>
@@ -21152,88 +21154,8 @@
         </p:blipFill>
         <p:spPr>
           <a:xfrm>
-            <a:off x="524933" y="1328311"/>
+            <a:off x="3586162" y="1328311"/>
             <a:ext cx="5019675" cy="4829175"/>
-          </a:xfrm>
-          <a:prstGeom prst="rect">
-            <a:avLst/>
-          </a:prstGeom>
-        </p:spPr>
-      </p:pic>
-      <p:sp>
-        <p:nvSpPr>
-          <p:cNvPr id="16" name="Arrow: Chevron 15">
-            <a:extLst>
-              <a:ext uri="{FF2B5EF4-FFF2-40B4-BE49-F238E27FC236}">
-                <a16:creationId xmlns:a16="http://schemas.microsoft.com/office/drawing/2014/main" id="{DC38A1FE-9193-48F3-980D-C7570E0226BE}"/>
-              </a:ext>
-            </a:extLst>
-          </p:cNvPr>
-          <p:cNvSpPr/>
-          <p:nvPr/>
-        </p:nvSpPr>
-        <p:spPr bwMode="gray">
-          <a:xfrm>
-            <a:off x="5888325" y="3105030"/>
-            <a:ext cx="705332" cy="1146412"/>
-          </a:xfrm>
-          <a:prstGeom prst="chevron">
-            <a:avLst>
-              <a:gd name="adj" fmla="val 62286"/>
-            </a:avLst>
-          </a:prstGeom>
-          <a:solidFill>
-            <a:schemeClr val="accent3"/>
-          </a:solidFill>
-          <a:ln w="19050" algn="ctr">
-            <a:noFill/>
-            <a:miter lim="800000"/>
-            <a:headEnd/>
-            <a:tailEnd/>
-          </a:ln>
-        </p:spPr>
-        <p:txBody>
-          <a:bodyPr wrap="square" lIns="88900" tIns="88900" rIns="88900" bIns="88900" rtlCol="0" anchor="ctr"/>
-          <a:lstStyle/>
-          <a:p>
-            <a:pPr algn="ctr">
-              <a:lnSpc>
-                <a:spcPct val="106000"/>
-              </a:lnSpc>
-              <a:buFont typeface="Wingdings 2" pitchFamily="18" charset="2"/>
-              <a:buNone/>
-            </a:pPr>
-            <a:endParaRPr lang="da-DK" sz="1600" b="1" dirty="0">
-              <a:solidFill>
-                <a:schemeClr val="bg1"/>
-              </a:solidFill>
-            </a:endParaRPr>
-          </a:p>
-        </p:txBody>
-      </p:sp>
-      <p:pic>
-        <p:nvPicPr>
-          <p:cNvPr id="3" name="Picture 2">
-            <a:extLst>
-              <a:ext uri="{FF2B5EF4-FFF2-40B4-BE49-F238E27FC236}">
-                <a16:creationId xmlns:a16="http://schemas.microsoft.com/office/drawing/2014/main" id="{88720707-6D7B-4382-95CD-40E75001BCB4}"/>
-              </a:ext>
-            </a:extLst>
-          </p:cNvPr>
-          <p:cNvPicPr>
-            <a:picLocks noChangeAspect="1"/>
-          </p:cNvPicPr>
-          <p:nvPr/>
-        </p:nvPicPr>
-        <p:blipFill rotWithShape="1">
-          <a:blip r:embed="rId3"/>
-          <a:srcRect t="32380"/>
-          <a:stretch/>
-        </p:blipFill>
-        <p:spPr>
-          <a:xfrm>
-            <a:off x="6937374" y="2158205"/>
-            <a:ext cx="4038600" cy="3040061"/>
           </a:xfrm>
           <a:prstGeom prst="rect">
             <a:avLst/>
@@ -21243,23 +21165,19 @@
     </p:spTree>
     <p:extLst>
       <p:ext uri="{BB962C8B-B14F-4D97-AF65-F5344CB8AC3E}">
-        <p14:creationId xmlns:p14="http://schemas.microsoft.com/office/powerpoint/2010/main" val="4133261997"/>
+        <p14:creationId xmlns:p14="http://schemas.microsoft.com/office/powerpoint/2010/main" val="2948531841"/>
       </p:ext>
     </p:extLst>
   </p:cSld>
   <p:clrMapOvr>
     <a:masterClrMapping/>
   </p:clrMapOvr>
-  <mc:AlternateContent xmlns:mc="http://schemas.openxmlformats.org/markup-compatibility/2006" xmlns:p159="http://schemas.microsoft.com/office/powerpoint/2015/09/main">
-    <mc:Choice Requires="p159">
-      <p:transition spd="slow">
-        <p159:morph option="byObject"/>
-      </p:transition>
+  <mc:AlternateContent xmlns:mc="http://schemas.openxmlformats.org/markup-compatibility/2006" xmlns:p14="http://schemas.microsoft.com/office/powerpoint/2010/main">
+    <mc:Choice Requires="p14">
+      <p:transition p14:dur="0"/>
     </mc:Choice>
     <mc:Fallback xmlns="">
-      <p:transition spd="slow">
-        <p:fade/>
-      </p:transition>
+      <p:transition/>
     </mc:Fallback>
   </mc:AlternateContent>
 </p:sld>
@@ -21406,16 +21324,15 @@
           </p:cNvPicPr>
           <p:nvPr/>
         </p:nvPicPr>
-        <p:blipFill>
+        <p:blipFill rotWithShape="1">
           <a:blip r:embed="rId3"/>
-          <a:stretch>
-            <a:fillRect/>
-          </a:stretch>
+          <a:srcRect t="32380"/>
+          <a:stretch/>
         </p:blipFill>
         <p:spPr>
           <a:xfrm>
-            <a:off x="6937374" y="1430336"/>
-            <a:ext cx="4038600" cy="4495800"/>
+            <a:off x="6937374" y="2158205"/>
+            <a:ext cx="4038600" cy="3040061"/>
           </a:xfrm>
           <a:prstGeom prst="rect">
             <a:avLst/>
@@ -21425,7 +21342,7 @@
     </p:spTree>
     <p:extLst>
       <p:ext uri="{BB962C8B-B14F-4D97-AF65-F5344CB8AC3E}">
-        <p14:creationId xmlns:p14="http://schemas.microsoft.com/office/powerpoint/2010/main" val="557562315"/>
+        <p14:creationId xmlns:p14="http://schemas.microsoft.com/office/powerpoint/2010/main" val="4133261997"/>
       </p:ext>
     </p:extLst>
   </p:cSld>
@@ -21604,6 +21521,188 @@
           </a:prstGeom>
         </p:spPr>
       </p:pic>
+    </p:spTree>
+    <p:extLst>
+      <p:ext uri="{BB962C8B-B14F-4D97-AF65-F5344CB8AC3E}">
+        <p14:creationId xmlns:p14="http://schemas.microsoft.com/office/powerpoint/2010/main" val="557562315"/>
+      </p:ext>
+    </p:extLst>
+  </p:cSld>
+  <p:clrMapOvr>
+    <a:masterClrMapping/>
+  </p:clrMapOvr>
+  <mc:AlternateContent xmlns:mc="http://schemas.openxmlformats.org/markup-compatibility/2006" xmlns:p159="http://schemas.microsoft.com/office/powerpoint/2015/09/main">
+    <mc:Choice Requires="p159">
+      <p:transition spd="slow">
+        <p159:morph option="byObject"/>
+      </p:transition>
+    </mc:Choice>
+    <mc:Fallback xmlns="">
+      <p:transition spd="slow">
+        <p:fade/>
+      </p:transition>
+    </mc:Fallback>
+  </mc:AlternateContent>
+</p:sld>
+</file>
+
+<file path=ppt/slides/slide13.xml><?xml version="1.0" encoding="utf-8"?>
+<p:sld xmlns:a="http://schemas.openxmlformats.org/drawingml/2006/main" xmlns:r="http://schemas.openxmlformats.org/officeDocument/2006/relationships" xmlns:p="http://schemas.openxmlformats.org/presentationml/2006/main">
+  <p:cSld>
+    <p:spTree>
+      <p:nvGrpSpPr>
+        <p:cNvPr id="1" name=""/>
+        <p:cNvGrpSpPr/>
+        <p:nvPr/>
+      </p:nvGrpSpPr>
+      <p:grpSpPr>
+        <a:xfrm>
+          <a:off x="0" y="0"/>
+          <a:ext cx="0" cy="0"/>
+          <a:chOff x="0" y="0"/>
+          <a:chExt cx="0" cy="0"/>
+        </a:xfrm>
+      </p:grpSpPr>
+      <p:sp>
+        <p:nvSpPr>
+          <p:cNvPr id="6" name="Title 5">
+            <a:extLst>
+              <a:ext uri="{FF2B5EF4-FFF2-40B4-BE49-F238E27FC236}">
+                <a16:creationId xmlns:a16="http://schemas.microsoft.com/office/drawing/2014/main" id="{991C4C60-D549-4836-B4EA-770904367F52}"/>
+              </a:ext>
+            </a:extLst>
+          </p:cNvPr>
+          <p:cNvSpPr>
+            <a:spLocks noGrp="1"/>
+          </p:cNvSpPr>
+          <p:nvPr>
+            <p:ph type="title"/>
+          </p:nvPr>
+        </p:nvSpPr>
+        <p:spPr/>
+        <p:txBody>
+          <a:bodyPr/>
+          <a:lstStyle/>
+          <a:p>
+            <a:r>
+              <a:rPr lang="is-IS" dirty="0"/>
+              <a:t>Terraform – Instead of using the GUI</a:t>
+            </a:r>
+            <a:endParaRPr lang="da-DK" dirty="0"/>
+          </a:p>
+        </p:txBody>
+      </p:sp>
+      <p:pic>
+        <p:nvPicPr>
+          <p:cNvPr id="11" name="Picture 10">
+            <a:extLst>
+              <a:ext uri="{FF2B5EF4-FFF2-40B4-BE49-F238E27FC236}">
+                <a16:creationId xmlns:a16="http://schemas.microsoft.com/office/drawing/2014/main" id="{CCECAC6C-27D9-4725-BCF7-9FA166726083}"/>
+              </a:ext>
+            </a:extLst>
+          </p:cNvPr>
+          <p:cNvPicPr>
+            <a:picLocks noChangeAspect="1"/>
+          </p:cNvPicPr>
+          <p:nvPr/>
+        </p:nvPicPr>
+        <p:blipFill>
+          <a:blip r:embed="rId2"/>
+          <a:stretch>
+            <a:fillRect/>
+          </a:stretch>
+        </p:blipFill>
+        <p:spPr>
+          <a:xfrm>
+            <a:off x="524933" y="1328311"/>
+            <a:ext cx="5019675" cy="4829175"/>
+          </a:xfrm>
+          <a:prstGeom prst="rect">
+            <a:avLst/>
+          </a:prstGeom>
+        </p:spPr>
+      </p:pic>
+      <p:sp>
+        <p:nvSpPr>
+          <p:cNvPr id="16" name="Arrow: Chevron 15">
+            <a:extLst>
+              <a:ext uri="{FF2B5EF4-FFF2-40B4-BE49-F238E27FC236}">
+                <a16:creationId xmlns:a16="http://schemas.microsoft.com/office/drawing/2014/main" id="{DC38A1FE-9193-48F3-980D-C7570E0226BE}"/>
+              </a:ext>
+            </a:extLst>
+          </p:cNvPr>
+          <p:cNvSpPr/>
+          <p:nvPr/>
+        </p:nvSpPr>
+        <p:spPr bwMode="gray">
+          <a:xfrm>
+            <a:off x="5888325" y="3105030"/>
+            <a:ext cx="705332" cy="1146412"/>
+          </a:xfrm>
+          <a:prstGeom prst="chevron">
+            <a:avLst>
+              <a:gd name="adj" fmla="val 62286"/>
+            </a:avLst>
+          </a:prstGeom>
+          <a:solidFill>
+            <a:schemeClr val="accent3"/>
+          </a:solidFill>
+          <a:ln w="19050" algn="ctr">
+            <a:noFill/>
+            <a:miter lim="800000"/>
+            <a:headEnd/>
+            <a:tailEnd/>
+          </a:ln>
+        </p:spPr>
+        <p:txBody>
+          <a:bodyPr wrap="square" lIns="88900" tIns="88900" rIns="88900" bIns="88900" rtlCol="0" anchor="ctr"/>
+          <a:lstStyle/>
+          <a:p>
+            <a:pPr algn="ctr">
+              <a:lnSpc>
+                <a:spcPct val="106000"/>
+              </a:lnSpc>
+              <a:buFont typeface="Wingdings 2" pitchFamily="18" charset="2"/>
+              <a:buNone/>
+            </a:pPr>
+            <a:endParaRPr lang="da-DK" sz="1600" b="1" dirty="0">
+              <a:solidFill>
+                <a:schemeClr val="bg1"/>
+              </a:solidFill>
+            </a:endParaRPr>
+          </a:p>
+        </p:txBody>
+      </p:sp>
+      <p:pic>
+        <p:nvPicPr>
+          <p:cNvPr id="3" name="Picture 2">
+            <a:extLst>
+              <a:ext uri="{FF2B5EF4-FFF2-40B4-BE49-F238E27FC236}">
+                <a16:creationId xmlns:a16="http://schemas.microsoft.com/office/drawing/2014/main" id="{88720707-6D7B-4382-95CD-40E75001BCB4}"/>
+              </a:ext>
+            </a:extLst>
+          </p:cNvPr>
+          <p:cNvPicPr>
+            <a:picLocks noChangeAspect="1"/>
+          </p:cNvPicPr>
+          <p:nvPr/>
+        </p:nvPicPr>
+        <p:blipFill>
+          <a:blip r:embed="rId3"/>
+          <a:stretch>
+            <a:fillRect/>
+          </a:stretch>
+        </p:blipFill>
+        <p:spPr>
+          <a:xfrm>
+            <a:off x="6937374" y="1430336"/>
+            <a:ext cx="4038600" cy="4495800"/>
+          </a:xfrm>
+          <a:prstGeom prst="rect">
+            <a:avLst/>
+          </a:prstGeom>
+        </p:spPr>
+      </p:pic>
       <p:pic>
         <p:nvPicPr>
           <p:cNvPr id="7" name="Picture 6">
@@ -21638,6 +21737,224 @@
     <p:extLst>
       <p:ext uri="{BB962C8B-B14F-4D97-AF65-F5344CB8AC3E}">
         <p14:creationId xmlns:p14="http://schemas.microsoft.com/office/powerpoint/2010/main" val="4148441264"/>
+      </p:ext>
+    </p:extLst>
+  </p:cSld>
+  <p:clrMapOvr>
+    <a:masterClrMapping/>
+  </p:clrMapOvr>
+  <mc:AlternateContent xmlns:mc="http://schemas.openxmlformats.org/markup-compatibility/2006" xmlns:p159="http://schemas.microsoft.com/office/powerpoint/2015/09/main">
+    <mc:Choice Requires="p159">
+      <p:transition spd="slow">
+        <p159:morph option="byObject"/>
+      </p:transition>
+    </mc:Choice>
+    <mc:Fallback xmlns="">
+      <p:transition spd="slow">
+        <p:fade/>
+      </p:transition>
+    </mc:Fallback>
+  </mc:AlternateContent>
+</p:sld>
+</file>
+
+<file path=ppt/slides/slide14.xml><?xml version="1.0" encoding="utf-8"?>
+<p:sld xmlns:a="http://schemas.openxmlformats.org/drawingml/2006/main" xmlns:r="http://schemas.openxmlformats.org/officeDocument/2006/relationships" xmlns:p="http://schemas.openxmlformats.org/presentationml/2006/main">
+  <p:cSld>
+    <p:spTree>
+      <p:nvGrpSpPr>
+        <p:cNvPr id="1" name=""/>
+        <p:cNvGrpSpPr/>
+        <p:nvPr/>
+      </p:nvGrpSpPr>
+      <p:grpSpPr>
+        <a:xfrm>
+          <a:off x="0" y="0"/>
+          <a:ext cx="0" cy="0"/>
+          <a:chOff x="0" y="0"/>
+          <a:chExt cx="0" cy="0"/>
+        </a:xfrm>
+      </p:grpSpPr>
+      <p:sp>
+        <p:nvSpPr>
+          <p:cNvPr id="6" name="Title 5">
+            <a:extLst>
+              <a:ext uri="{FF2B5EF4-FFF2-40B4-BE49-F238E27FC236}">
+                <a16:creationId xmlns:a16="http://schemas.microsoft.com/office/drawing/2014/main" id="{991C4C60-D549-4836-B4EA-770904367F52}"/>
+              </a:ext>
+            </a:extLst>
+          </p:cNvPr>
+          <p:cNvSpPr>
+            <a:spLocks noGrp="1"/>
+          </p:cNvSpPr>
+          <p:nvPr>
+            <p:ph type="title"/>
+          </p:nvPr>
+        </p:nvSpPr>
+        <p:spPr/>
+        <p:txBody>
+          <a:bodyPr/>
+          <a:lstStyle/>
+          <a:p>
+            <a:r>
+              <a:rPr lang="is-IS" dirty="0"/>
+              <a:t>Terraform – Instead of using the GUI</a:t>
+            </a:r>
+            <a:endParaRPr lang="da-DK" dirty="0"/>
+          </a:p>
+        </p:txBody>
+      </p:sp>
+      <p:pic>
+        <p:nvPicPr>
+          <p:cNvPr id="4" name="Graphic 3">
+            <a:extLst>
+              <a:ext uri="{FF2B5EF4-FFF2-40B4-BE49-F238E27FC236}">
+                <a16:creationId xmlns:a16="http://schemas.microsoft.com/office/drawing/2014/main" id="{BD7136EF-5FD6-4167-8FD2-92BA8C0FD4F3}"/>
+              </a:ext>
+            </a:extLst>
+          </p:cNvPr>
+          <p:cNvPicPr>
+            <a:picLocks noChangeAspect="1"/>
+          </p:cNvPicPr>
+          <p:nvPr/>
+        </p:nvPicPr>
+        <p:blipFill>
+          <a:blip r:embed="rId2">
+            <a:extLst>
+              <a:ext uri="{28A0092B-C50C-407E-A947-70E740481C1C}">
+                <a14:useLocalDpi xmlns:a14="http://schemas.microsoft.com/office/drawing/2010/main" val="0"/>
+              </a:ext>
+              <a:ext uri="{96DAC541-7B7A-43D3-8B79-37D633B846F1}">
+                <asvg:svgBlip xmlns:asvg="http://schemas.microsoft.com/office/drawing/2016/SVG/main" r:embed="rId3"/>
+              </a:ext>
+            </a:extLst>
+          </a:blip>
+          <a:stretch>
+            <a:fillRect/>
+          </a:stretch>
+        </p:blipFill>
+        <p:spPr>
+          <a:xfrm>
+            <a:off x="579365" y="1719694"/>
+            <a:ext cx="4485648" cy="4250181"/>
+          </a:xfrm>
+          <a:prstGeom prst="rect">
+            <a:avLst/>
+          </a:prstGeom>
+        </p:spPr>
+      </p:pic>
+      <p:grpSp>
+        <p:nvGrpSpPr>
+          <p:cNvPr id="12" name="Group 11">
+            <a:extLst>
+              <a:ext uri="{FF2B5EF4-FFF2-40B4-BE49-F238E27FC236}">
+                <a16:creationId xmlns:a16="http://schemas.microsoft.com/office/drawing/2014/main" id="{D7444BB0-A043-49B3-8384-528FD4BAEBE2}"/>
+              </a:ext>
+            </a:extLst>
+          </p:cNvPr>
+          <p:cNvGrpSpPr/>
+          <p:nvPr/>
+        </p:nvGrpSpPr>
+        <p:grpSpPr>
+          <a:xfrm>
+            <a:off x="6084359" y="2146363"/>
+            <a:ext cx="5349600" cy="3358698"/>
+            <a:chOff x="6084359" y="2146363"/>
+            <a:chExt cx="5349600" cy="3358698"/>
+          </a:xfrm>
+        </p:grpSpPr>
+        <p:cxnSp>
+          <p:nvCxnSpPr>
+            <p:cNvPr id="13" name="Straight Connector 12">
+              <a:extLst>
+                <a:ext uri="{FF2B5EF4-FFF2-40B4-BE49-F238E27FC236}">
+                  <a16:creationId xmlns:a16="http://schemas.microsoft.com/office/drawing/2014/main" id="{408CF122-32DB-4491-8D8B-44A7402039CE}"/>
+                </a:ext>
+              </a:extLst>
+            </p:cNvPr>
+            <p:cNvCxnSpPr/>
+            <p:nvPr/>
+          </p:nvCxnSpPr>
+          <p:spPr>
+            <a:xfrm>
+              <a:off x="9894627" y="3674073"/>
+              <a:ext cx="1073021" cy="0"/>
+            </a:xfrm>
+            <a:prstGeom prst="line">
+              <a:avLst/>
+            </a:prstGeom>
+            <a:ln>
+              <a:solidFill>
+                <a:schemeClr val="bg1"/>
+              </a:solidFill>
+            </a:ln>
+            <a:effectLst>
+              <a:glow rad="266700">
+                <a:schemeClr val="tx1">
+                  <a:alpha val="40000"/>
+                </a:schemeClr>
+              </a:glow>
+            </a:effectLst>
+          </p:spPr>
+          <p:style>
+            <a:lnRef idx="1">
+              <a:schemeClr val="accent1"/>
+            </a:lnRef>
+            <a:fillRef idx="0">
+              <a:schemeClr val="accent1"/>
+            </a:fillRef>
+            <a:effectRef idx="0">
+              <a:schemeClr val="accent1"/>
+            </a:effectRef>
+            <a:fontRef idx="minor">
+              <a:schemeClr val="tx1"/>
+            </a:fontRef>
+          </p:style>
+        </p:cxnSp>
+        <p:pic>
+          <p:nvPicPr>
+            <p:cNvPr id="14" name="Graphic 13">
+              <a:extLst>
+                <a:ext uri="{FF2B5EF4-FFF2-40B4-BE49-F238E27FC236}">
+                  <a16:creationId xmlns:a16="http://schemas.microsoft.com/office/drawing/2014/main" id="{7C413CC0-C2C7-42E1-8ADF-D8B383ACDDCB}"/>
+                </a:ext>
+              </a:extLst>
+            </p:cNvPr>
+            <p:cNvPicPr>
+              <a:picLocks noChangeAspect="1"/>
+            </p:cNvPicPr>
+            <p:nvPr/>
+          </p:nvPicPr>
+          <p:blipFill>
+            <a:blip r:embed="rId4">
+              <a:extLst>
+                <a:ext uri="{28A0092B-C50C-407E-A947-70E740481C1C}">
+                  <a14:useLocalDpi xmlns:a14="http://schemas.microsoft.com/office/drawing/2010/main" val="0"/>
+                </a:ext>
+                <a:ext uri="{96DAC541-7B7A-43D3-8B79-37D633B846F1}">
+                  <asvg:svgBlip xmlns:asvg="http://schemas.microsoft.com/office/drawing/2016/SVG/main" r:embed="rId5"/>
+                </a:ext>
+              </a:extLst>
+            </a:blip>
+            <a:stretch>
+              <a:fillRect/>
+            </a:stretch>
+          </p:blipFill>
+          <p:spPr>
+            <a:xfrm>
+              <a:off x="6084359" y="2146363"/>
+              <a:ext cx="5349600" cy="3358698"/>
+            </a:xfrm>
+            <a:prstGeom prst="rect">
+              <a:avLst/>
+            </a:prstGeom>
+          </p:spPr>
+        </p:pic>
+      </p:grpSp>
+    </p:spTree>
+    <p:extLst>
+      <p:ext uri="{BB962C8B-B14F-4D97-AF65-F5344CB8AC3E}">
+        <p14:creationId xmlns:p14="http://schemas.microsoft.com/office/powerpoint/2010/main" val="1103994897"/>
       </p:ext>
     </p:extLst>
   </p:cSld>
@@ -25662,81 +25979,166 @@
           <a:chExt cx="0" cy="0"/>
         </a:xfrm>
       </p:grpSpPr>
-      <p:sp>
-        <p:nvSpPr>
-          <p:cNvPr id="6" name="Title 5">
+      <p:cxnSp>
+        <p:nvCxnSpPr>
+          <p:cNvPr id="6" name="Straight Connector 5">
             <a:extLst>
               <a:ext uri="{FF2B5EF4-FFF2-40B4-BE49-F238E27FC236}">
-                <a16:creationId xmlns:a16="http://schemas.microsoft.com/office/drawing/2014/main" id="{991C4C60-D549-4836-B4EA-770904367F52}"/>
+                <a16:creationId xmlns:a16="http://schemas.microsoft.com/office/drawing/2014/main" id="{C23B52FD-4BEB-4D4A-B3F0-F20B401D074D}"/>
               </a:ext>
             </a:extLst>
           </p:cNvPr>
-          <p:cNvSpPr>
-            <a:spLocks noGrp="1"/>
-          </p:cNvSpPr>
-          <p:nvPr>
-            <p:ph type="title"/>
-          </p:nvPr>
-        </p:nvSpPr>
-        <p:spPr/>
-        <p:txBody>
-          <a:bodyPr/>
-          <a:lstStyle/>
-          <a:p>
-            <a:r>
-              <a:rPr lang="is-IS" dirty="0"/>
-              <a:t>Terraform – Instead of using the GUI</a:t>
-            </a:r>
-            <a:endParaRPr lang="da-DK" dirty="0"/>
-          </a:p>
-        </p:txBody>
-      </p:sp>
+          <p:cNvCxnSpPr>
+            <a:cxnSpLocks/>
+          </p:cNvCxnSpPr>
+          <p:nvPr/>
+        </p:nvCxnSpPr>
+        <p:spPr>
+          <a:xfrm>
+            <a:off x="8137264" y="4488461"/>
+            <a:ext cx="1073021" cy="0"/>
+          </a:xfrm>
+          <a:prstGeom prst="line">
+            <a:avLst/>
+          </a:prstGeom>
+          <a:ln>
+            <a:solidFill>
+              <a:schemeClr val="bg1"/>
+            </a:solidFill>
+          </a:ln>
+          <a:effectLst>
+            <a:glow rad="266700">
+              <a:schemeClr val="tx1">
+                <a:alpha val="40000"/>
+              </a:schemeClr>
+            </a:glow>
+          </a:effectLst>
+        </p:spPr>
+        <p:style>
+          <a:lnRef idx="1">
+            <a:schemeClr val="accent1"/>
+          </a:lnRef>
+          <a:fillRef idx="0">
+            <a:schemeClr val="accent1"/>
+          </a:fillRef>
+          <a:effectRef idx="0">
+            <a:schemeClr val="accent1"/>
+          </a:effectRef>
+          <a:fontRef idx="minor">
+            <a:schemeClr val="tx1"/>
+          </a:fontRef>
+        </p:style>
+      </p:cxnSp>
       <p:pic>
         <p:nvPicPr>
-          <p:cNvPr id="11" name="Picture 10">
+          <p:cNvPr id="5" name="Content Placeholder 4">
             <a:extLst>
               <a:ext uri="{FF2B5EF4-FFF2-40B4-BE49-F238E27FC236}">
-                <a16:creationId xmlns:a16="http://schemas.microsoft.com/office/drawing/2014/main" id="{CCECAC6C-27D9-4725-BCF7-9FA166726083}"/>
+                <a16:creationId xmlns:a16="http://schemas.microsoft.com/office/drawing/2014/main" id="{F408D0DA-8743-4B15-8B32-D2CD65FCA753}"/>
               </a:ext>
             </a:extLst>
           </p:cNvPr>
           <p:cNvPicPr>
-            <a:picLocks noChangeAspect="1"/>
+            <a:picLocks noGrp="1" noChangeAspect="1"/>
           </p:cNvPicPr>
-          <p:nvPr/>
+          <p:nvPr>
+            <p:ph idx="1"/>
+          </p:nvPr>
         </p:nvPicPr>
         <p:blipFill>
-          <a:blip r:embed="rId2"/>
+          <a:blip r:embed="rId2">
+            <a:extLst>
+              <a:ext uri="{28A0092B-C50C-407E-A947-70E740481C1C}">
+                <a14:useLocalDpi xmlns:a14="http://schemas.microsoft.com/office/drawing/2010/main" val="0"/>
+              </a:ext>
+              <a:ext uri="{96DAC541-7B7A-43D3-8B79-37D633B846F1}">
+                <asvg:svgBlip xmlns:asvg="http://schemas.microsoft.com/office/drawing/2016/SVG/main" r:embed="rId3"/>
+              </a:ext>
+            </a:extLst>
+          </a:blip>
           <a:stretch>
             <a:fillRect/>
           </a:stretch>
         </p:blipFill>
         <p:spPr>
           <a:xfrm>
-            <a:off x="3586162" y="1328311"/>
-            <a:ext cx="5019675" cy="4829175"/>
+            <a:off x="1798702" y="1146311"/>
+            <a:ext cx="8570784" cy="5283076"/>
+          </a:xfrm>
+        </p:spPr>
+      </p:pic>
+      <p:sp>
+        <p:nvSpPr>
+          <p:cNvPr id="11" name="Title 11">
+            <a:extLst>
+              <a:ext uri="{FF2B5EF4-FFF2-40B4-BE49-F238E27FC236}">
+                <a16:creationId xmlns:a16="http://schemas.microsoft.com/office/drawing/2014/main" id="{F563F8E3-651B-4F4B-951F-15EDD8222EB6}"/>
+              </a:ext>
+            </a:extLst>
+          </p:cNvPr>
+          <p:cNvSpPr txBox="1">
+            <a:spLocks/>
+          </p:cNvSpPr>
+          <p:nvPr/>
+        </p:nvSpPr>
+        <p:spPr bwMode="gray">
+          <a:xfrm>
+            <a:off x="480484" y="317500"/>
+            <a:ext cx="10708216" cy="698500"/>
           </a:xfrm>
           <a:prstGeom prst="rect">
             <a:avLst/>
           </a:prstGeom>
         </p:spPr>
-      </p:pic>
+        <p:txBody>
+          <a:bodyPr vert="horz" lIns="0" tIns="0" rIns="0" bIns="0" rtlCol="0" anchor="t" anchorCtr="0">
+            <a:noAutofit/>
+          </a:bodyPr>
+          <a:lstStyle>
+            <a:lvl1pPr algn="l" defTabSz="914400" rtl="0" eaLnBrk="1" latinLnBrk="0" hangingPunct="1">
+              <a:spcBef>
+                <a:spcPct val="0"/>
+              </a:spcBef>
+              <a:buNone/>
+              <a:defRPr sz="2100" kern="1200">
+                <a:solidFill>
+                  <a:schemeClr val="tx1"/>
+                </a:solidFill>
+                <a:latin typeface="+mn-lt"/>
+                <a:ea typeface="+mj-ea"/>
+                <a:cs typeface="Calibri Light" panose="020F0302020204030204" pitchFamily="34" charset="0"/>
+              </a:defRPr>
+            </a:lvl1pPr>
+          </a:lstStyle>
+          <a:p>
+            <a:r>
+              <a:rPr lang="is-IS" sz="3200" dirty="0"/>
+              <a:t>End result</a:t>
+            </a:r>
+            <a:endParaRPr lang="da-DK" sz="3200" dirty="0"/>
+          </a:p>
+        </p:txBody>
+      </p:sp>
     </p:spTree>
     <p:extLst>
       <p:ext uri="{BB962C8B-B14F-4D97-AF65-F5344CB8AC3E}">
-        <p14:creationId xmlns:p14="http://schemas.microsoft.com/office/powerpoint/2010/main" val="2948531841"/>
+        <p14:creationId xmlns:p14="http://schemas.microsoft.com/office/powerpoint/2010/main" val="4084940906"/>
       </p:ext>
     </p:extLst>
   </p:cSld>
   <p:clrMapOvr>
     <a:masterClrMapping/>
   </p:clrMapOvr>
-  <mc:AlternateContent xmlns:mc="http://schemas.openxmlformats.org/markup-compatibility/2006" xmlns:p14="http://schemas.microsoft.com/office/powerpoint/2010/main">
-    <mc:Choice Requires="p14">
-      <p:transition p14:dur="0"/>
+  <mc:AlternateContent xmlns:mc="http://schemas.openxmlformats.org/markup-compatibility/2006" xmlns:p159="http://schemas.microsoft.com/office/powerpoint/2015/09/main">
+    <mc:Choice Requires="p159">
+      <p:transition spd="slow">
+        <p159:morph option="byObject"/>
+      </p:transition>
     </mc:Choice>
     <mc:Fallback xmlns="">
-      <p:transition/>
+      <p:transition spd="slow">
+        <p:fade/>
+      </p:transition>
     </mc:Fallback>
   </mc:AlternateContent>
 </p:sld>

</xml_diff>